<commit_message>
think i'm done with ch2
</commit_message>
<xml_diff>
--- a/figs.pptx
+++ b/figs.pptx
@@ -7,6 +7,8 @@
   <p:sldIdLst>
     <p:sldId id="256" r:id="rId2"/>
     <p:sldId id="257" r:id="rId3"/>
+    <p:sldId id="258" r:id="rId4"/>
+    <p:sldId id="259" r:id="rId5"/>
   </p:sldIdLst>
   <p:sldSz cx="12192000" cy="6858000"/>
   <p:notesSz cx="6858000" cy="9144000"/>
@@ -105,6 +107,11 @@
       </a:defRPr>
     </a:lvl9pPr>
   </p:defaultTextStyle>
+  <p:extLst>
+    <p:ext uri="{EFAFB233-063F-42B5-8137-9DF3F51BA10A}">
+      <p15:sldGuideLst xmlns:p15="http://schemas.microsoft.com/office/powerpoint/2012/main"/>
+    </p:ext>
+  </p:extLst>
 </p:presentation>
 </file>
 
@@ -255,7 +262,7 @@
           <a:p>
             <a:fld id="{A71FC2DB-A326-45A5-94F2-D7C7B8043E42}" type="datetimeFigureOut">
               <a:rPr lang="en-US" smtClean="0"/>
-              <a:t>5/22/2023</a:t>
+              <a:t>6/2/2023</a:t>
             </a:fld>
             <a:endParaRPr lang="en-US"/>
           </a:p>
@@ -453,7 +460,7 @@
           <a:p>
             <a:fld id="{A71FC2DB-A326-45A5-94F2-D7C7B8043E42}" type="datetimeFigureOut">
               <a:rPr lang="en-US" smtClean="0"/>
-              <a:t>5/22/2023</a:t>
+              <a:t>6/2/2023</a:t>
             </a:fld>
             <a:endParaRPr lang="en-US"/>
           </a:p>
@@ -661,7 +668,7 @@
           <a:p>
             <a:fld id="{A71FC2DB-A326-45A5-94F2-D7C7B8043E42}" type="datetimeFigureOut">
               <a:rPr lang="en-US" smtClean="0"/>
-              <a:t>5/22/2023</a:t>
+              <a:t>6/2/2023</a:t>
             </a:fld>
             <a:endParaRPr lang="en-US"/>
           </a:p>
@@ -859,7 +866,7 @@
           <a:p>
             <a:fld id="{A71FC2DB-A326-45A5-94F2-D7C7B8043E42}" type="datetimeFigureOut">
               <a:rPr lang="en-US" smtClean="0"/>
-              <a:t>5/22/2023</a:t>
+              <a:t>6/2/2023</a:t>
             </a:fld>
             <a:endParaRPr lang="en-US"/>
           </a:p>
@@ -1134,7 +1141,7 @@
           <a:p>
             <a:fld id="{A71FC2DB-A326-45A5-94F2-D7C7B8043E42}" type="datetimeFigureOut">
               <a:rPr lang="en-US" smtClean="0"/>
-              <a:t>5/22/2023</a:t>
+              <a:t>6/2/2023</a:t>
             </a:fld>
             <a:endParaRPr lang="en-US"/>
           </a:p>
@@ -1399,7 +1406,7 @@
           <a:p>
             <a:fld id="{A71FC2DB-A326-45A5-94F2-D7C7B8043E42}" type="datetimeFigureOut">
               <a:rPr lang="en-US" smtClean="0"/>
-              <a:t>5/22/2023</a:t>
+              <a:t>6/2/2023</a:t>
             </a:fld>
             <a:endParaRPr lang="en-US"/>
           </a:p>
@@ -1811,7 +1818,7 @@
           <a:p>
             <a:fld id="{A71FC2DB-A326-45A5-94F2-D7C7B8043E42}" type="datetimeFigureOut">
               <a:rPr lang="en-US" smtClean="0"/>
-              <a:t>5/22/2023</a:t>
+              <a:t>6/2/2023</a:t>
             </a:fld>
             <a:endParaRPr lang="en-US"/>
           </a:p>
@@ -1952,7 +1959,7 @@
           <a:p>
             <a:fld id="{A71FC2DB-A326-45A5-94F2-D7C7B8043E42}" type="datetimeFigureOut">
               <a:rPr lang="en-US" smtClean="0"/>
-              <a:t>5/22/2023</a:t>
+              <a:t>6/2/2023</a:t>
             </a:fld>
             <a:endParaRPr lang="en-US"/>
           </a:p>
@@ -2065,7 +2072,7 @@
           <a:p>
             <a:fld id="{A71FC2DB-A326-45A5-94F2-D7C7B8043E42}" type="datetimeFigureOut">
               <a:rPr lang="en-US" smtClean="0"/>
-              <a:t>5/22/2023</a:t>
+              <a:t>6/2/2023</a:t>
             </a:fld>
             <a:endParaRPr lang="en-US"/>
           </a:p>
@@ -2376,7 +2383,7 @@
           <a:p>
             <a:fld id="{A71FC2DB-A326-45A5-94F2-D7C7B8043E42}" type="datetimeFigureOut">
               <a:rPr lang="en-US" smtClean="0"/>
-              <a:t>5/22/2023</a:t>
+              <a:t>6/2/2023</a:t>
             </a:fld>
             <a:endParaRPr lang="en-US"/>
           </a:p>
@@ -2664,7 +2671,7 @@
           <a:p>
             <a:fld id="{A71FC2DB-A326-45A5-94F2-D7C7B8043E42}" type="datetimeFigureOut">
               <a:rPr lang="en-US" smtClean="0"/>
-              <a:t>5/22/2023</a:t>
+              <a:t>6/2/2023</a:t>
             </a:fld>
             <a:endParaRPr lang="en-US"/>
           </a:p>
@@ -2905,7 +2912,7 @@
           <a:p>
             <a:fld id="{A71FC2DB-A326-45A5-94F2-D7C7B8043E42}" type="datetimeFigureOut">
               <a:rPr lang="en-US" smtClean="0"/>
-              <a:t>5/22/2023</a:t>
+              <a:t>6/2/2023</a:t>
             </a:fld>
             <a:endParaRPr lang="en-US"/>
           </a:p>
@@ -3423,8 +3430,8 @@
           </a:p>
         </p:txBody>
       </p:sp>
-      <mc:AlternateContent xmlns:mc="http://schemas.openxmlformats.org/markup-compatibility/2006">
-        <mc:Choice xmlns:a14="http://schemas.microsoft.com/office/drawing/2010/main" Requires="a14">
+      <mc:AlternateContent xmlns:mc="http://schemas.openxmlformats.org/markup-compatibility/2006" xmlns:a14="http://schemas.microsoft.com/office/drawing/2010/main">
+        <mc:Choice Requires="a14">
           <p:sp>
             <p:nvSpPr>
               <p:cNvPr id="10" name="TextBox 9">
@@ -3440,971 +3447,6 @@
             <p:spPr>
               <a:xfrm>
                 <a:off x="5454497" y="3628784"/>
-                <a:ext cx="1360629" cy="461665"/>
-              </a:xfrm>
-              <a:prstGeom prst="rect">
-                <a:avLst/>
-              </a:prstGeom>
-              <a:noFill/>
-            </p:spPr>
-            <p:txBody>
-              <a:bodyPr wrap="none" rtlCol="0">
-                <a:spAutoFit/>
-              </a:bodyPr>
-              <a:lstStyle/>
-              <a:p>
-                <a14:m>
-                  <m:oMathPara xmlns:m="http://schemas.openxmlformats.org/officeDocument/2006/math">
-                    <m:oMathParaPr>
-                      <m:jc m:val="centerGroup"/>
-                    </m:oMathParaPr>
-                    <m:oMath xmlns:m="http://schemas.openxmlformats.org/officeDocument/2006/math">
-                      <m:r>
-                        <a:rPr lang="en-US" sz="2400" b="0" i="1" smtClean="0">
-                          <a:latin typeface="Cambria Math" panose="02040503050406030204" pitchFamily="18" charset="0"/>
-                        </a:rPr>
-                        <m:t>h</m:t>
-                      </m:r>
-                      <m:d>
-                        <m:dPr>
-                          <m:ctrlPr>
-                            <a:rPr lang="en-US" sz="2400" b="0" i="1" smtClean="0">
-                              <a:latin typeface="Cambria Math" panose="02040503050406030204" pitchFamily="18" charset="0"/>
-                            </a:rPr>
-                          </m:ctrlPr>
-                        </m:dPr>
-                        <m:e>
-                          <m:r>
-                            <a:rPr lang="en-US" sz="2400" b="0" i="1" smtClean="0">
-                              <a:latin typeface="Cambria Math" panose="02040503050406030204" pitchFamily="18" charset="0"/>
-                            </a:rPr>
-                            <m:t>𝑡</m:t>
-                          </m:r>
-                        </m:e>
-                      </m:d>
-                      <m:r>
-                        <a:rPr lang="en-US" sz="2400" b="0" i="1" smtClean="0">
-                          <a:latin typeface="Cambria Math" panose="02040503050406030204" pitchFamily="18" charset="0"/>
-                        </a:rPr>
-                        <m:t> [</m:t>
-                      </m:r>
-                      <m:r>
-                        <m:rPr>
-                          <m:sty m:val="p"/>
-                        </m:rPr>
-                        <a:rPr lang="en-US" sz="2400" b="0" i="0" smtClean="0">
-                          <a:latin typeface="Cambria Math" panose="02040503050406030204" pitchFamily="18" charset="0"/>
-                        </a:rPr>
-                        <m:t>m</m:t>
-                      </m:r>
-                      <m:r>
-                        <a:rPr lang="en-US" sz="2400" b="0" i="1" smtClean="0">
-                          <a:latin typeface="Cambria Math" panose="02040503050406030204" pitchFamily="18" charset="0"/>
-                        </a:rPr>
-                        <m:t>]</m:t>
-                      </m:r>
-                    </m:oMath>
-                  </m:oMathPara>
-                </a14:m>
-                <a:endParaRPr lang="en-US" sz="2400" dirty="0"/>
-              </a:p>
-            </p:txBody>
-          </p:sp>
-        </mc:Choice>
-        <mc:Fallback>
-          <p:sp>
-            <p:nvSpPr>
-              <p:cNvPr id="10" name="TextBox 9">
-                <a:extLst>
-                  <a:ext uri="{FF2B5EF4-FFF2-40B4-BE49-F238E27FC236}">
-                    <a16:creationId xmlns:a16="http://schemas.microsoft.com/office/drawing/2014/main" id="{42951292-35D5-8333-25D3-62B9A9773977}"/>
-                  </a:ext>
-                </a:extLst>
-              </p:cNvPr>
-              <p:cNvSpPr txBox="1">
-                <a:spLocks noRot="1" noChangeAspect="1" noMove="1" noResize="1" noEditPoints="1" noAdjustHandles="1" noChangeArrowheads="1" noChangeShapeType="1" noTextEdit="1"/>
-              </p:cNvSpPr>
-              <p:nvPr/>
-            </p:nvSpPr>
-            <p:spPr>
-              <a:xfrm>
-                <a:off x="5454497" y="3628784"/>
-                <a:ext cx="1360629" cy="461665"/>
-              </a:xfrm>
-              <a:prstGeom prst="rect">
-                <a:avLst/>
-              </a:prstGeom>
-              <a:blipFill>
-                <a:blip r:embed="rId2"/>
-                <a:stretch>
-                  <a:fillRect r="-897" b="-17105"/>
-                </a:stretch>
-              </a:blipFill>
-            </p:spPr>
-            <p:txBody>
-              <a:bodyPr/>
-              <a:lstStyle/>
-              <a:p>
-                <a:r>
-                  <a:rPr lang="en-US">
-                    <a:noFill/>
-                  </a:rPr>
-                  <a:t> </a:t>
-                </a:r>
-              </a:p>
-            </p:txBody>
-          </p:sp>
-        </mc:Fallback>
-      </mc:AlternateContent>
-      <mc:AlternateContent xmlns:mc="http://schemas.openxmlformats.org/markup-compatibility/2006">
-        <mc:Choice xmlns:a14="http://schemas.microsoft.com/office/drawing/2010/main" Requires="a14">
-          <p:sp>
-            <p:nvSpPr>
-              <p:cNvPr id="14" name="TextBox 13">
-                <a:extLst>
-                  <a:ext uri="{FF2B5EF4-FFF2-40B4-BE49-F238E27FC236}">
-                    <a16:creationId xmlns:a16="http://schemas.microsoft.com/office/drawing/2014/main" id="{04BA515F-5216-A3BE-1795-813CA7C5E403}"/>
-                  </a:ext>
-                </a:extLst>
-              </p:cNvPr>
-              <p:cNvSpPr txBox="1"/>
-              <p:nvPr/>
-            </p:nvSpPr>
-            <p:spPr>
-              <a:xfrm>
-                <a:off x="5380027" y="1889522"/>
-                <a:ext cx="1133387" cy="461665"/>
-              </a:xfrm>
-              <a:prstGeom prst="rect">
-                <a:avLst/>
-              </a:prstGeom>
-              <a:noFill/>
-            </p:spPr>
-            <p:txBody>
-              <a:bodyPr wrap="none" rtlCol="0">
-                <a:spAutoFit/>
-              </a:bodyPr>
-              <a:lstStyle/>
-              <a:p>
-                <a14:m>
-                  <m:oMathPara xmlns:m="http://schemas.openxmlformats.org/officeDocument/2006/math">
-                    <m:oMathParaPr>
-                      <m:jc m:val="centerGroup"/>
-                    </m:oMathParaPr>
-                    <m:oMath xmlns:m="http://schemas.openxmlformats.org/officeDocument/2006/math">
-                      <m:r>
-                        <a:rPr lang="en-US" sz="2400" b="0" i="1" smtClean="0">
-                          <a:latin typeface="Cambria Math" panose="02040503050406030204" pitchFamily="18" charset="0"/>
-                        </a:rPr>
-                        <m:t>𝐴</m:t>
-                      </m:r>
-                      <m:r>
-                        <a:rPr lang="en-US" sz="2400" b="0" i="1" smtClean="0">
-                          <a:latin typeface="Cambria Math" panose="02040503050406030204" pitchFamily="18" charset="0"/>
-                        </a:rPr>
-                        <m:t> </m:t>
-                      </m:r>
-                      <m:d>
-                        <m:dPr>
-                          <m:begChr m:val="["/>
-                          <m:endChr m:val="]"/>
-                          <m:ctrlPr>
-                            <a:rPr lang="en-US" sz="2400" b="0" i="0" smtClean="0">
-                              <a:latin typeface="Cambria Math" panose="02040503050406030204" pitchFamily="18" charset="0"/>
-                            </a:rPr>
-                          </m:ctrlPr>
-                        </m:dPr>
-                        <m:e>
-                          <m:sSup>
-                            <m:sSupPr>
-                              <m:ctrlPr>
-                                <a:rPr lang="en-US" sz="2400" b="0" i="0" smtClean="0">
-                                  <a:latin typeface="Cambria Math" panose="02040503050406030204" pitchFamily="18" charset="0"/>
-                                </a:rPr>
-                              </m:ctrlPr>
-                            </m:sSupPr>
-                            <m:e>
-                              <m:r>
-                                <m:rPr>
-                                  <m:sty m:val="p"/>
-                                </m:rPr>
-                                <a:rPr lang="en-US" sz="2400" b="0" i="0" smtClean="0">
-                                  <a:latin typeface="Cambria Math" panose="02040503050406030204" pitchFamily="18" charset="0"/>
-                                </a:rPr>
-                                <m:t>m</m:t>
-                              </m:r>
-                            </m:e>
-                            <m:sup>
-                              <m:r>
-                                <a:rPr lang="en-US" sz="2400" b="0" i="0" smtClean="0">
-                                  <a:latin typeface="Cambria Math" panose="02040503050406030204" pitchFamily="18" charset="0"/>
-                                </a:rPr>
-                                <m:t>2</m:t>
-                              </m:r>
-                            </m:sup>
-                          </m:sSup>
-                        </m:e>
-                      </m:d>
-                    </m:oMath>
-                  </m:oMathPara>
-                </a14:m>
-                <a:endParaRPr lang="en-US" sz="2400" dirty="0"/>
-              </a:p>
-            </p:txBody>
-          </p:sp>
-        </mc:Choice>
-        <mc:Fallback>
-          <p:sp>
-            <p:nvSpPr>
-              <p:cNvPr id="14" name="TextBox 13">
-                <a:extLst>
-                  <a:ext uri="{FF2B5EF4-FFF2-40B4-BE49-F238E27FC236}">
-                    <a16:creationId xmlns:a16="http://schemas.microsoft.com/office/drawing/2014/main" id="{04BA515F-5216-A3BE-1795-813CA7C5E403}"/>
-                  </a:ext>
-                </a:extLst>
-              </p:cNvPr>
-              <p:cNvSpPr txBox="1">
-                <a:spLocks noRot="1" noChangeAspect="1" noMove="1" noResize="1" noEditPoints="1" noAdjustHandles="1" noChangeArrowheads="1" noChangeShapeType="1" noTextEdit="1"/>
-              </p:cNvSpPr>
-              <p:nvPr/>
-            </p:nvSpPr>
-            <p:spPr>
-              <a:xfrm>
-                <a:off x="5380027" y="1889522"/>
-                <a:ext cx="1133387" cy="461665"/>
-              </a:xfrm>
-              <a:prstGeom prst="rect">
-                <a:avLst/>
-              </a:prstGeom>
-              <a:blipFill>
-                <a:blip r:embed="rId3"/>
-                <a:stretch>
-                  <a:fillRect/>
-                </a:stretch>
-              </a:blipFill>
-            </p:spPr>
-            <p:txBody>
-              <a:bodyPr/>
-              <a:lstStyle/>
-              <a:p>
-                <a:r>
-                  <a:rPr lang="en-US">
-                    <a:noFill/>
-                  </a:rPr>
-                  <a:t> </a:t>
-                </a:r>
-              </a:p>
-            </p:txBody>
-          </p:sp>
-        </mc:Fallback>
-      </mc:AlternateContent>
-      <p:sp>
-        <p:nvSpPr>
-          <p:cNvPr id="16" name="Arrow: Down 15">
-            <a:extLst>
-              <a:ext uri="{FF2B5EF4-FFF2-40B4-BE49-F238E27FC236}">
-                <a16:creationId xmlns:a16="http://schemas.microsoft.com/office/drawing/2014/main" id="{D301E6BC-B09B-27F8-4CFB-594A7144D773}"/>
-              </a:ext>
-            </a:extLst>
-          </p:cNvPr>
-          <p:cNvSpPr/>
-          <p:nvPr/>
-        </p:nvSpPr>
-        <p:spPr>
-          <a:xfrm>
-            <a:off x="1063255" y="5284374"/>
-            <a:ext cx="255183" cy="648799"/>
-          </a:xfrm>
-          <a:prstGeom prst="downArrow">
-            <a:avLst/>
-          </a:prstGeom>
-          <a:solidFill>
-            <a:schemeClr val="accent4">
-              <a:lumMod val="40000"/>
-              <a:lumOff val="60000"/>
-            </a:schemeClr>
-          </a:solidFill>
-          <a:ln w="19050">
-            <a:solidFill>
-              <a:schemeClr val="tx1"/>
-            </a:solidFill>
-          </a:ln>
-        </p:spPr>
-        <p:style>
-          <a:lnRef idx="2">
-            <a:schemeClr val="accent1">
-              <a:shade val="50000"/>
-            </a:schemeClr>
-          </a:lnRef>
-          <a:fillRef idx="1">
-            <a:schemeClr val="accent1"/>
-          </a:fillRef>
-          <a:effectRef idx="0">
-            <a:schemeClr val="accent1"/>
-          </a:effectRef>
-          <a:fontRef idx="minor">
-            <a:schemeClr val="lt1"/>
-          </a:fontRef>
-        </p:style>
-        <p:txBody>
-          <a:bodyPr rtlCol="0" anchor="ctr"/>
-          <a:lstStyle/>
-          <a:p>
-            <a:pPr algn="ctr"/>
-            <a:endParaRPr lang="en-US"/>
-          </a:p>
-        </p:txBody>
-      </p:sp>
-      <p:sp>
-        <p:nvSpPr>
-          <p:cNvPr id="15" name="L-Shape 14">
-            <a:extLst>
-              <a:ext uri="{FF2B5EF4-FFF2-40B4-BE49-F238E27FC236}">
-                <a16:creationId xmlns:a16="http://schemas.microsoft.com/office/drawing/2014/main" id="{058E9721-B0C3-DD27-AF69-92CDFB2B8DD6}"/>
-              </a:ext>
-            </a:extLst>
-          </p:cNvPr>
-          <p:cNvSpPr/>
-          <p:nvPr/>
-        </p:nvSpPr>
-        <p:spPr>
-          <a:xfrm rot="5400000">
-            <a:off x="1084521" y="4423143"/>
-            <a:ext cx="914400" cy="914400"/>
-          </a:xfrm>
-          <a:prstGeom prst="corner">
-            <a:avLst>
-              <a:gd name="adj1" fmla="val 24419"/>
-              <a:gd name="adj2" fmla="val 25581"/>
-            </a:avLst>
-          </a:prstGeom>
-          <a:solidFill>
-            <a:schemeClr val="accent1">
-              <a:lumMod val="40000"/>
-              <a:lumOff val="60000"/>
-            </a:schemeClr>
-          </a:solidFill>
-          <a:ln w="38100">
-            <a:solidFill>
-              <a:schemeClr val="tx1"/>
-            </a:solidFill>
-          </a:ln>
-        </p:spPr>
-        <p:style>
-          <a:lnRef idx="2">
-            <a:schemeClr val="accent1">
-              <a:shade val="50000"/>
-            </a:schemeClr>
-          </a:lnRef>
-          <a:fillRef idx="1">
-            <a:schemeClr val="accent1"/>
-          </a:fillRef>
-          <a:effectRef idx="0">
-            <a:schemeClr val="accent1"/>
-          </a:effectRef>
-          <a:fontRef idx="minor">
-            <a:schemeClr val="lt1"/>
-          </a:fontRef>
-        </p:style>
-        <p:txBody>
-          <a:bodyPr rtlCol="0" anchor="ctr"/>
-          <a:lstStyle/>
-          <a:p>
-            <a:pPr algn="ctr"/>
-            <a:endParaRPr lang="en-US"/>
-          </a:p>
-        </p:txBody>
-      </p:sp>
-      <mc:AlternateContent xmlns:mc="http://schemas.openxmlformats.org/markup-compatibility/2006">
-        <mc:Choice xmlns:a14="http://schemas.microsoft.com/office/drawing/2010/main" Requires="a14">
-          <p:sp>
-            <p:nvSpPr>
-              <p:cNvPr id="17" name="TextBox 16">
-                <a:extLst>
-                  <a:ext uri="{FF2B5EF4-FFF2-40B4-BE49-F238E27FC236}">
-                    <a16:creationId xmlns:a16="http://schemas.microsoft.com/office/drawing/2014/main" id="{E8726772-1223-BE8D-CA75-FB93F1EAA03C}"/>
-                  </a:ext>
-                </a:extLst>
-              </p:cNvPr>
-              <p:cNvSpPr txBox="1"/>
-              <p:nvPr/>
-            </p:nvSpPr>
-            <p:spPr>
-              <a:xfrm>
-                <a:off x="1234012" y="5339246"/>
-                <a:ext cx="1792863" cy="461665"/>
-              </a:xfrm>
-              <a:prstGeom prst="rect">
-                <a:avLst/>
-              </a:prstGeom>
-              <a:noFill/>
-            </p:spPr>
-            <p:txBody>
-              <a:bodyPr wrap="none" rtlCol="0">
-                <a:spAutoFit/>
-              </a:bodyPr>
-              <a:lstStyle/>
-              <a:p>
-                <a14:m>
-                  <m:oMath xmlns:m="http://schemas.openxmlformats.org/officeDocument/2006/math">
-                    <m:sSub>
-                      <m:sSubPr>
-                        <m:ctrlPr>
-                          <a:rPr lang="en-US" sz="2400" b="0" i="1" smtClean="0">
-                            <a:latin typeface="Cambria Math" panose="02040503050406030204" pitchFamily="18" charset="0"/>
-                          </a:rPr>
-                        </m:ctrlPr>
-                      </m:sSubPr>
-                      <m:e>
-                        <m:r>
-                          <a:rPr lang="en-US" sz="2400" b="0" i="1" smtClean="0">
-                            <a:latin typeface="Cambria Math" panose="02040503050406030204" pitchFamily="18" charset="0"/>
-                          </a:rPr>
-                          <m:t>𝑄</m:t>
-                        </m:r>
-                      </m:e>
-                      <m:sub>
-                        <m:r>
-                          <m:rPr>
-                            <m:sty m:val="p"/>
-                          </m:rPr>
-                          <a:rPr lang="en-US" sz="2400" b="0" i="0" smtClean="0">
-                            <a:latin typeface="Cambria Math" panose="02040503050406030204" pitchFamily="18" charset="0"/>
-                          </a:rPr>
-                          <m:t>out</m:t>
-                        </m:r>
-                      </m:sub>
-                    </m:sSub>
-                    <m:r>
-                      <a:rPr lang="en-US" sz="2400" b="0" i="1" smtClean="0">
-                        <a:latin typeface="Cambria Math" panose="02040503050406030204" pitchFamily="18" charset="0"/>
-                      </a:rPr>
-                      <m:t> </m:t>
-                    </m:r>
-                    <m:d>
-                      <m:dPr>
-                        <m:begChr m:val="["/>
-                        <m:endChr m:val="]"/>
-                        <m:ctrlPr>
-                          <a:rPr lang="en-US" sz="2400" b="0" i="1" smtClean="0">
-                            <a:latin typeface="Cambria Math" panose="02040503050406030204" pitchFamily="18" charset="0"/>
-                          </a:rPr>
-                        </m:ctrlPr>
-                      </m:dPr>
-                      <m:e>
-                        <m:sSup>
-                          <m:sSupPr>
-                            <m:ctrlPr>
-                              <a:rPr lang="en-US" sz="2400" b="0" smtClean="0">
-                                <a:latin typeface="Cambria Math" panose="02040503050406030204" pitchFamily="18" charset="0"/>
-                              </a:rPr>
-                            </m:ctrlPr>
-                          </m:sSupPr>
-                          <m:e>
-                            <m:r>
-                              <m:rPr>
-                                <m:sty m:val="p"/>
-                              </m:rPr>
-                              <a:rPr lang="en-US" sz="2400" b="0" i="0" smtClean="0">
-                                <a:latin typeface="Cambria Math" panose="02040503050406030204" pitchFamily="18" charset="0"/>
-                              </a:rPr>
-                              <m:t>m</m:t>
-                            </m:r>
-                          </m:e>
-                          <m:sup>
-                            <m:r>
-                              <a:rPr lang="en-US" sz="2400" b="0" i="0" smtClean="0">
-                                <a:latin typeface="Cambria Math" panose="02040503050406030204" pitchFamily="18" charset="0"/>
-                              </a:rPr>
-                              <m:t>3</m:t>
-                            </m:r>
-                          </m:sup>
-                        </m:sSup>
-                        <m:r>
-                          <a:rPr lang="en-US" sz="2400" b="0" i="0" smtClean="0">
-                            <a:latin typeface="Cambria Math" panose="02040503050406030204" pitchFamily="18" charset="0"/>
-                          </a:rPr>
-                          <m:t>/</m:t>
-                        </m:r>
-                        <m:r>
-                          <m:rPr>
-                            <m:sty m:val="p"/>
-                          </m:rPr>
-                          <a:rPr lang="en-US" sz="2400" b="0" i="0" smtClean="0">
-                            <a:latin typeface="Cambria Math" panose="02040503050406030204" pitchFamily="18" charset="0"/>
-                          </a:rPr>
-                          <m:t>s</m:t>
-                        </m:r>
-                      </m:e>
-                    </m:d>
-                  </m:oMath>
-                </a14:m>
-                <a:r>
-                  <a:rPr lang="en-US" sz="2400" dirty="0"/>
-                  <a:t> </a:t>
-                </a:r>
-              </a:p>
-            </p:txBody>
-          </p:sp>
-        </mc:Choice>
-        <mc:Fallback>
-          <p:sp>
-            <p:nvSpPr>
-              <p:cNvPr id="17" name="TextBox 16">
-                <a:extLst>
-                  <a:ext uri="{FF2B5EF4-FFF2-40B4-BE49-F238E27FC236}">
-                    <a16:creationId xmlns:a16="http://schemas.microsoft.com/office/drawing/2014/main" id="{E8726772-1223-BE8D-CA75-FB93F1EAA03C}"/>
-                  </a:ext>
-                </a:extLst>
-              </p:cNvPr>
-              <p:cNvSpPr txBox="1">
-                <a:spLocks noRot="1" noChangeAspect="1" noMove="1" noResize="1" noEditPoints="1" noAdjustHandles="1" noChangeArrowheads="1" noChangeShapeType="1" noTextEdit="1"/>
-              </p:cNvSpPr>
-              <p:nvPr/>
-            </p:nvSpPr>
-            <p:spPr>
-              <a:xfrm>
-                <a:off x="1234012" y="5339246"/>
-                <a:ext cx="1792863" cy="461665"/>
-              </a:xfrm>
-              <a:prstGeom prst="rect">
-                <a:avLst/>
-              </a:prstGeom>
-              <a:blipFill>
-                <a:blip r:embed="rId4"/>
-                <a:stretch>
-                  <a:fillRect l="-2373" b="-17105"/>
-                </a:stretch>
-              </a:blipFill>
-            </p:spPr>
-            <p:txBody>
-              <a:bodyPr/>
-              <a:lstStyle/>
-              <a:p>
-                <a:r>
-                  <a:rPr lang="en-US">
-                    <a:noFill/>
-                  </a:rPr>
-                  <a:t> </a:t>
-                </a:r>
-              </a:p>
-            </p:txBody>
-          </p:sp>
-        </mc:Fallback>
-      </mc:AlternateContent>
-      <p:cxnSp>
-        <p:nvCxnSpPr>
-          <p:cNvPr id="19" name="Straight Arrow Connector 18">
-            <a:extLst>
-              <a:ext uri="{FF2B5EF4-FFF2-40B4-BE49-F238E27FC236}">
-                <a16:creationId xmlns:a16="http://schemas.microsoft.com/office/drawing/2014/main" id="{88A38D44-F37A-5D2A-5123-2CCDCFDD11BD}"/>
-              </a:ext>
-            </a:extLst>
-          </p:cNvPr>
-          <p:cNvCxnSpPr>
-            <a:cxnSpLocks/>
-          </p:cNvCxnSpPr>
-          <p:nvPr/>
-        </p:nvCxnSpPr>
-        <p:spPr>
-          <a:xfrm>
-            <a:off x="5447139" y="3083442"/>
-            <a:ext cx="0" cy="1637414"/>
-          </a:xfrm>
-          <a:prstGeom prst="straightConnector1">
-            <a:avLst/>
-          </a:prstGeom>
-          <a:ln w="38100">
-            <a:solidFill>
-              <a:schemeClr val="tx1"/>
-            </a:solidFill>
-            <a:headEnd type="triangle"/>
-            <a:tailEnd type="triangle"/>
-          </a:ln>
-        </p:spPr>
-        <p:style>
-          <a:lnRef idx="1">
-            <a:schemeClr val="accent1"/>
-          </a:lnRef>
-          <a:fillRef idx="0">
-            <a:schemeClr val="accent1"/>
-          </a:fillRef>
-          <a:effectRef idx="0">
-            <a:schemeClr val="accent1"/>
-          </a:effectRef>
-          <a:fontRef idx="minor">
-            <a:schemeClr val="tx1"/>
-          </a:fontRef>
-        </p:style>
-      </p:cxnSp>
-      <p:cxnSp>
-        <p:nvCxnSpPr>
-          <p:cNvPr id="23" name="Straight Arrow Connector 22">
-            <a:extLst>
-              <a:ext uri="{FF2B5EF4-FFF2-40B4-BE49-F238E27FC236}">
-                <a16:creationId xmlns:a16="http://schemas.microsoft.com/office/drawing/2014/main" id="{33A48FDC-2D9E-2037-3673-C3D49B3106E1}"/>
-              </a:ext>
-            </a:extLst>
-          </p:cNvPr>
-          <p:cNvCxnSpPr>
-            <a:cxnSpLocks/>
-          </p:cNvCxnSpPr>
-          <p:nvPr/>
-        </p:nvCxnSpPr>
-        <p:spPr>
-          <a:xfrm flipH="1">
-            <a:off x="4488110" y="2267297"/>
-            <a:ext cx="959029" cy="816145"/>
-          </a:xfrm>
-          <a:prstGeom prst="straightConnector1">
-            <a:avLst/>
-          </a:prstGeom>
-          <a:ln w="38100">
-            <a:solidFill>
-              <a:schemeClr val="tx1"/>
-            </a:solidFill>
-            <a:tailEnd type="triangle"/>
-          </a:ln>
-        </p:spPr>
-        <p:style>
-          <a:lnRef idx="1">
-            <a:schemeClr val="accent1"/>
-          </a:lnRef>
-          <a:fillRef idx="0">
-            <a:schemeClr val="accent1"/>
-          </a:fillRef>
-          <a:effectRef idx="0">
-            <a:schemeClr val="accent1"/>
-          </a:effectRef>
-          <a:fontRef idx="minor">
-            <a:schemeClr val="tx1"/>
-          </a:fontRef>
-        </p:style>
-      </p:cxnSp>
-      <mc:AlternateContent xmlns:mc="http://schemas.openxmlformats.org/markup-compatibility/2006">
-        <mc:Choice xmlns:a14="http://schemas.microsoft.com/office/drawing/2010/main" Requires="a14">
-          <p:sp>
-            <p:nvSpPr>
-              <p:cNvPr id="27" name="TextBox 26">
-                <a:extLst>
-                  <a:ext uri="{FF2B5EF4-FFF2-40B4-BE49-F238E27FC236}">
-                    <a16:creationId xmlns:a16="http://schemas.microsoft.com/office/drawing/2014/main" id="{213B6514-A751-B860-43DA-6F0ADBEE7788}"/>
-                  </a:ext>
-                </a:extLst>
-              </p:cNvPr>
-              <p:cNvSpPr txBox="1"/>
-              <p:nvPr/>
-            </p:nvSpPr>
-            <p:spPr>
-              <a:xfrm>
-                <a:off x="614899" y="3012693"/>
-                <a:ext cx="1211998" cy="461665"/>
-              </a:xfrm>
-              <a:prstGeom prst="rect">
-                <a:avLst/>
-              </a:prstGeom>
-              <a:noFill/>
-            </p:spPr>
-            <p:txBody>
-              <a:bodyPr wrap="none" rtlCol="0">
-                <a:spAutoFit/>
-              </a:bodyPr>
-              <a:lstStyle/>
-              <a:p>
-                <a14:m>
-                  <m:oMathPara xmlns:m="http://schemas.openxmlformats.org/officeDocument/2006/math">
-                    <m:oMathParaPr>
-                      <m:jc m:val="centerGroup"/>
-                    </m:oMathParaPr>
-                    <m:oMath xmlns:m="http://schemas.openxmlformats.org/officeDocument/2006/math">
-                      <m:sSub>
-                        <m:sSubPr>
-                          <m:ctrlPr>
-                            <a:rPr lang="en-US" sz="2400" b="0" i="1" smtClean="0">
-                              <a:latin typeface="Cambria Math" panose="02040503050406030204" pitchFamily="18" charset="0"/>
-                            </a:rPr>
-                          </m:ctrlPr>
-                        </m:sSubPr>
-                        <m:e>
-                          <m:r>
-                            <a:rPr lang="en-US" sz="2400" b="0" i="1" smtClean="0">
-                              <a:latin typeface="Cambria Math" panose="02040503050406030204" pitchFamily="18" charset="0"/>
-                            </a:rPr>
-                            <m:t>𝑃</m:t>
-                          </m:r>
-                        </m:e>
-                        <m:sub>
-                          <m:r>
-                            <a:rPr lang="en-US" sz="2400" b="0" i="1" smtClean="0">
-                              <a:latin typeface="Cambria Math" panose="02040503050406030204" pitchFamily="18" charset="0"/>
-                            </a:rPr>
-                            <m:t>∞</m:t>
-                          </m:r>
-                        </m:sub>
-                      </m:sSub>
-                      <m:r>
-                        <a:rPr lang="en-US" sz="2400" b="0" i="1" smtClean="0">
-                          <a:latin typeface="Cambria Math" panose="02040503050406030204" pitchFamily="18" charset="0"/>
-                        </a:rPr>
-                        <m:t> </m:t>
-                      </m:r>
-                      <m:d>
-                        <m:dPr>
-                          <m:begChr m:val="["/>
-                          <m:endChr m:val="]"/>
-                          <m:ctrlPr>
-                            <a:rPr lang="en-US" sz="2400" b="0" i="0" smtClean="0">
-                              <a:latin typeface="Cambria Math" panose="02040503050406030204" pitchFamily="18" charset="0"/>
-                            </a:rPr>
-                          </m:ctrlPr>
-                        </m:dPr>
-                        <m:e>
-                          <m:r>
-                            <m:rPr>
-                              <m:sty m:val="p"/>
-                            </m:rPr>
-                            <a:rPr lang="en-US" sz="2400" b="0" i="0" smtClean="0">
-                              <a:latin typeface="Cambria Math" panose="02040503050406030204" pitchFamily="18" charset="0"/>
-                            </a:rPr>
-                            <m:t>Pa</m:t>
-                          </m:r>
-                        </m:e>
-                      </m:d>
-                    </m:oMath>
-                  </m:oMathPara>
-                </a14:m>
-                <a:endParaRPr lang="en-US" sz="2400" dirty="0"/>
-              </a:p>
-            </p:txBody>
-          </p:sp>
-        </mc:Choice>
-        <mc:Fallback>
-          <p:sp>
-            <p:nvSpPr>
-              <p:cNvPr id="27" name="TextBox 26">
-                <a:extLst>
-                  <a:ext uri="{FF2B5EF4-FFF2-40B4-BE49-F238E27FC236}">
-                    <a16:creationId xmlns:a16="http://schemas.microsoft.com/office/drawing/2014/main" id="{213B6514-A751-B860-43DA-6F0ADBEE7788}"/>
-                  </a:ext>
-                </a:extLst>
-              </p:cNvPr>
-              <p:cNvSpPr txBox="1">
-                <a:spLocks noRot="1" noChangeAspect="1" noMove="1" noResize="1" noEditPoints="1" noAdjustHandles="1" noChangeArrowheads="1" noChangeShapeType="1" noTextEdit="1"/>
-              </p:cNvSpPr>
-              <p:nvPr/>
-            </p:nvSpPr>
-            <p:spPr>
-              <a:xfrm>
-                <a:off x="614899" y="3012693"/>
-                <a:ext cx="1211998" cy="461665"/>
-              </a:xfrm>
-              <a:prstGeom prst="rect">
-                <a:avLst/>
-              </a:prstGeom>
-              <a:blipFill>
-                <a:blip r:embed="rId5"/>
-                <a:stretch>
-                  <a:fillRect/>
-                </a:stretch>
-              </a:blipFill>
-            </p:spPr>
-            <p:txBody>
-              <a:bodyPr/>
-              <a:lstStyle/>
-              <a:p>
-                <a:r>
-                  <a:rPr lang="en-US">
-                    <a:noFill/>
-                  </a:rPr>
-                  <a:t> </a:t>
-                </a:r>
-              </a:p>
-            </p:txBody>
-          </p:sp>
-        </mc:Fallback>
-      </mc:AlternateContent>
-      <mc:AlternateContent xmlns:mc="http://schemas.openxmlformats.org/markup-compatibility/2006">
-        <mc:Choice xmlns:a14="http://schemas.microsoft.com/office/drawing/2010/main" Requires="a14">
-          <p:sp>
-            <p:nvSpPr>
-              <p:cNvPr id="28" name="TextBox 27">
-                <a:extLst>
-                  <a:ext uri="{FF2B5EF4-FFF2-40B4-BE49-F238E27FC236}">
-                    <a16:creationId xmlns:a16="http://schemas.microsoft.com/office/drawing/2014/main" id="{3A823D70-3A63-571A-06FF-65DAC918B537}"/>
-                  </a:ext>
-                </a:extLst>
-              </p:cNvPr>
-              <p:cNvSpPr txBox="1"/>
-              <p:nvPr/>
-            </p:nvSpPr>
-            <p:spPr>
-              <a:xfrm>
-                <a:off x="2947075" y="4338934"/>
-                <a:ext cx="1378519" cy="461665"/>
-              </a:xfrm>
-              <a:prstGeom prst="rect">
-                <a:avLst/>
-              </a:prstGeom>
-              <a:noFill/>
-            </p:spPr>
-            <p:txBody>
-              <a:bodyPr wrap="none" rtlCol="0">
-                <a:spAutoFit/>
-              </a:bodyPr>
-              <a:lstStyle/>
-              <a:p>
-                <a14:m>
-                  <m:oMathPara xmlns:m="http://schemas.openxmlformats.org/officeDocument/2006/math">
-                    <m:oMathParaPr>
-                      <m:jc m:val="centerGroup"/>
-                    </m:oMathParaPr>
-                    <m:oMath xmlns:m="http://schemas.openxmlformats.org/officeDocument/2006/math">
-                      <m:r>
-                        <a:rPr lang="en-US" sz="2400" b="0" i="1" smtClean="0">
-                          <a:latin typeface="Cambria Math" panose="02040503050406030204" pitchFamily="18" charset="0"/>
-                        </a:rPr>
-                        <m:t>𝑃</m:t>
-                      </m:r>
-                      <m:r>
-                        <a:rPr lang="en-US" sz="2400" b="0" i="1" smtClean="0">
-                          <a:latin typeface="Cambria Math" panose="02040503050406030204" pitchFamily="18" charset="0"/>
-                        </a:rPr>
-                        <m:t>(</m:t>
-                      </m:r>
-                      <m:r>
-                        <a:rPr lang="en-US" sz="2400" b="0" i="1" smtClean="0">
-                          <a:latin typeface="Cambria Math" panose="02040503050406030204" pitchFamily="18" charset="0"/>
-                        </a:rPr>
-                        <m:t>𝑡</m:t>
-                      </m:r>
-                      <m:r>
-                        <a:rPr lang="en-US" sz="2400" b="0" i="1" smtClean="0">
-                          <a:latin typeface="Cambria Math" panose="02040503050406030204" pitchFamily="18" charset="0"/>
-                        </a:rPr>
-                        <m:t>)</m:t>
-                      </m:r>
-                      <m:d>
-                        <m:dPr>
-                          <m:begChr m:val="["/>
-                          <m:endChr m:val="]"/>
-                          <m:ctrlPr>
-                            <a:rPr lang="en-US" sz="2400" b="0" i="0" smtClean="0">
-                              <a:latin typeface="Cambria Math" panose="02040503050406030204" pitchFamily="18" charset="0"/>
-                            </a:rPr>
-                          </m:ctrlPr>
-                        </m:dPr>
-                        <m:e>
-                          <m:r>
-                            <m:rPr>
-                              <m:sty m:val="p"/>
-                            </m:rPr>
-                            <a:rPr lang="en-US" sz="2400" b="0" i="0" smtClean="0">
-                              <a:latin typeface="Cambria Math" panose="02040503050406030204" pitchFamily="18" charset="0"/>
-                            </a:rPr>
-                            <m:t>Pa</m:t>
-                          </m:r>
-                        </m:e>
-                      </m:d>
-                    </m:oMath>
-                  </m:oMathPara>
-                </a14:m>
-                <a:endParaRPr lang="en-US" sz="2400" dirty="0"/>
-              </a:p>
-            </p:txBody>
-          </p:sp>
-        </mc:Choice>
-        <mc:Fallback>
-          <p:sp>
-            <p:nvSpPr>
-              <p:cNvPr id="28" name="TextBox 27">
-                <a:extLst>
-                  <a:ext uri="{FF2B5EF4-FFF2-40B4-BE49-F238E27FC236}">
-                    <a16:creationId xmlns:a16="http://schemas.microsoft.com/office/drawing/2014/main" id="{3A823D70-3A63-571A-06FF-65DAC918B537}"/>
-                  </a:ext>
-                </a:extLst>
-              </p:cNvPr>
-              <p:cNvSpPr txBox="1">
-                <a:spLocks noRot="1" noChangeAspect="1" noMove="1" noResize="1" noEditPoints="1" noAdjustHandles="1" noChangeArrowheads="1" noChangeShapeType="1" noTextEdit="1"/>
-              </p:cNvSpPr>
-              <p:nvPr/>
-            </p:nvSpPr>
-            <p:spPr>
-              <a:xfrm>
-                <a:off x="2947075" y="4338934"/>
-                <a:ext cx="1378519" cy="461665"/>
-              </a:xfrm>
-              <a:prstGeom prst="rect">
-                <a:avLst/>
-              </a:prstGeom>
-              <a:blipFill>
-                <a:blip r:embed="rId6"/>
-                <a:stretch>
-                  <a:fillRect b="-18667"/>
-                </a:stretch>
-              </a:blipFill>
-            </p:spPr>
-            <p:txBody>
-              <a:bodyPr/>
-              <a:lstStyle/>
-              <a:p>
-                <a:r>
-                  <a:rPr lang="en-US">
-                    <a:noFill/>
-                  </a:rPr>
-                  <a:t> </a:t>
-                </a:r>
-              </a:p>
-            </p:txBody>
-          </p:sp>
-        </mc:Fallback>
-      </mc:AlternateContent>
-    </p:spTree>
-    <p:extLst>
-      <p:ext uri="{BB962C8B-B14F-4D97-AF65-F5344CB8AC3E}">
-        <p14:creationId xmlns:p14="http://schemas.microsoft.com/office/powerpoint/2010/main" val="2001600638"/>
-      </p:ext>
-    </p:extLst>
-  </p:cSld>
-  <p:clrMapOvr>
-    <a:masterClrMapping/>
-  </p:clrMapOvr>
-</p:sld>
-</file>
-
-<file path=ppt/slides/slide2.xml><?xml version="1.0" encoding="utf-8"?>
-<p:sld xmlns:a="http://schemas.openxmlformats.org/drawingml/2006/main" xmlns:r="http://schemas.openxmlformats.org/officeDocument/2006/relationships" xmlns:p="http://schemas.openxmlformats.org/presentationml/2006/main">
-  <p:cSld>
-    <p:spTree>
-      <p:nvGrpSpPr>
-        <p:cNvPr id="1" name=""/>
-        <p:cNvGrpSpPr/>
-        <p:nvPr/>
-      </p:nvGrpSpPr>
-      <p:grpSpPr>
-        <a:xfrm>
-          <a:off x="0" y="0"/>
-          <a:ext cx="0" cy="0"/>
-          <a:chOff x="0" y="0"/>
-          <a:chExt cx="0" cy="0"/>
-        </a:xfrm>
-      </p:grpSpPr>
-      <mc:AlternateContent xmlns:mc="http://schemas.openxmlformats.org/markup-compatibility/2006">
-        <mc:Choice xmlns:a14="http://schemas.microsoft.com/office/drawing/2010/main" Requires="a14">
-          <p:sp>
-            <p:nvSpPr>
-              <p:cNvPr id="10" name="TextBox 9">
-                <a:extLst>
-                  <a:ext uri="{FF2B5EF4-FFF2-40B4-BE49-F238E27FC236}">
-                    <a16:creationId xmlns:a16="http://schemas.microsoft.com/office/drawing/2014/main" id="{42951292-35D5-8333-25D3-62B9A9773977}"/>
-                  </a:ext>
-                </a:extLst>
-              </p:cNvPr>
-              <p:cNvSpPr txBox="1"/>
-              <p:nvPr/>
-            </p:nvSpPr>
-            <p:spPr>
-              <a:xfrm>
-                <a:off x="11929725" y="3118421"/>
                 <a:ext cx="1360629" cy="461665"/>
               </a:xfrm>
               <a:prstGeom prst="rect">
@@ -4477,7 +3519,7 @@
             </p:txBody>
           </p:sp>
         </mc:Choice>
-        <mc:Fallback>
+        <mc:Fallback xmlns="">
           <p:sp>
             <p:nvSpPr>
               <p:cNvPr id="10" name="TextBox 9">
@@ -4494,7 +3536,7 @@
             </p:nvSpPr>
             <p:spPr>
               <a:xfrm>
-                <a:off x="11929725" y="3118421"/>
+                <a:off x="5454497" y="3628784"/>
                 <a:ext cx="1360629" cy="461665"/>
               </a:xfrm>
               <a:prstGeom prst="rect">
@@ -4503,7 +3545,7 @@
               <a:blipFill>
                 <a:blip r:embed="rId2"/>
                 <a:stretch>
-                  <a:fillRect r="-897" b="-18667"/>
+                  <a:fillRect r="-897" b="-17105"/>
                 </a:stretch>
               </a:blipFill>
             </p:spPr>
@@ -4522,8 +3564,8 @@
           </p:sp>
         </mc:Fallback>
       </mc:AlternateContent>
-      <mc:AlternateContent xmlns:mc="http://schemas.openxmlformats.org/markup-compatibility/2006">
-        <mc:Choice xmlns:a14="http://schemas.microsoft.com/office/drawing/2010/main" Requires="a14">
+      <mc:AlternateContent xmlns:mc="http://schemas.openxmlformats.org/markup-compatibility/2006" xmlns:a14="http://schemas.microsoft.com/office/drawing/2010/main">
+        <mc:Choice Requires="a14">
           <p:sp>
             <p:nvSpPr>
               <p:cNvPr id="14" name="TextBox 13">
@@ -4538,7 +3580,7 @@
             </p:nvSpPr>
             <p:spPr>
               <a:xfrm>
-                <a:off x="11855255" y="1379159"/>
+                <a:off x="5380027" y="1889522"/>
                 <a:ext cx="1133387" cy="461665"/>
               </a:xfrm>
               <a:prstGeom prst="rect">
@@ -4620,7 +3662,7 @@
             </p:txBody>
           </p:sp>
         </mc:Choice>
-        <mc:Fallback>
+        <mc:Fallback xmlns="">
           <p:sp>
             <p:nvSpPr>
               <p:cNvPr id="14" name="TextBox 13">
@@ -4637,7 +3679,7 @@
             </p:nvSpPr>
             <p:spPr>
               <a:xfrm>
-                <a:off x="11855255" y="1379159"/>
+                <a:off x="5380027" y="1889522"/>
                 <a:ext cx="1133387" cy="461665"/>
               </a:xfrm>
               <a:prstGeom prst="rect">
@@ -4667,10 +3709,10 @@
       </mc:AlternateContent>
       <p:sp>
         <p:nvSpPr>
-          <p:cNvPr id="7" name="Oval 6">
-            <a:extLst>
-              <a:ext uri="{FF2B5EF4-FFF2-40B4-BE49-F238E27FC236}">
-                <a16:creationId xmlns:a16="http://schemas.microsoft.com/office/drawing/2014/main" id="{AD28BA6E-8529-5B39-C21E-971681C88C21}"/>
+          <p:cNvPr id="16" name="Arrow: Down 15">
+            <a:extLst>
+              <a:ext uri="{FF2B5EF4-FFF2-40B4-BE49-F238E27FC236}">
+                <a16:creationId xmlns:a16="http://schemas.microsoft.com/office/drawing/2014/main" id="{D301E6BC-B09B-27F8-4CFB-594A7144D773}"/>
               </a:ext>
             </a:extLst>
           </p:cNvPr>
@@ -4679,165 +3721,7 @@
         </p:nvSpPr>
         <p:spPr>
           <a:xfrm>
-            <a:off x="956733" y="957914"/>
-            <a:ext cx="2954866" cy="2954866"/>
-          </a:xfrm>
-          <a:prstGeom prst="ellipse">
-            <a:avLst/>
-          </a:prstGeom>
-          <a:solidFill>
-            <a:schemeClr val="accent4">
-              <a:lumMod val="20000"/>
-              <a:lumOff val="80000"/>
-            </a:schemeClr>
-          </a:solidFill>
-          <a:ln>
-            <a:solidFill>
-              <a:schemeClr val="tx1"/>
-            </a:solidFill>
-          </a:ln>
-        </p:spPr>
-        <p:style>
-          <a:lnRef idx="2">
-            <a:schemeClr val="accent1">
-              <a:shade val="50000"/>
-            </a:schemeClr>
-          </a:lnRef>
-          <a:fillRef idx="1">
-            <a:schemeClr val="accent1"/>
-          </a:fillRef>
-          <a:effectRef idx="0">
-            <a:schemeClr val="accent1"/>
-          </a:effectRef>
-          <a:fontRef idx="minor">
-            <a:schemeClr val="lt1"/>
-          </a:fontRef>
-        </p:style>
-        <p:txBody>
-          <a:bodyPr rtlCol="0" anchor="ctr"/>
-          <a:lstStyle/>
-          <a:p>
-            <a:pPr algn="ctr"/>
-            <a:endParaRPr lang="en-US"/>
-          </a:p>
-        </p:txBody>
-      </p:sp>
-      <p:sp>
-        <p:nvSpPr>
-          <p:cNvPr id="4" name="Cylinder 3">
-            <a:extLst>
-              <a:ext uri="{FF2B5EF4-FFF2-40B4-BE49-F238E27FC236}">
-                <a16:creationId xmlns:a16="http://schemas.microsoft.com/office/drawing/2014/main" id="{AD8AD99D-4256-10FC-E519-355AEDC7094C}"/>
-              </a:ext>
-            </a:extLst>
-          </p:cNvPr>
-          <p:cNvSpPr/>
-          <p:nvPr/>
-        </p:nvSpPr>
-        <p:spPr>
-          <a:xfrm>
-            <a:off x="8474149" y="786809"/>
-            <a:ext cx="3274828" cy="3423684"/>
-          </a:xfrm>
-          <a:prstGeom prst="can">
-            <a:avLst/>
-          </a:prstGeom>
-          <a:solidFill>
-            <a:schemeClr val="bg2">
-              <a:lumMod val="90000"/>
-            </a:schemeClr>
-          </a:solidFill>
-          <a:ln w="38100"/>
-        </p:spPr>
-        <p:style>
-          <a:lnRef idx="2">
-            <a:schemeClr val="dk1"/>
-          </a:lnRef>
-          <a:fillRef idx="1">
-            <a:schemeClr val="lt1"/>
-          </a:fillRef>
-          <a:effectRef idx="0">
-            <a:schemeClr val="dk1"/>
-          </a:effectRef>
-          <a:fontRef idx="minor">
-            <a:schemeClr val="dk1"/>
-          </a:fontRef>
-        </p:style>
-        <p:txBody>
-          <a:bodyPr rtlCol="0" anchor="ctr"/>
-          <a:lstStyle/>
-          <a:p>
-            <a:pPr algn="ctr"/>
-            <a:endParaRPr lang="en-US"/>
-          </a:p>
-        </p:txBody>
-      </p:sp>
-      <p:sp>
-        <p:nvSpPr>
-          <p:cNvPr id="5" name="Cylinder 4">
-            <a:extLst>
-              <a:ext uri="{FF2B5EF4-FFF2-40B4-BE49-F238E27FC236}">
-                <a16:creationId xmlns:a16="http://schemas.microsoft.com/office/drawing/2014/main" id="{433ABADC-27BB-7542-54F7-07A80269F12E}"/>
-              </a:ext>
-            </a:extLst>
-          </p:cNvPr>
-          <p:cNvSpPr/>
-          <p:nvPr/>
-        </p:nvSpPr>
-        <p:spPr>
-          <a:xfrm>
-            <a:off x="8474149" y="2328529"/>
-            <a:ext cx="3274828" cy="2041451"/>
-          </a:xfrm>
-          <a:prstGeom prst="can">
-            <a:avLst/>
-          </a:prstGeom>
-          <a:solidFill>
-            <a:schemeClr val="accent1">
-              <a:lumMod val="40000"/>
-              <a:lumOff val="60000"/>
-            </a:schemeClr>
-          </a:solidFill>
-          <a:ln w="38100"/>
-        </p:spPr>
-        <p:style>
-          <a:lnRef idx="2">
-            <a:schemeClr val="dk1"/>
-          </a:lnRef>
-          <a:fillRef idx="1">
-            <a:schemeClr val="lt1"/>
-          </a:fillRef>
-          <a:effectRef idx="0">
-            <a:schemeClr val="dk1"/>
-          </a:effectRef>
-          <a:fontRef idx="minor">
-            <a:schemeClr val="dk1"/>
-          </a:fontRef>
-        </p:style>
-        <p:txBody>
-          <a:bodyPr rtlCol="0" anchor="ctr"/>
-          <a:lstStyle/>
-          <a:p>
-            <a:pPr algn="ctr"/>
-            <a:endParaRPr lang="en-US"/>
-          </a:p>
-        </p:txBody>
-      </p:sp>
-      <p:sp>
-        <p:nvSpPr>
-          <p:cNvPr id="16" name="Arrow: Down 15">
-            <a:extLst>
-              <a:ext uri="{FF2B5EF4-FFF2-40B4-BE49-F238E27FC236}">
-                <a16:creationId xmlns:a16="http://schemas.microsoft.com/office/drawing/2014/main" id="{D301E6BC-B09B-27F8-4CFB-594A7144D773}"/>
-              </a:ext>
-            </a:extLst>
-          </p:cNvPr>
-          <p:cNvSpPr/>
-          <p:nvPr/>
-        </p:nvSpPr>
-        <p:spPr>
-          <a:xfrm>
-            <a:off x="7538483" y="4774011"/>
+            <a:off x="1063255" y="5284374"/>
             <a:ext cx="255183" cy="648799"/>
           </a:xfrm>
           <a:prstGeom prst="downArrow">
@@ -4894,7 +3778,7 @@
         </p:nvSpPr>
         <p:spPr>
           <a:xfrm rot="5400000">
-            <a:off x="7559749" y="3912780"/>
+            <a:off x="1084521" y="4423143"/>
             <a:ext cx="914400" cy="914400"/>
           </a:xfrm>
           <a:prstGeom prst="corner">
@@ -4940,8 +3824,8 @@
           </a:p>
         </p:txBody>
       </p:sp>
-      <mc:AlternateContent xmlns:mc="http://schemas.openxmlformats.org/markup-compatibility/2006">
-        <mc:Choice xmlns:a14="http://schemas.microsoft.com/office/drawing/2010/main" Requires="a14">
+      <mc:AlternateContent xmlns:mc="http://schemas.openxmlformats.org/markup-compatibility/2006" xmlns:a14="http://schemas.microsoft.com/office/drawing/2010/main">
+        <mc:Choice Requires="a14">
           <p:sp>
             <p:nvSpPr>
               <p:cNvPr id="17" name="TextBox 16">
@@ -4956,7 +3840,7 @@
             </p:nvSpPr>
             <p:spPr>
               <a:xfrm>
-                <a:off x="7709240" y="4828883"/>
+                <a:off x="1234012" y="5339246"/>
                 <a:ext cx="1792863" cy="461665"/>
               </a:xfrm>
               <a:prstGeom prst="rect">
@@ -5072,7 +3956,7 @@
             </p:txBody>
           </p:sp>
         </mc:Choice>
-        <mc:Fallback>
+        <mc:Fallback xmlns="">
           <p:sp>
             <p:nvSpPr>
               <p:cNvPr id="17" name="TextBox 16">
@@ -5089,7 +3973,7 @@
             </p:nvSpPr>
             <p:spPr>
               <a:xfrm>
-                <a:off x="7709240" y="4828883"/>
+                <a:off x="1234012" y="5339246"/>
                 <a:ext cx="1792863" cy="461665"/>
               </a:xfrm>
               <a:prstGeom prst="rect">
@@ -5098,7 +3982,7 @@
               <a:blipFill>
                 <a:blip r:embed="rId4"/>
                 <a:stretch>
-                  <a:fillRect l="-2381" b="-17105"/>
+                  <a:fillRect l="-2373" b="-17105"/>
                 </a:stretch>
               </a:blipFill>
             </p:spPr>
@@ -5133,7 +4017,7 @@
         </p:nvCxnSpPr>
         <p:spPr>
           <a:xfrm>
-            <a:off x="11922367" y="2573079"/>
+            <a:off x="5447139" y="3083442"/>
             <a:ext cx="0" cy="1637414"/>
           </a:xfrm>
           <a:prstGeom prst="straightConnector1">
@@ -5178,7 +4062,7 @@
         </p:nvCxnSpPr>
         <p:spPr>
           <a:xfrm flipH="1">
-            <a:off x="10963338" y="1756934"/>
+            <a:off x="4488110" y="2267297"/>
             <a:ext cx="959029" cy="816145"/>
           </a:xfrm>
           <a:prstGeom prst="straightConnector1">
@@ -5206,8 +4090,374 @@
           </a:fontRef>
         </p:style>
       </p:cxnSp>
-      <mc:AlternateContent xmlns:mc="http://schemas.openxmlformats.org/markup-compatibility/2006">
-        <mc:Choice xmlns:a14="http://schemas.microsoft.com/office/drawing/2010/main" Requires="a14">
+      <mc:AlternateContent xmlns:mc="http://schemas.openxmlformats.org/markup-compatibility/2006" xmlns:a14="http://schemas.microsoft.com/office/drawing/2010/main">
+        <mc:Choice Requires="a14">
+          <p:sp>
+            <p:nvSpPr>
+              <p:cNvPr id="27" name="TextBox 26">
+                <a:extLst>
+                  <a:ext uri="{FF2B5EF4-FFF2-40B4-BE49-F238E27FC236}">
+                    <a16:creationId xmlns:a16="http://schemas.microsoft.com/office/drawing/2014/main" id="{213B6514-A751-B860-43DA-6F0ADBEE7788}"/>
+                  </a:ext>
+                </a:extLst>
+              </p:cNvPr>
+              <p:cNvSpPr txBox="1"/>
+              <p:nvPr/>
+            </p:nvSpPr>
+            <p:spPr>
+              <a:xfrm>
+                <a:off x="614899" y="3012693"/>
+                <a:ext cx="1211998" cy="461665"/>
+              </a:xfrm>
+              <a:prstGeom prst="rect">
+                <a:avLst/>
+              </a:prstGeom>
+              <a:noFill/>
+            </p:spPr>
+            <p:txBody>
+              <a:bodyPr wrap="none" rtlCol="0">
+                <a:spAutoFit/>
+              </a:bodyPr>
+              <a:lstStyle/>
+              <a:p>
+                <a:pPr/>
+                <a14:m>
+                  <m:oMathPara xmlns:m="http://schemas.openxmlformats.org/officeDocument/2006/math">
+                    <m:oMathParaPr>
+                      <m:jc m:val="centerGroup"/>
+                    </m:oMathParaPr>
+                    <m:oMath xmlns:m="http://schemas.openxmlformats.org/officeDocument/2006/math">
+                      <m:sSub>
+                        <m:sSubPr>
+                          <m:ctrlPr>
+                            <a:rPr lang="en-US" sz="2400" b="0" i="1" smtClean="0">
+                              <a:latin typeface="Cambria Math" panose="02040503050406030204" pitchFamily="18" charset="0"/>
+                            </a:rPr>
+                          </m:ctrlPr>
+                        </m:sSubPr>
+                        <m:e>
+                          <m:r>
+                            <a:rPr lang="en-US" sz="2400" b="0" i="1" smtClean="0">
+                              <a:latin typeface="Cambria Math" panose="02040503050406030204" pitchFamily="18" charset="0"/>
+                            </a:rPr>
+                            <m:t>𝑃</m:t>
+                          </m:r>
+                        </m:e>
+                        <m:sub>
+                          <m:r>
+                            <a:rPr lang="en-US" sz="2400" b="0" i="1" smtClean="0">
+                              <a:latin typeface="Cambria Math" panose="02040503050406030204" pitchFamily="18" charset="0"/>
+                            </a:rPr>
+                            <m:t>∞</m:t>
+                          </m:r>
+                        </m:sub>
+                      </m:sSub>
+                      <m:r>
+                        <a:rPr lang="en-US" sz="2400" b="0" i="1" smtClean="0">
+                          <a:latin typeface="Cambria Math" panose="02040503050406030204" pitchFamily="18" charset="0"/>
+                        </a:rPr>
+                        <m:t> </m:t>
+                      </m:r>
+                      <m:d>
+                        <m:dPr>
+                          <m:begChr m:val="["/>
+                          <m:endChr m:val="]"/>
+                          <m:ctrlPr>
+                            <a:rPr lang="en-US" sz="2400" b="0" i="1" smtClean="0">
+                              <a:latin typeface="Cambria Math" panose="02040503050406030204" pitchFamily="18" charset="0"/>
+                            </a:rPr>
+                          </m:ctrlPr>
+                        </m:dPr>
+                        <m:e>
+                          <m:r>
+                            <m:rPr>
+                              <m:sty m:val="p"/>
+                            </m:rPr>
+                            <a:rPr lang="en-US" sz="2400" b="0" i="0" smtClean="0">
+                              <a:latin typeface="Cambria Math" panose="02040503050406030204" pitchFamily="18" charset="0"/>
+                            </a:rPr>
+                            <m:t>Pa</m:t>
+                          </m:r>
+                        </m:e>
+                      </m:d>
+                    </m:oMath>
+                  </m:oMathPara>
+                </a14:m>
+                <a:endParaRPr lang="en-US" sz="2400" dirty="0"/>
+              </a:p>
+            </p:txBody>
+          </p:sp>
+        </mc:Choice>
+        <mc:Fallback xmlns="">
+          <p:sp>
+            <p:nvSpPr>
+              <p:cNvPr id="27" name="TextBox 26">
+                <a:extLst>
+                  <a:ext uri="{FF2B5EF4-FFF2-40B4-BE49-F238E27FC236}">
+                    <a16:creationId xmlns:a16="http://schemas.microsoft.com/office/drawing/2014/main" id="{213B6514-A751-B860-43DA-6F0ADBEE7788}"/>
+                  </a:ext>
+                </a:extLst>
+              </p:cNvPr>
+              <p:cNvSpPr txBox="1">
+                <a:spLocks noRot="1" noChangeAspect="1" noMove="1" noResize="1" noEditPoints="1" noAdjustHandles="1" noChangeArrowheads="1" noChangeShapeType="1" noTextEdit="1"/>
+              </p:cNvSpPr>
+              <p:nvPr/>
+            </p:nvSpPr>
+            <p:spPr>
+              <a:xfrm>
+                <a:off x="614899" y="3012693"/>
+                <a:ext cx="1211998" cy="461665"/>
+              </a:xfrm>
+              <a:prstGeom prst="rect">
+                <a:avLst/>
+              </a:prstGeom>
+              <a:blipFill>
+                <a:blip r:embed="rId5"/>
+                <a:stretch>
+                  <a:fillRect/>
+                </a:stretch>
+              </a:blipFill>
+            </p:spPr>
+            <p:txBody>
+              <a:bodyPr/>
+              <a:lstStyle/>
+              <a:p>
+                <a:r>
+                  <a:rPr lang="en-US">
+                    <a:noFill/>
+                  </a:rPr>
+                  <a:t> </a:t>
+                </a:r>
+              </a:p>
+            </p:txBody>
+          </p:sp>
+        </mc:Fallback>
+      </mc:AlternateContent>
+      <mc:AlternateContent xmlns:mc="http://schemas.openxmlformats.org/markup-compatibility/2006" xmlns:a14="http://schemas.microsoft.com/office/drawing/2010/main">
+        <mc:Choice Requires="a14">
+          <p:sp>
+            <p:nvSpPr>
+              <p:cNvPr id="28" name="TextBox 27">
+                <a:extLst>
+                  <a:ext uri="{FF2B5EF4-FFF2-40B4-BE49-F238E27FC236}">
+                    <a16:creationId xmlns:a16="http://schemas.microsoft.com/office/drawing/2014/main" id="{3A823D70-3A63-571A-06FF-65DAC918B537}"/>
+                  </a:ext>
+                </a:extLst>
+              </p:cNvPr>
+              <p:cNvSpPr txBox="1"/>
+              <p:nvPr/>
+            </p:nvSpPr>
+            <p:spPr>
+              <a:xfrm>
+                <a:off x="2947075" y="4338934"/>
+                <a:ext cx="1378519" cy="461665"/>
+              </a:xfrm>
+              <a:prstGeom prst="rect">
+                <a:avLst/>
+              </a:prstGeom>
+              <a:noFill/>
+            </p:spPr>
+            <p:txBody>
+              <a:bodyPr wrap="none" rtlCol="0">
+                <a:spAutoFit/>
+              </a:bodyPr>
+              <a:lstStyle/>
+              <a:p>
+                <a:pPr/>
+                <a14:m>
+                  <m:oMathPara xmlns:m="http://schemas.openxmlformats.org/officeDocument/2006/math">
+                    <m:oMathParaPr>
+                      <m:jc m:val="centerGroup"/>
+                    </m:oMathParaPr>
+                    <m:oMath xmlns:m="http://schemas.openxmlformats.org/officeDocument/2006/math">
+                      <m:r>
+                        <a:rPr lang="en-US" sz="2400" b="0" i="1" smtClean="0">
+                          <a:latin typeface="Cambria Math" panose="02040503050406030204" pitchFamily="18" charset="0"/>
+                        </a:rPr>
+                        <m:t>𝑃</m:t>
+                      </m:r>
+                      <m:r>
+                        <a:rPr lang="en-US" sz="2400" b="0" i="1" smtClean="0">
+                          <a:latin typeface="Cambria Math" panose="02040503050406030204" pitchFamily="18" charset="0"/>
+                        </a:rPr>
+                        <m:t>(</m:t>
+                      </m:r>
+                      <m:r>
+                        <a:rPr lang="en-US" sz="2400" b="0" i="1" smtClean="0">
+                          <a:latin typeface="Cambria Math" panose="02040503050406030204" pitchFamily="18" charset="0"/>
+                        </a:rPr>
+                        <m:t>𝑡</m:t>
+                      </m:r>
+                      <m:r>
+                        <a:rPr lang="en-US" sz="2400" b="0" i="1" smtClean="0">
+                          <a:latin typeface="Cambria Math" panose="02040503050406030204" pitchFamily="18" charset="0"/>
+                        </a:rPr>
+                        <m:t>)</m:t>
+                      </m:r>
+                      <m:d>
+                        <m:dPr>
+                          <m:begChr m:val="["/>
+                          <m:endChr m:val="]"/>
+                          <m:ctrlPr>
+                            <a:rPr lang="en-US" sz="2400" b="0" i="1" smtClean="0">
+                              <a:latin typeface="Cambria Math" panose="02040503050406030204" pitchFamily="18" charset="0"/>
+                            </a:rPr>
+                          </m:ctrlPr>
+                        </m:dPr>
+                        <m:e>
+                          <m:r>
+                            <m:rPr>
+                              <m:sty m:val="p"/>
+                            </m:rPr>
+                            <a:rPr lang="en-US" sz="2400" b="0" i="0" smtClean="0">
+                              <a:latin typeface="Cambria Math" panose="02040503050406030204" pitchFamily="18" charset="0"/>
+                            </a:rPr>
+                            <m:t>Pa</m:t>
+                          </m:r>
+                        </m:e>
+                      </m:d>
+                    </m:oMath>
+                  </m:oMathPara>
+                </a14:m>
+                <a:endParaRPr lang="en-US" sz="2400" dirty="0"/>
+              </a:p>
+            </p:txBody>
+          </p:sp>
+        </mc:Choice>
+        <mc:Fallback xmlns="">
+          <p:sp>
+            <p:nvSpPr>
+              <p:cNvPr id="28" name="TextBox 27">
+                <a:extLst>
+                  <a:ext uri="{FF2B5EF4-FFF2-40B4-BE49-F238E27FC236}">
+                    <a16:creationId xmlns:a16="http://schemas.microsoft.com/office/drawing/2014/main" id="{3A823D70-3A63-571A-06FF-65DAC918B537}"/>
+                  </a:ext>
+                </a:extLst>
+              </p:cNvPr>
+              <p:cNvSpPr txBox="1">
+                <a:spLocks noRot="1" noChangeAspect="1" noMove="1" noResize="1" noEditPoints="1" noAdjustHandles="1" noChangeArrowheads="1" noChangeShapeType="1" noTextEdit="1"/>
+              </p:cNvSpPr>
+              <p:nvPr/>
+            </p:nvSpPr>
+            <p:spPr>
+              <a:xfrm>
+                <a:off x="2947075" y="4338934"/>
+                <a:ext cx="1378519" cy="461665"/>
+              </a:xfrm>
+              <a:prstGeom prst="rect">
+                <a:avLst/>
+              </a:prstGeom>
+              <a:blipFill>
+                <a:blip r:embed="rId6"/>
+                <a:stretch>
+                  <a:fillRect b="-18667"/>
+                </a:stretch>
+              </a:blipFill>
+            </p:spPr>
+            <p:txBody>
+              <a:bodyPr/>
+              <a:lstStyle/>
+              <a:p>
+                <a:r>
+                  <a:rPr lang="en-US">
+                    <a:noFill/>
+                  </a:rPr>
+                  <a:t> </a:t>
+                </a:r>
+              </a:p>
+            </p:txBody>
+          </p:sp>
+        </mc:Fallback>
+      </mc:AlternateContent>
+    </p:spTree>
+    <p:extLst>
+      <p:ext uri="{BB962C8B-B14F-4D97-AF65-F5344CB8AC3E}">
+        <p14:creationId xmlns:p14="http://schemas.microsoft.com/office/powerpoint/2010/main" val="2001600638"/>
+      </p:ext>
+    </p:extLst>
+  </p:cSld>
+  <p:clrMapOvr>
+    <a:masterClrMapping/>
+  </p:clrMapOvr>
+</p:sld>
+</file>
+
+<file path=ppt/slides/slide2.xml><?xml version="1.0" encoding="utf-8"?>
+<p:sld xmlns:a="http://schemas.openxmlformats.org/drawingml/2006/main" xmlns:r="http://schemas.openxmlformats.org/officeDocument/2006/relationships" xmlns:p="http://schemas.openxmlformats.org/presentationml/2006/main">
+  <p:cSld>
+    <p:spTree>
+      <p:nvGrpSpPr>
+        <p:cNvPr id="1" name=""/>
+        <p:cNvGrpSpPr/>
+        <p:nvPr/>
+      </p:nvGrpSpPr>
+      <p:grpSpPr>
+        <a:xfrm>
+          <a:off x="0" y="0"/>
+          <a:ext cx="0" cy="0"/>
+          <a:chOff x="0" y="0"/>
+          <a:chExt cx="0" cy="0"/>
+        </a:xfrm>
+      </p:grpSpPr>
+      <p:sp>
+        <p:nvSpPr>
+          <p:cNvPr id="7" name="Oval 6">
+            <a:extLst>
+              <a:ext uri="{FF2B5EF4-FFF2-40B4-BE49-F238E27FC236}">
+                <a16:creationId xmlns:a16="http://schemas.microsoft.com/office/drawing/2014/main" id="{AD28BA6E-8529-5B39-C21E-971681C88C21}"/>
+              </a:ext>
+            </a:extLst>
+          </p:cNvPr>
+          <p:cNvSpPr/>
+          <p:nvPr/>
+        </p:nvSpPr>
+        <p:spPr>
+          <a:xfrm>
+            <a:off x="956733" y="957914"/>
+            <a:ext cx="2954866" cy="2954866"/>
+          </a:xfrm>
+          <a:prstGeom prst="ellipse">
+            <a:avLst/>
+          </a:prstGeom>
+          <a:solidFill>
+            <a:schemeClr val="accent4">
+              <a:lumMod val="20000"/>
+              <a:lumOff val="80000"/>
+            </a:schemeClr>
+          </a:solidFill>
+          <a:ln>
+            <a:solidFill>
+              <a:schemeClr val="tx1"/>
+            </a:solidFill>
+          </a:ln>
+        </p:spPr>
+        <p:style>
+          <a:lnRef idx="2">
+            <a:schemeClr val="accent1">
+              <a:shade val="50000"/>
+            </a:schemeClr>
+          </a:lnRef>
+          <a:fillRef idx="1">
+            <a:schemeClr val="accent1"/>
+          </a:fillRef>
+          <a:effectRef idx="0">
+            <a:schemeClr val="accent1"/>
+          </a:effectRef>
+          <a:fontRef idx="minor">
+            <a:schemeClr val="lt1"/>
+          </a:fontRef>
+        </p:style>
+        <p:txBody>
+          <a:bodyPr rtlCol="0" anchor="ctr"/>
+          <a:lstStyle/>
+          <a:p>
+            <a:pPr algn="ctr"/>
+            <a:endParaRPr lang="en-US"/>
+          </a:p>
+        </p:txBody>
+      </p:sp>
+      <mc:AlternateContent xmlns:mc="http://schemas.openxmlformats.org/markup-compatibility/2006" xmlns:a14="http://schemas.microsoft.com/office/drawing/2010/main">
+        <mc:Choice Requires="a14">
           <p:sp>
             <p:nvSpPr>
               <p:cNvPr id="27" name="TextBox 26">
@@ -5304,7 +4554,7 @@
             </p:txBody>
           </p:sp>
         </mc:Choice>
-        <mc:Fallback>
+        <mc:Fallback xmlns="">
           <p:sp>
             <p:nvSpPr>
               <p:cNvPr id="27" name="TextBox 26">
@@ -5349,8 +4599,8 @@
           </p:sp>
         </mc:Fallback>
       </mc:AlternateContent>
-      <mc:AlternateContent xmlns:mc="http://schemas.openxmlformats.org/markup-compatibility/2006">
-        <mc:Choice xmlns:a14="http://schemas.microsoft.com/office/drawing/2010/main" Requires="a14">
+      <mc:AlternateContent xmlns:mc="http://schemas.openxmlformats.org/markup-compatibility/2006" xmlns:a14="http://schemas.microsoft.com/office/drawing/2010/main">
+        <mc:Choice Requires="a14">
           <p:sp>
             <p:nvSpPr>
               <p:cNvPr id="28" name="TextBox 27">
@@ -5440,7 +4690,7 @@
             </p:txBody>
           </p:sp>
         </mc:Choice>
-        <mc:Fallback>
+        <mc:Fallback xmlns="">
           <p:sp>
             <p:nvSpPr>
               <p:cNvPr id="28" name="TextBox 27">
@@ -5542,8 +4792,8 @@
           </a:p>
         </p:txBody>
       </p:sp>
-      <mc:AlternateContent xmlns:mc="http://schemas.openxmlformats.org/markup-compatibility/2006">
-        <mc:Choice xmlns:a14="http://schemas.microsoft.com/office/drawing/2010/main" Requires="a14">
+      <mc:AlternateContent xmlns:mc="http://schemas.openxmlformats.org/markup-compatibility/2006" xmlns:a14="http://schemas.microsoft.com/office/drawing/2010/main">
+        <mc:Choice Requires="a14">
           <p:sp>
             <p:nvSpPr>
               <p:cNvPr id="20" name="TextBox 19">
@@ -5655,7 +4905,7 @@
             </p:txBody>
           </p:sp>
         </mc:Choice>
-        <mc:Fallback>
+        <mc:Fallback xmlns="">
           <p:sp>
             <p:nvSpPr>
               <p:cNvPr id="20" name="TextBox 19">
@@ -6040,6 +5290,1666 @@
     <p:extLst>
       <p:ext uri="{BB962C8B-B14F-4D97-AF65-F5344CB8AC3E}">
         <p14:creationId xmlns:p14="http://schemas.microsoft.com/office/powerpoint/2010/main" val="3749661692"/>
+      </p:ext>
+    </p:extLst>
+  </p:cSld>
+  <p:clrMapOvr>
+    <a:masterClrMapping/>
+  </p:clrMapOvr>
+</p:sld>
+</file>
+
+<file path=ppt/slides/slide3.xml><?xml version="1.0" encoding="utf-8"?>
+<p:sld xmlns:a="http://schemas.openxmlformats.org/drawingml/2006/main" xmlns:r="http://schemas.openxmlformats.org/officeDocument/2006/relationships" xmlns:p="http://schemas.openxmlformats.org/presentationml/2006/main">
+  <p:cSld>
+    <p:spTree>
+      <p:nvGrpSpPr>
+        <p:cNvPr id="1" name=""/>
+        <p:cNvGrpSpPr/>
+        <p:nvPr/>
+      </p:nvGrpSpPr>
+      <p:grpSpPr>
+        <a:xfrm>
+          <a:off x="0" y="0"/>
+          <a:ext cx="0" cy="0"/>
+          <a:chOff x="0" y="0"/>
+          <a:chExt cx="0" cy="0"/>
+        </a:xfrm>
+      </p:grpSpPr>
+      <p:pic>
+        <p:nvPicPr>
+          <p:cNvPr id="1026" name="Picture 2">
+            <a:extLst>
+              <a:ext uri="{FF2B5EF4-FFF2-40B4-BE49-F238E27FC236}">
+                <a16:creationId xmlns:a16="http://schemas.microsoft.com/office/drawing/2014/main" id="{BADF2781-01DB-ECB2-DED2-18C575CD872E}"/>
+              </a:ext>
+            </a:extLst>
+          </p:cNvPr>
+          <p:cNvPicPr>
+            <a:picLocks noChangeAspect="1" noChangeArrowheads="1"/>
+          </p:cNvPicPr>
+          <p:nvPr/>
+        </p:nvPicPr>
+        <p:blipFill>
+          <a:blip r:embed="rId2">
+            <a:extLst>
+              <a:ext uri="{28A0092B-C50C-407E-A947-70E740481C1C}">
+                <a14:useLocalDpi xmlns:a14="http://schemas.microsoft.com/office/drawing/2010/main" val="0"/>
+              </a:ext>
+            </a:extLst>
+          </a:blip>
+          <a:srcRect/>
+          <a:stretch>
+            <a:fillRect/>
+          </a:stretch>
+        </p:blipFill>
+        <p:spPr bwMode="auto">
+          <a:xfrm>
+            <a:off x="3058524" y="838748"/>
+            <a:ext cx="5277510" cy="2024574"/>
+          </a:xfrm>
+          <a:prstGeom prst="rect">
+            <a:avLst/>
+          </a:prstGeom>
+          <a:noFill/>
+          <a:extLst>
+            <a:ext uri="{909E8E84-426E-40DD-AFC4-6F175D3DCCD1}">
+              <a14:hiddenFill xmlns:a14="http://schemas.microsoft.com/office/drawing/2010/main">
+                <a:solidFill>
+                  <a:srgbClr val="FFFFFF"/>
+                </a:solidFill>
+              </a14:hiddenFill>
+            </a:ext>
+          </a:extLst>
+        </p:spPr>
+      </p:pic>
+      <p:pic>
+        <p:nvPicPr>
+          <p:cNvPr id="1028" name="Picture 4" descr="RSA electronics capacitor symbol vector image | Free SVG">
+            <a:extLst>
+              <a:ext uri="{FF2B5EF4-FFF2-40B4-BE49-F238E27FC236}">
+                <a16:creationId xmlns:a16="http://schemas.microsoft.com/office/drawing/2014/main" id="{FEB39592-B964-038C-8426-B3AFF0F1241F}"/>
+              </a:ext>
+            </a:extLst>
+          </p:cNvPr>
+          <p:cNvPicPr>
+            <a:picLocks noChangeAspect="1" noChangeArrowheads="1"/>
+          </p:cNvPicPr>
+          <p:nvPr/>
+        </p:nvPicPr>
+        <p:blipFill>
+          <a:blip r:embed="rId3">
+            <a:extLst>
+              <a:ext uri="{28A0092B-C50C-407E-A947-70E740481C1C}">
+                <a14:useLocalDpi xmlns:a14="http://schemas.microsoft.com/office/drawing/2010/main" val="0"/>
+              </a:ext>
+            </a:extLst>
+          </a:blip>
+          <a:srcRect/>
+          <a:stretch>
+            <a:fillRect/>
+          </a:stretch>
+        </p:blipFill>
+        <p:spPr bwMode="auto">
+          <a:xfrm>
+            <a:off x="3356344" y="2264735"/>
+            <a:ext cx="4681870" cy="4681870"/>
+          </a:xfrm>
+          <a:prstGeom prst="rect">
+            <a:avLst/>
+          </a:prstGeom>
+          <a:noFill/>
+          <a:extLst>
+            <a:ext uri="{909E8E84-426E-40DD-AFC4-6F175D3DCCD1}">
+              <a14:hiddenFill xmlns:a14="http://schemas.microsoft.com/office/drawing/2010/main">
+                <a:solidFill>
+                  <a:srgbClr val="FFFFFF"/>
+                </a:solidFill>
+              </a14:hiddenFill>
+            </a:ext>
+          </a:extLst>
+        </p:spPr>
+      </p:pic>
+      <p:cxnSp>
+        <p:nvCxnSpPr>
+          <p:cNvPr id="6" name="Straight Connector 5">
+            <a:extLst>
+              <a:ext uri="{FF2B5EF4-FFF2-40B4-BE49-F238E27FC236}">
+                <a16:creationId xmlns:a16="http://schemas.microsoft.com/office/drawing/2014/main" id="{6BD8E517-B9F9-077D-CF5F-816F56CF960B}"/>
+              </a:ext>
+            </a:extLst>
+          </p:cNvPr>
+          <p:cNvCxnSpPr>
+            <a:cxnSpLocks/>
+          </p:cNvCxnSpPr>
+          <p:nvPr/>
+        </p:nvCxnSpPr>
+        <p:spPr>
+          <a:xfrm flipV="1">
+            <a:off x="3422384" y="1813560"/>
+            <a:ext cx="0" cy="2817510"/>
+          </a:xfrm>
+          <a:prstGeom prst="line">
+            <a:avLst/>
+          </a:prstGeom>
+          <a:ln w="76200">
+            <a:solidFill>
+              <a:schemeClr val="tx1"/>
+            </a:solidFill>
+          </a:ln>
+        </p:spPr>
+        <p:style>
+          <a:lnRef idx="1">
+            <a:schemeClr val="accent1"/>
+          </a:lnRef>
+          <a:fillRef idx="0">
+            <a:schemeClr val="accent1"/>
+          </a:fillRef>
+          <a:effectRef idx="0">
+            <a:schemeClr val="accent1"/>
+          </a:effectRef>
+          <a:fontRef idx="minor">
+            <a:schemeClr val="tx1"/>
+          </a:fontRef>
+        </p:style>
+      </p:cxnSp>
+      <p:cxnSp>
+        <p:nvCxnSpPr>
+          <p:cNvPr id="9" name="Straight Connector 8">
+            <a:extLst>
+              <a:ext uri="{FF2B5EF4-FFF2-40B4-BE49-F238E27FC236}">
+                <a16:creationId xmlns:a16="http://schemas.microsoft.com/office/drawing/2014/main" id="{3111BD52-61FD-0BB5-07AF-D8300E25D6EF}"/>
+              </a:ext>
+            </a:extLst>
+          </p:cNvPr>
+          <p:cNvCxnSpPr>
+            <a:cxnSpLocks/>
+          </p:cNvCxnSpPr>
+          <p:nvPr/>
+        </p:nvCxnSpPr>
+        <p:spPr>
+          <a:xfrm flipV="1">
+            <a:off x="3392221" y="1851035"/>
+            <a:ext cx="646696" cy="1"/>
+          </a:xfrm>
+          <a:prstGeom prst="line">
+            <a:avLst/>
+          </a:prstGeom>
+          <a:ln w="76200">
+            <a:solidFill>
+              <a:schemeClr val="tx1"/>
+            </a:solidFill>
+          </a:ln>
+        </p:spPr>
+        <p:style>
+          <a:lnRef idx="1">
+            <a:schemeClr val="accent1"/>
+          </a:lnRef>
+          <a:fillRef idx="0">
+            <a:schemeClr val="accent1"/>
+          </a:fillRef>
+          <a:effectRef idx="0">
+            <a:schemeClr val="accent1"/>
+          </a:effectRef>
+          <a:fontRef idx="minor">
+            <a:schemeClr val="tx1"/>
+          </a:fontRef>
+        </p:style>
+      </p:cxnSp>
+      <p:cxnSp>
+        <p:nvCxnSpPr>
+          <p:cNvPr id="14" name="Straight Connector 13">
+            <a:extLst>
+              <a:ext uri="{FF2B5EF4-FFF2-40B4-BE49-F238E27FC236}">
+                <a16:creationId xmlns:a16="http://schemas.microsoft.com/office/drawing/2014/main" id="{75F5D0BA-A55E-44E7-0FE9-8D887037FBBA}"/>
+              </a:ext>
+            </a:extLst>
+          </p:cNvPr>
+          <p:cNvCxnSpPr>
+            <a:cxnSpLocks/>
+          </p:cNvCxnSpPr>
+          <p:nvPr/>
+        </p:nvCxnSpPr>
+        <p:spPr>
+          <a:xfrm flipV="1">
+            <a:off x="7968984" y="1813560"/>
+            <a:ext cx="0" cy="2792110"/>
+          </a:xfrm>
+          <a:prstGeom prst="line">
+            <a:avLst/>
+          </a:prstGeom>
+          <a:ln w="76200">
+            <a:solidFill>
+              <a:schemeClr val="tx1"/>
+            </a:solidFill>
+          </a:ln>
+        </p:spPr>
+        <p:style>
+          <a:lnRef idx="1">
+            <a:schemeClr val="accent1"/>
+          </a:lnRef>
+          <a:fillRef idx="0">
+            <a:schemeClr val="accent1"/>
+          </a:fillRef>
+          <a:effectRef idx="0">
+            <a:schemeClr val="accent1"/>
+          </a:effectRef>
+          <a:fontRef idx="minor">
+            <a:schemeClr val="tx1"/>
+          </a:fontRef>
+        </p:style>
+      </p:cxnSp>
+      <p:cxnSp>
+        <p:nvCxnSpPr>
+          <p:cNvPr id="15" name="Straight Connector 14">
+            <a:extLst>
+              <a:ext uri="{FF2B5EF4-FFF2-40B4-BE49-F238E27FC236}">
+                <a16:creationId xmlns:a16="http://schemas.microsoft.com/office/drawing/2014/main" id="{B0BA1B25-A6B2-FBA0-1622-43AEAD26E3CE}"/>
+              </a:ext>
+            </a:extLst>
+          </p:cNvPr>
+          <p:cNvCxnSpPr>
+            <a:cxnSpLocks/>
+          </p:cNvCxnSpPr>
+          <p:nvPr/>
+        </p:nvCxnSpPr>
+        <p:spPr>
+          <a:xfrm flipV="1">
+            <a:off x="7337950" y="1852990"/>
+            <a:ext cx="646696" cy="1"/>
+          </a:xfrm>
+          <a:prstGeom prst="line">
+            <a:avLst/>
+          </a:prstGeom>
+          <a:ln w="76200">
+            <a:solidFill>
+              <a:schemeClr val="tx1"/>
+            </a:solidFill>
+          </a:ln>
+        </p:spPr>
+        <p:style>
+          <a:lnRef idx="1">
+            <a:schemeClr val="accent1"/>
+          </a:lnRef>
+          <a:fillRef idx="0">
+            <a:schemeClr val="accent1"/>
+          </a:fillRef>
+          <a:effectRef idx="0">
+            <a:schemeClr val="accent1"/>
+          </a:effectRef>
+          <a:fontRef idx="minor">
+            <a:schemeClr val="tx1"/>
+          </a:fontRef>
+        </p:style>
+      </p:cxnSp>
+      <mc:AlternateContent xmlns:mc="http://schemas.openxmlformats.org/markup-compatibility/2006">
+        <mc:Choice xmlns:a14="http://schemas.microsoft.com/office/drawing/2010/main" Requires="a14">
+          <p:sp>
+            <p:nvSpPr>
+              <p:cNvPr id="18" name="TextBox 17">
+                <a:extLst>
+                  <a:ext uri="{FF2B5EF4-FFF2-40B4-BE49-F238E27FC236}">
+                    <a16:creationId xmlns:a16="http://schemas.microsoft.com/office/drawing/2014/main" id="{B764BB14-5A4B-C0B1-C96D-49DA88E1AC57}"/>
+                  </a:ext>
+                </a:extLst>
+              </p:cNvPr>
+              <p:cNvSpPr txBox="1"/>
+              <p:nvPr/>
+            </p:nvSpPr>
+            <p:spPr>
+              <a:xfrm>
+                <a:off x="5222598" y="939344"/>
+                <a:ext cx="949362" cy="461665"/>
+              </a:xfrm>
+              <a:prstGeom prst="rect">
+                <a:avLst/>
+              </a:prstGeom>
+              <a:noFill/>
+            </p:spPr>
+            <p:txBody>
+              <a:bodyPr wrap="none" rtlCol="0">
+                <a:spAutoFit/>
+              </a:bodyPr>
+              <a:lstStyle/>
+              <a:p>
+                <a:pPr/>
+                <a14:m>
+                  <m:oMathPara xmlns:m="http://schemas.openxmlformats.org/officeDocument/2006/math">
+                    <m:oMathParaPr>
+                      <m:jc m:val="centerGroup"/>
+                    </m:oMathParaPr>
+                    <m:oMath xmlns:m="http://schemas.openxmlformats.org/officeDocument/2006/math">
+                      <m:r>
+                        <a:rPr lang="en-US" sz="2400" b="0" i="1" smtClean="0">
+                          <a:latin typeface="Cambria Math" panose="02040503050406030204" pitchFamily="18" charset="0"/>
+                        </a:rPr>
+                        <m:t>𝑅</m:t>
+                      </m:r>
+                      <m:r>
+                        <a:rPr lang="en-US" sz="2400" b="0" i="1" smtClean="0">
+                          <a:latin typeface="Cambria Math" panose="02040503050406030204" pitchFamily="18" charset="0"/>
+                        </a:rPr>
+                        <m:t> </m:t>
+                      </m:r>
+                      <m:d>
+                        <m:dPr>
+                          <m:begChr m:val="["/>
+                          <m:endChr m:val="]"/>
+                          <m:ctrlPr>
+                            <a:rPr lang="en-US" sz="2400" b="0" i="1" smtClean="0">
+                              <a:latin typeface="Cambria Math" panose="02040503050406030204" pitchFamily="18" charset="0"/>
+                            </a:rPr>
+                          </m:ctrlPr>
+                        </m:dPr>
+                        <m:e>
+                          <m:r>
+                            <m:rPr>
+                              <m:sty m:val="p"/>
+                            </m:rPr>
+                            <a:rPr lang="en-US" sz="2400" b="0" i="0" smtClean="0">
+                              <a:latin typeface="Cambria Math" panose="02040503050406030204" pitchFamily="18" charset="0"/>
+                            </a:rPr>
+                            <m:t>Ω</m:t>
+                          </m:r>
+                        </m:e>
+                      </m:d>
+                    </m:oMath>
+                  </m:oMathPara>
+                </a14:m>
+                <a:endParaRPr lang="en-US" sz="2400" dirty="0"/>
+              </a:p>
+            </p:txBody>
+          </p:sp>
+        </mc:Choice>
+        <mc:Fallback>
+          <p:sp>
+            <p:nvSpPr>
+              <p:cNvPr id="18" name="TextBox 17">
+                <a:extLst>
+                  <a:ext uri="{FF2B5EF4-FFF2-40B4-BE49-F238E27FC236}">
+                    <a16:creationId xmlns:a16="http://schemas.microsoft.com/office/drawing/2014/main" id="{B764BB14-5A4B-C0B1-C96D-49DA88E1AC57}"/>
+                  </a:ext>
+                </a:extLst>
+              </p:cNvPr>
+              <p:cNvSpPr txBox="1">
+                <a:spLocks noRot="1" noChangeAspect="1" noMove="1" noResize="1" noEditPoints="1" noAdjustHandles="1" noChangeArrowheads="1" noChangeShapeType="1" noTextEdit="1"/>
+              </p:cNvSpPr>
+              <p:nvPr/>
+            </p:nvSpPr>
+            <p:spPr>
+              <a:xfrm>
+                <a:off x="5222598" y="939344"/>
+                <a:ext cx="949362" cy="461665"/>
+              </a:xfrm>
+              <a:prstGeom prst="rect">
+                <a:avLst/>
+              </a:prstGeom>
+              <a:blipFill>
+                <a:blip r:embed="rId4"/>
+                <a:stretch>
+                  <a:fillRect/>
+                </a:stretch>
+              </a:blipFill>
+            </p:spPr>
+            <p:txBody>
+              <a:bodyPr/>
+              <a:lstStyle/>
+              <a:p>
+                <a:r>
+                  <a:rPr lang="en-US">
+                    <a:noFill/>
+                  </a:rPr>
+                  <a:t> </a:t>
+                </a:r>
+              </a:p>
+            </p:txBody>
+          </p:sp>
+        </mc:Fallback>
+      </mc:AlternateContent>
+      <mc:AlternateContent xmlns:mc="http://schemas.openxmlformats.org/markup-compatibility/2006">
+        <mc:Choice xmlns:a14="http://schemas.microsoft.com/office/drawing/2010/main" Requires="a14">
+          <p:sp>
+            <p:nvSpPr>
+              <p:cNvPr id="19" name="TextBox 18">
+                <a:extLst>
+                  <a:ext uri="{FF2B5EF4-FFF2-40B4-BE49-F238E27FC236}">
+                    <a16:creationId xmlns:a16="http://schemas.microsoft.com/office/drawing/2014/main" id="{7F73BA4B-8594-4A87-A2AC-DAF34194735E}"/>
+                  </a:ext>
+                </a:extLst>
+              </p:cNvPr>
+              <p:cNvSpPr txBox="1"/>
+              <p:nvPr/>
+            </p:nvSpPr>
+            <p:spPr>
+              <a:xfrm>
+                <a:off x="5222598" y="3429000"/>
+                <a:ext cx="899349" cy="461665"/>
+              </a:xfrm>
+              <a:prstGeom prst="rect">
+                <a:avLst/>
+              </a:prstGeom>
+              <a:noFill/>
+            </p:spPr>
+            <p:txBody>
+              <a:bodyPr wrap="none" rtlCol="0">
+                <a:spAutoFit/>
+              </a:bodyPr>
+              <a:lstStyle/>
+              <a:p>
+                <a:pPr/>
+                <a14:m>
+                  <m:oMathPara xmlns:m="http://schemas.openxmlformats.org/officeDocument/2006/math">
+                    <m:oMathParaPr>
+                      <m:jc m:val="centerGroup"/>
+                    </m:oMathParaPr>
+                    <m:oMath xmlns:m="http://schemas.openxmlformats.org/officeDocument/2006/math">
+                      <m:r>
+                        <a:rPr lang="en-US" sz="2400" b="0" i="1" smtClean="0">
+                          <a:latin typeface="Cambria Math" panose="02040503050406030204" pitchFamily="18" charset="0"/>
+                        </a:rPr>
+                        <m:t>𝐶</m:t>
+                      </m:r>
+                      <m:r>
+                        <a:rPr lang="en-US" sz="2400" b="0" i="1" smtClean="0">
+                          <a:latin typeface="Cambria Math" panose="02040503050406030204" pitchFamily="18" charset="0"/>
+                        </a:rPr>
+                        <m:t> </m:t>
+                      </m:r>
+                      <m:d>
+                        <m:dPr>
+                          <m:begChr m:val="["/>
+                          <m:endChr m:val="]"/>
+                          <m:ctrlPr>
+                            <a:rPr lang="en-US" sz="2400" b="0" i="1" smtClean="0">
+                              <a:latin typeface="Cambria Math" panose="02040503050406030204" pitchFamily="18" charset="0"/>
+                            </a:rPr>
+                          </m:ctrlPr>
+                        </m:dPr>
+                        <m:e>
+                          <m:r>
+                            <m:rPr>
+                              <m:sty m:val="p"/>
+                            </m:rPr>
+                            <a:rPr lang="en-US" sz="2400" b="0" i="0" smtClean="0">
+                              <a:latin typeface="Cambria Math" panose="02040503050406030204" pitchFamily="18" charset="0"/>
+                            </a:rPr>
+                            <m:t>F</m:t>
+                          </m:r>
+                        </m:e>
+                      </m:d>
+                    </m:oMath>
+                  </m:oMathPara>
+                </a14:m>
+                <a:endParaRPr lang="en-US" sz="2400" dirty="0"/>
+              </a:p>
+            </p:txBody>
+          </p:sp>
+        </mc:Choice>
+        <mc:Fallback>
+          <p:sp>
+            <p:nvSpPr>
+              <p:cNvPr id="19" name="TextBox 18">
+                <a:extLst>
+                  <a:ext uri="{FF2B5EF4-FFF2-40B4-BE49-F238E27FC236}">
+                    <a16:creationId xmlns:a16="http://schemas.microsoft.com/office/drawing/2014/main" id="{7F73BA4B-8594-4A87-A2AC-DAF34194735E}"/>
+                  </a:ext>
+                </a:extLst>
+              </p:cNvPr>
+              <p:cNvSpPr txBox="1">
+                <a:spLocks noRot="1" noChangeAspect="1" noMove="1" noResize="1" noEditPoints="1" noAdjustHandles="1" noChangeArrowheads="1" noChangeShapeType="1" noTextEdit="1"/>
+              </p:cNvSpPr>
+              <p:nvPr/>
+            </p:nvSpPr>
+            <p:spPr>
+              <a:xfrm>
+                <a:off x="5222598" y="3429000"/>
+                <a:ext cx="899349" cy="461665"/>
+              </a:xfrm>
+              <a:prstGeom prst="rect">
+                <a:avLst/>
+              </a:prstGeom>
+              <a:blipFill>
+                <a:blip r:embed="rId5"/>
+                <a:stretch>
+                  <a:fillRect/>
+                </a:stretch>
+              </a:blipFill>
+            </p:spPr>
+            <p:txBody>
+              <a:bodyPr/>
+              <a:lstStyle/>
+              <a:p>
+                <a:r>
+                  <a:rPr lang="en-US">
+                    <a:noFill/>
+                  </a:rPr>
+                  <a:t> </a:t>
+                </a:r>
+              </a:p>
+            </p:txBody>
+          </p:sp>
+        </mc:Fallback>
+      </mc:AlternateContent>
+      <mc:AlternateContent xmlns:mc="http://schemas.openxmlformats.org/markup-compatibility/2006">
+        <mc:Choice xmlns:a14="http://schemas.microsoft.com/office/drawing/2010/main" Requires="a14">
+          <p:sp>
+            <p:nvSpPr>
+              <p:cNvPr id="21" name="TextBox 20">
+                <a:extLst>
+                  <a:ext uri="{FF2B5EF4-FFF2-40B4-BE49-F238E27FC236}">
+                    <a16:creationId xmlns:a16="http://schemas.microsoft.com/office/drawing/2014/main" id="{A75D3144-FF87-F3E6-79BD-235911E4CB31}"/>
+                  </a:ext>
+                </a:extLst>
+              </p:cNvPr>
+              <p:cNvSpPr txBox="1"/>
+              <p:nvPr/>
+            </p:nvSpPr>
+            <p:spPr>
+              <a:xfrm>
+                <a:off x="6193457" y="4058476"/>
+                <a:ext cx="1208985" cy="461665"/>
+              </a:xfrm>
+              <a:prstGeom prst="rect">
+                <a:avLst/>
+              </a:prstGeom>
+              <a:noFill/>
+            </p:spPr>
+            <p:txBody>
+              <a:bodyPr wrap="none" rtlCol="0">
+                <a:spAutoFit/>
+              </a:bodyPr>
+              <a:lstStyle/>
+              <a:p>
+                <a14:m>
+                  <m:oMath xmlns:m="http://schemas.openxmlformats.org/officeDocument/2006/math">
+                    <m:sSub>
+                      <m:sSubPr>
+                        <m:ctrlPr>
+                          <a:rPr lang="en-US" sz="2400" b="0" i="1" smtClean="0">
+                            <a:latin typeface="Cambria Math" panose="02040503050406030204" pitchFamily="18" charset="0"/>
+                          </a:rPr>
+                        </m:ctrlPr>
+                      </m:sSubPr>
+                      <m:e>
+                        <m:r>
+                          <a:rPr lang="en-US" sz="2400" b="0" i="1" smtClean="0">
+                            <a:latin typeface="Cambria Math" panose="02040503050406030204" pitchFamily="18" charset="0"/>
+                          </a:rPr>
+                          <m:t>𝐼</m:t>
+                        </m:r>
+                      </m:e>
+                      <m:sub>
+                        <m:r>
+                          <m:rPr>
+                            <m:sty m:val="p"/>
+                          </m:rPr>
+                          <a:rPr lang="en-US" sz="2400" b="0" i="0" smtClean="0">
+                            <a:latin typeface="Cambria Math" panose="02040503050406030204" pitchFamily="18" charset="0"/>
+                          </a:rPr>
+                          <m:t>out</m:t>
+                        </m:r>
+                      </m:sub>
+                    </m:sSub>
+                    <m:r>
+                      <a:rPr lang="en-US" sz="2400" b="0" i="1" smtClean="0">
+                        <a:latin typeface="Cambria Math" panose="02040503050406030204" pitchFamily="18" charset="0"/>
+                      </a:rPr>
+                      <m:t> </m:t>
+                    </m:r>
+                    <m:d>
+                      <m:dPr>
+                        <m:begChr m:val="["/>
+                        <m:endChr m:val="]"/>
+                        <m:ctrlPr>
+                          <a:rPr lang="en-US" sz="2400" b="0" smtClean="0">
+                            <a:latin typeface="Cambria Math" panose="02040503050406030204" pitchFamily="18" charset="0"/>
+                          </a:rPr>
+                        </m:ctrlPr>
+                      </m:dPr>
+                      <m:e>
+                        <m:r>
+                          <m:rPr>
+                            <m:sty m:val="p"/>
+                          </m:rPr>
+                          <a:rPr lang="en-US" sz="2400" b="0" i="0" smtClean="0">
+                            <a:latin typeface="Cambria Math" panose="02040503050406030204" pitchFamily="18" charset="0"/>
+                          </a:rPr>
+                          <m:t>A</m:t>
+                        </m:r>
+                      </m:e>
+                    </m:d>
+                  </m:oMath>
+                </a14:m>
+                <a:r>
+                  <a:rPr lang="en-US" sz="2400" dirty="0"/>
+                  <a:t> </a:t>
+                </a:r>
+              </a:p>
+            </p:txBody>
+          </p:sp>
+        </mc:Choice>
+        <mc:Fallback>
+          <p:sp>
+            <p:nvSpPr>
+              <p:cNvPr id="21" name="TextBox 20">
+                <a:extLst>
+                  <a:ext uri="{FF2B5EF4-FFF2-40B4-BE49-F238E27FC236}">
+                    <a16:creationId xmlns:a16="http://schemas.microsoft.com/office/drawing/2014/main" id="{A75D3144-FF87-F3E6-79BD-235911E4CB31}"/>
+                  </a:ext>
+                </a:extLst>
+              </p:cNvPr>
+              <p:cNvSpPr txBox="1">
+                <a:spLocks noRot="1" noChangeAspect="1" noMove="1" noResize="1" noEditPoints="1" noAdjustHandles="1" noChangeArrowheads="1" noChangeShapeType="1" noTextEdit="1"/>
+              </p:cNvSpPr>
+              <p:nvPr/>
+            </p:nvSpPr>
+            <p:spPr>
+              <a:xfrm>
+                <a:off x="6193457" y="4058476"/>
+                <a:ext cx="1208985" cy="461665"/>
+              </a:xfrm>
+              <a:prstGeom prst="rect">
+                <a:avLst/>
+              </a:prstGeom>
+              <a:blipFill>
+                <a:blip r:embed="rId6"/>
+                <a:stretch>
+                  <a:fillRect l="-1515" b="-1333"/>
+                </a:stretch>
+              </a:blipFill>
+            </p:spPr>
+            <p:txBody>
+              <a:bodyPr/>
+              <a:lstStyle/>
+              <a:p>
+                <a:r>
+                  <a:rPr lang="en-US">
+                    <a:noFill/>
+                  </a:rPr>
+                  <a:t> </a:t>
+                </a:r>
+              </a:p>
+            </p:txBody>
+          </p:sp>
+        </mc:Fallback>
+      </mc:AlternateContent>
+      <p:cxnSp>
+        <p:nvCxnSpPr>
+          <p:cNvPr id="23" name="Straight Arrow Connector 22">
+            <a:extLst>
+              <a:ext uri="{FF2B5EF4-FFF2-40B4-BE49-F238E27FC236}">
+                <a16:creationId xmlns:a16="http://schemas.microsoft.com/office/drawing/2014/main" id="{3F91AA7F-B25A-A729-F680-BCA8DB913027}"/>
+              </a:ext>
+            </a:extLst>
+          </p:cNvPr>
+          <p:cNvCxnSpPr/>
+          <p:nvPr/>
+        </p:nvCxnSpPr>
+        <p:spPr>
+          <a:xfrm>
+            <a:off x="6193457" y="4809270"/>
+            <a:ext cx="1165990" cy="0"/>
+          </a:xfrm>
+          <a:prstGeom prst="straightConnector1">
+            <a:avLst/>
+          </a:prstGeom>
+          <a:ln w="76200">
+            <a:solidFill>
+              <a:srgbClr val="FF0000"/>
+            </a:solidFill>
+            <a:tailEnd type="triangle"/>
+          </a:ln>
+        </p:spPr>
+        <p:style>
+          <a:lnRef idx="1">
+            <a:schemeClr val="accent1"/>
+          </a:lnRef>
+          <a:fillRef idx="0">
+            <a:schemeClr val="accent1"/>
+          </a:fillRef>
+          <a:effectRef idx="0">
+            <a:schemeClr val="accent1"/>
+          </a:effectRef>
+          <a:fontRef idx="minor">
+            <a:schemeClr val="tx1"/>
+          </a:fontRef>
+        </p:style>
+      </p:cxnSp>
+    </p:spTree>
+    <p:extLst>
+      <p:ext uri="{BB962C8B-B14F-4D97-AF65-F5344CB8AC3E}">
+        <p14:creationId xmlns:p14="http://schemas.microsoft.com/office/powerpoint/2010/main" val="2632209912"/>
+      </p:ext>
+    </p:extLst>
+  </p:cSld>
+  <p:clrMapOvr>
+    <a:masterClrMapping/>
+  </p:clrMapOvr>
+</p:sld>
+</file>
+
+<file path=ppt/slides/slide4.xml><?xml version="1.0" encoding="utf-8"?>
+<p:sld xmlns:a="http://schemas.openxmlformats.org/drawingml/2006/main" xmlns:r="http://schemas.openxmlformats.org/officeDocument/2006/relationships" xmlns:p="http://schemas.openxmlformats.org/presentationml/2006/main">
+  <p:cSld>
+    <p:spTree>
+      <p:nvGrpSpPr>
+        <p:cNvPr id="1" name=""/>
+        <p:cNvGrpSpPr/>
+        <p:nvPr/>
+      </p:nvGrpSpPr>
+      <p:grpSpPr>
+        <a:xfrm>
+          <a:off x="0" y="0"/>
+          <a:ext cx="0" cy="0"/>
+          <a:chOff x="0" y="0"/>
+          <a:chExt cx="0" cy="0"/>
+        </a:xfrm>
+      </p:grpSpPr>
+      <p:pic>
+        <p:nvPicPr>
+          <p:cNvPr id="1026" name="Picture 2">
+            <a:extLst>
+              <a:ext uri="{FF2B5EF4-FFF2-40B4-BE49-F238E27FC236}">
+                <a16:creationId xmlns:a16="http://schemas.microsoft.com/office/drawing/2014/main" id="{BADF2781-01DB-ECB2-DED2-18C575CD872E}"/>
+              </a:ext>
+            </a:extLst>
+          </p:cNvPr>
+          <p:cNvPicPr>
+            <a:picLocks noChangeAspect="1" noChangeArrowheads="1"/>
+          </p:cNvPicPr>
+          <p:nvPr/>
+        </p:nvPicPr>
+        <p:blipFill>
+          <a:blip r:embed="rId2">
+            <a:extLst>
+              <a:ext uri="{28A0092B-C50C-407E-A947-70E740481C1C}">
+                <a14:useLocalDpi xmlns:a14="http://schemas.microsoft.com/office/drawing/2010/main" val="0"/>
+              </a:ext>
+            </a:extLst>
+          </a:blip>
+          <a:srcRect/>
+          <a:stretch>
+            <a:fillRect/>
+          </a:stretch>
+        </p:blipFill>
+        <p:spPr bwMode="auto">
+          <a:xfrm>
+            <a:off x="3058524" y="838748"/>
+            <a:ext cx="5277510" cy="2024574"/>
+          </a:xfrm>
+          <a:prstGeom prst="rect">
+            <a:avLst/>
+          </a:prstGeom>
+          <a:noFill/>
+          <a:extLst>
+            <a:ext uri="{909E8E84-426E-40DD-AFC4-6F175D3DCCD1}">
+              <a14:hiddenFill xmlns:a14="http://schemas.microsoft.com/office/drawing/2010/main">
+                <a:solidFill>
+                  <a:srgbClr val="FFFFFF"/>
+                </a:solidFill>
+              </a14:hiddenFill>
+            </a:ext>
+          </a:extLst>
+        </p:spPr>
+      </p:pic>
+      <p:pic>
+        <p:nvPicPr>
+          <p:cNvPr id="1028" name="Picture 4" descr="RSA electronics capacitor symbol vector image | Free SVG">
+            <a:extLst>
+              <a:ext uri="{FF2B5EF4-FFF2-40B4-BE49-F238E27FC236}">
+                <a16:creationId xmlns:a16="http://schemas.microsoft.com/office/drawing/2014/main" id="{FEB39592-B964-038C-8426-B3AFF0F1241F}"/>
+              </a:ext>
+            </a:extLst>
+          </p:cNvPr>
+          <p:cNvPicPr>
+            <a:picLocks noChangeAspect="1" noChangeArrowheads="1"/>
+          </p:cNvPicPr>
+          <p:nvPr/>
+        </p:nvPicPr>
+        <p:blipFill>
+          <a:blip r:embed="rId3">
+            <a:extLst>
+              <a:ext uri="{28A0092B-C50C-407E-A947-70E740481C1C}">
+                <a14:useLocalDpi xmlns:a14="http://schemas.microsoft.com/office/drawing/2010/main" val="0"/>
+              </a:ext>
+            </a:extLst>
+          </a:blip>
+          <a:srcRect/>
+          <a:stretch>
+            <a:fillRect/>
+          </a:stretch>
+        </p:blipFill>
+        <p:spPr bwMode="auto">
+          <a:xfrm>
+            <a:off x="3356344" y="2264735"/>
+            <a:ext cx="4681870" cy="4681870"/>
+          </a:xfrm>
+          <a:prstGeom prst="rect">
+            <a:avLst/>
+          </a:prstGeom>
+          <a:noFill/>
+          <a:extLst>
+            <a:ext uri="{909E8E84-426E-40DD-AFC4-6F175D3DCCD1}">
+              <a14:hiddenFill xmlns:a14="http://schemas.microsoft.com/office/drawing/2010/main">
+                <a:solidFill>
+                  <a:srgbClr val="FFFFFF"/>
+                </a:solidFill>
+              </a14:hiddenFill>
+            </a:ext>
+          </a:extLst>
+        </p:spPr>
+      </p:pic>
+      <p:cxnSp>
+        <p:nvCxnSpPr>
+          <p:cNvPr id="6" name="Straight Connector 5">
+            <a:extLst>
+              <a:ext uri="{FF2B5EF4-FFF2-40B4-BE49-F238E27FC236}">
+                <a16:creationId xmlns:a16="http://schemas.microsoft.com/office/drawing/2014/main" id="{6BD8E517-B9F9-077D-CF5F-816F56CF960B}"/>
+              </a:ext>
+            </a:extLst>
+          </p:cNvPr>
+          <p:cNvCxnSpPr>
+            <a:cxnSpLocks/>
+          </p:cNvCxnSpPr>
+          <p:nvPr/>
+        </p:nvCxnSpPr>
+        <p:spPr>
+          <a:xfrm flipV="1">
+            <a:off x="3422384" y="1813560"/>
+            <a:ext cx="0" cy="692573"/>
+          </a:xfrm>
+          <a:prstGeom prst="line">
+            <a:avLst/>
+          </a:prstGeom>
+          <a:ln w="76200">
+            <a:solidFill>
+              <a:schemeClr val="tx1"/>
+            </a:solidFill>
+          </a:ln>
+        </p:spPr>
+        <p:style>
+          <a:lnRef idx="1">
+            <a:schemeClr val="accent1"/>
+          </a:lnRef>
+          <a:fillRef idx="0">
+            <a:schemeClr val="accent1"/>
+          </a:fillRef>
+          <a:effectRef idx="0">
+            <a:schemeClr val="accent1"/>
+          </a:effectRef>
+          <a:fontRef idx="minor">
+            <a:schemeClr val="tx1"/>
+          </a:fontRef>
+        </p:style>
+      </p:cxnSp>
+      <p:cxnSp>
+        <p:nvCxnSpPr>
+          <p:cNvPr id="9" name="Straight Connector 8">
+            <a:extLst>
+              <a:ext uri="{FF2B5EF4-FFF2-40B4-BE49-F238E27FC236}">
+                <a16:creationId xmlns:a16="http://schemas.microsoft.com/office/drawing/2014/main" id="{3111BD52-61FD-0BB5-07AF-D8300E25D6EF}"/>
+              </a:ext>
+            </a:extLst>
+          </p:cNvPr>
+          <p:cNvCxnSpPr>
+            <a:cxnSpLocks/>
+          </p:cNvCxnSpPr>
+          <p:nvPr/>
+        </p:nvCxnSpPr>
+        <p:spPr>
+          <a:xfrm flipV="1">
+            <a:off x="3392221" y="1851035"/>
+            <a:ext cx="646696" cy="1"/>
+          </a:xfrm>
+          <a:prstGeom prst="line">
+            <a:avLst/>
+          </a:prstGeom>
+          <a:ln w="76200">
+            <a:solidFill>
+              <a:schemeClr val="tx1"/>
+            </a:solidFill>
+          </a:ln>
+        </p:spPr>
+        <p:style>
+          <a:lnRef idx="1">
+            <a:schemeClr val="accent1"/>
+          </a:lnRef>
+          <a:fillRef idx="0">
+            <a:schemeClr val="accent1"/>
+          </a:fillRef>
+          <a:effectRef idx="0">
+            <a:schemeClr val="accent1"/>
+          </a:effectRef>
+          <a:fontRef idx="minor">
+            <a:schemeClr val="tx1"/>
+          </a:fontRef>
+        </p:style>
+      </p:cxnSp>
+      <p:cxnSp>
+        <p:nvCxnSpPr>
+          <p:cNvPr id="14" name="Straight Connector 13">
+            <a:extLst>
+              <a:ext uri="{FF2B5EF4-FFF2-40B4-BE49-F238E27FC236}">
+                <a16:creationId xmlns:a16="http://schemas.microsoft.com/office/drawing/2014/main" id="{75F5D0BA-A55E-44E7-0FE9-8D887037FBBA}"/>
+              </a:ext>
+            </a:extLst>
+          </p:cNvPr>
+          <p:cNvCxnSpPr>
+            <a:cxnSpLocks/>
+          </p:cNvCxnSpPr>
+          <p:nvPr/>
+        </p:nvCxnSpPr>
+        <p:spPr>
+          <a:xfrm flipV="1">
+            <a:off x="7968984" y="1813560"/>
+            <a:ext cx="0" cy="2792110"/>
+          </a:xfrm>
+          <a:prstGeom prst="line">
+            <a:avLst/>
+          </a:prstGeom>
+          <a:ln w="76200">
+            <a:solidFill>
+              <a:schemeClr val="tx1"/>
+            </a:solidFill>
+          </a:ln>
+        </p:spPr>
+        <p:style>
+          <a:lnRef idx="1">
+            <a:schemeClr val="accent1"/>
+          </a:lnRef>
+          <a:fillRef idx="0">
+            <a:schemeClr val="accent1"/>
+          </a:fillRef>
+          <a:effectRef idx="0">
+            <a:schemeClr val="accent1"/>
+          </a:effectRef>
+          <a:fontRef idx="minor">
+            <a:schemeClr val="tx1"/>
+          </a:fontRef>
+        </p:style>
+      </p:cxnSp>
+      <p:cxnSp>
+        <p:nvCxnSpPr>
+          <p:cNvPr id="15" name="Straight Connector 14">
+            <a:extLst>
+              <a:ext uri="{FF2B5EF4-FFF2-40B4-BE49-F238E27FC236}">
+                <a16:creationId xmlns:a16="http://schemas.microsoft.com/office/drawing/2014/main" id="{B0BA1B25-A6B2-FBA0-1622-43AEAD26E3CE}"/>
+              </a:ext>
+            </a:extLst>
+          </p:cNvPr>
+          <p:cNvCxnSpPr>
+            <a:cxnSpLocks/>
+          </p:cNvCxnSpPr>
+          <p:nvPr/>
+        </p:nvCxnSpPr>
+        <p:spPr>
+          <a:xfrm flipV="1">
+            <a:off x="7337950" y="1852990"/>
+            <a:ext cx="646696" cy="1"/>
+          </a:xfrm>
+          <a:prstGeom prst="line">
+            <a:avLst/>
+          </a:prstGeom>
+          <a:ln w="76200">
+            <a:solidFill>
+              <a:schemeClr val="tx1"/>
+            </a:solidFill>
+          </a:ln>
+        </p:spPr>
+        <p:style>
+          <a:lnRef idx="1">
+            <a:schemeClr val="accent1"/>
+          </a:lnRef>
+          <a:fillRef idx="0">
+            <a:schemeClr val="accent1"/>
+          </a:fillRef>
+          <a:effectRef idx="0">
+            <a:schemeClr val="accent1"/>
+          </a:effectRef>
+          <a:fontRef idx="minor">
+            <a:schemeClr val="tx1"/>
+          </a:fontRef>
+        </p:style>
+      </p:cxnSp>
+      <mc:AlternateContent xmlns:mc="http://schemas.openxmlformats.org/markup-compatibility/2006">
+        <mc:Choice xmlns:a14="http://schemas.microsoft.com/office/drawing/2010/main" Requires="a14">
+          <p:sp>
+            <p:nvSpPr>
+              <p:cNvPr id="18" name="TextBox 17">
+                <a:extLst>
+                  <a:ext uri="{FF2B5EF4-FFF2-40B4-BE49-F238E27FC236}">
+                    <a16:creationId xmlns:a16="http://schemas.microsoft.com/office/drawing/2014/main" id="{B764BB14-5A4B-C0B1-C96D-49DA88E1AC57}"/>
+                  </a:ext>
+                </a:extLst>
+              </p:cNvPr>
+              <p:cNvSpPr txBox="1"/>
+              <p:nvPr/>
+            </p:nvSpPr>
+            <p:spPr>
+              <a:xfrm>
+                <a:off x="5222598" y="939344"/>
+                <a:ext cx="949362" cy="461665"/>
+              </a:xfrm>
+              <a:prstGeom prst="rect">
+                <a:avLst/>
+              </a:prstGeom>
+              <a:noFill/>
+            </p:spPr>
+            <p:txBody>
+              <a:bodyPr wrap="none" rtlCol="0">
+                <a:spAutoFit/>
+              </a:bodyPr>
+              <a:lstStyle/>
+              <a:p>
+                <a:pPr/>
+                <a14:m>
+                  <m:oMathPara xmlns:m="http://schemas.openxmlformats.org/officeDocument/2006/math">
+                    <m:oMathParaPr>
+                      <m:jc m:val="centerGroup"/>
+                    </m:oMathParaPr>
+                    <m:oMath xmlns:m="http://schemas.openxmlformats.org/officeDocument/2006/math">
+                      <m:r>
+                        <a:rPr lang="en-US" sz="2400" b="0" i="1" smtClean="0">
+                          <a:latin typeface="Cambria Math" panose="02040503050406030204" pitchFamily="18" charset="0"/>
+                        </a:rPr>
+                        <m:t>𝑅</m:t>
+                      </m:r>
+                      <m:r>
+                        <a:rPr lang="en-US" sz="2400" b="0" i="1" smtClean="0">
+                          <a:latin typeface="Cambria Math" panose="02040503050406030204" pitchFamily="18" charset="0"/>
+                        </a:rPr>
+                        <m:t> </m:t>
+                      </m:r>
+                      <m:d>
+                        <m:dPr>
+                          <m:begChr m:val="["/>
+                          <m:endChr m:val="]"/>
+                          <m:ctrlPr>
+                            <a:rPr lang="en-US" sz="2400" b="0" i="1" smtClean="0">
+                              <a:latin typeface="Cambria Math" panose="02040503050406030204" pitchFamily="18" charset="0"/>
+                            </a:rPr>
+                          </m:ctrlPr>
+                        </m:dPr>
+                        <m:e>
+                          <m:r>
+                            <m:rPr>
+                              <m:sty m:val="p"/>
+                            </m:rPr>
+                            <a:rPr lang="en-US" sz="2400" b="0" i="0" smtClean="0">
+                              <a:latin typeface="Cambria Math" panose="02040503050406030204" pitchFamily="18" charset="0"/>
+                            </a:rPr>
+                            <m:t>Ω</m:t>
+                          </m:r>
+                        </m:e>
+                      </m:d>
+                    </m:oMath>
+                  </m:oMathPara>
+                </a14:m>
+                <a:endParaRPr lang="en-US" sz="2400" dirty="0"/>
+              </a:p>
+            </p:txBody>
+          </p:sp>
+        </mc:Choice>
+        <mc:Fallback>
+          <p:sp>
+            <p:nvSpPr>
+              <p:cNvPr id="18" name="TextBox 17">
+                <a:extLst>
+                  <a:ext uri="{FF2B5EF4-FFF2-40B4-BE49-F238E27FC236}">
+                    <a16:creationId xmlns:a16="http://schemas.microsoft.com/office/drawing/2014/main" id="{B764BB14-5A4B-C0B1-C96D-49DA88E1AC57}"/>
+                  </a:ext>
+                </a:extLst>
+              </p:cNvPr>
+              <p:cNvSpPr txBox="1">
+                <a:spLocks noRot="1" noChangeAspect="1" noMove="1" noResize="1" noEditPoints="1" noAdjustHandles="1" noChangeArrowheads="1" noChangeShapeType="1" noTextEdit="1"/>
+              </p:cNvSpPr>
+              <p:nvPr/>
+            </p:nvSpPr>
+            <p:spPr>
+              <a:xfrm>
+                <a:off x="5222598" y="939344"/>
+                <a:ext cx="949362" cy="461665"/>
+              </a:xfrm>
+              <a:prstGeom prst="rect">
+                <a:avLst/>
+              </a:prstGeom>
+              <a:blipFill>
+                <a:blip r:embed="rId4"/>
+                <a:stretch>
+                  <a:fillRect/>
+                </a:stretch>
+              </a:blipFill>
+            </p:spPr>
+            <p:txBody>
+              <a:bodyPr/>
+              <a:lstStyle/>
+              <a:p>
+                <a:r>
+                  <a:rPr lang="en-US">
+                    <a:noFill/>
+                  </a:rPr>
+                  <a:t> </a:t>
+                </a:r>
+              </a:p>
+            </p:txBody>
+          </p:sp>
+        </mc:Fallback>
+      </mc:AlternateContent>
+      <mc:AlternateContent xmlns:mc="http://schemas.openxmlformats.org/markup-compatibility/2006">
+        <mc:Choice xmlns:a14="http://schemas.microsoft.com/office/drawing/2010/main" Requires="a14">
+          <p:sp>
+            <p:nvSpPr>
+              <p:cNvPr id="19" name="TextBox 18">
+                <a:extLst>
+                  <a:ext uri="{FF2B5EF4-FFF2-40B4-BE49-F238E27FC236}">
+                    <a16:creationId xmlns:a16="http://schemas.microsoft.com/office/drawing/2014/main" id="{7F73BA4B-8594-4A87-A2AC-DAF34194735E}"/>
+                  </a:ext>
+                </a:extLst>
+              </p:cNvPr>
+              <p:cNvSpPr txBox="1"/>
+              <p:nvPr/>
+            </p:nvSpPr>
+            <p:spPr>
+              <a:xfrm>
+                <a:off x="5222598" y="3429000"/>
+                <a:ext cx="899349" cy="461665"/>
+              </a:xfrm>
+              <a:prstGeom prst="rect">
+                <a:avLst/>
+              </a:prstGeom>
+              <a:noFill/>
+            </p:spPr>
+            <p:txBody>
+              <a:bodyPr wrap="none" rtlCol="0">
+                <a:spAutoFit/>
+              </a:bodyPr>
+              <a:lstStyle/>
+              <a:p>
+                <a:pPr/>
+                <a14:m>
+                  <m:oMathPara xmlns:m="http://schemas.openxmlformats.org/officeDocument/2006/math">
+                    <m:oMathParaPr>
+                      <m:jc m:val="centerGroup"/>
+                    </m:oMathParaPr>
+                    <m:oMath xmlns:m="http://schemas.openxmlformats.org/officeDocument/2006/math">
+                      <m:r>
+                        <a:rPr lang="en-US" sz="2400" b="0" i="1" smtClean="0">
+                          <a:latin typeface="Cambria Math" panose="02040503050406030204" pitchFamily="18" charset="0"/>
+                        </a:rPr>
+                        <m:t>𝐶</m:t>
+                      </m:r>
+                      <m:r>
+                        <a:rPr lang="en-US" sz="2400" b="0" i="1" smtClean="0">
+                          <a:latin typeface="Cambria Math" panose="02040503050406030204" pitchFamily="18" charset="0"/>
+                        </a:rPr>
+                        <m:t> </m:t>
+                      </m:r>
+                      <m:d>
+                        <m:dPr>
+                          <m:begChr m:val="["/>
+                          <m:endChr m:val="]"/>
+                          <m:ctrlPr>
+                            <a:rPr lang="en-US" sz="2400" b="0" i="1" smtClean="0">
+                              <a:latin typeface="Cambria Math" panose="02040503050406030204" pitchFamily="18" charset="0"/>
+                            </a:rPr>
+                          </m:ctrlPr>
+                        </m:dPr>
+                        <m:e>
+                          <m:r>
+                            <m:rPr>
+                              <m:sty m:val="p"/>
+                            </m:rPr>
+                            <a:rPr lang="en-US" sz="2400" b="0" i="0" smtClean="0">
+                              <a:latin typeface="Cambria Math" panose="02040503050406030204" pitchFamily="18" charset="0"/>
+                            </a:rPr>
+                            <m:t>F</m:t>
+                          </m:r>
+                        </m:e>
+                      </m:d>
+                    </m:oMath>
+                  </m:oMathPara>
+                </a14:m>
+                <a:endParaRPr lang="en-US" sz="2400" dirty="0"/>
+              </a:p>
+            </p:txBody>
+          </p:sp>
+        </mc:Choice>
+        <mc:Fallback>
+          <p:sp>
+            <p:nvSpPr>
+              <p:cNvPr id="19" name="TextBox 18">
+                <a:extLst>
+                  <a:ext uri="{FF2B5EF4-FFF2-40B4-BE49-F238E27FC236}">
+                    <a16:creationId xmlns:a16="http://schemas.microsoft.com/office/drawing/2014/main" id="{7F73BA4B-8594-4A87-A2AC-DAF34194735E}"/>
+                  </a:ext>
+                </a:extLst>
+              </p:cNvPr>
+              <p:cNvSpPr txBox="1">
+                <a:spLocks noRot="1" noChangeAspect="1" noMove="1" noResize="1" noEditPoints="1" noAdjustHandles="1" noChangeArrowheads="1" noChangeShapeType="1" noTextEdit="1"/>
+              </p:cNvSpPr>
+              <p:nvPr/>
+            </p:nvSpPr>
+            <p:spPr>
+              <a:xfrm>
+                <a:off x="5222598" y="3429000"/>
+                <a:ext cx="899349" cy="461665"/>
+              </a:xfrm>
+              <a:prstGeom prst="rect">
+                <a:avLst/>
+              </a:prstGeom>
+              <a:blipFill>
+                <a:blip r:embed="rId5"/>
+                <a:stretch>
+                  <a:fillRect/>
+                </a:stretch>
+              </a:blipFill>
+            </p:spPr>
+            <p:txBody>
+              <a:bodyPr/>
+              <a:lstStyle/>
+              <a:p>
+                <a:r>
+                  <a:rPr lang="en-US">
+                    <a:noFill/>
+                  </a:rPr>
+                  <a:t> </a:t>
+                </a:r>
+              </a:p>
+            </p:txBody>
+          </p:sp>
+        </mc:Fallback>
+      </mc:AlternateContent>
+      <p:pic>
+        <p:nvPicPr>
+          <p:cNvPr id="2050" name="Picture 2">
+            <a:extLst>
+              <a:ext uri="{FF2B5EF4-FFF2-40B4-BE49-F238E27FC236}">
+                <a16:creationId xmlns:a16="http://schemas.microsoft.com/office/drawing/2014/main" id="{F4E2E095-B271-0387-FF38-94AB989391EC}"/>
+              </a:ext>
+            </a:extLst>
+          </p:cNvPr>
+          <p:cNvPicPr>
+            <a:picLocks noChangeAspect="1" noChangeArrowheads="1"/>
+          </p:cNvPicPr>
+          <p:nvPr/>
+        </p:nvPicPr>
+        <p:blipFill>
+          <a:blip r:embed="rId6">
+            <a:extLst>
+              <a:ext uri="{28A0092B-C50C-407E-A947-70E740481C1C}">
+                <a14:useLocalDpi xmlns:a14="http://schemas.microsoft.com/office/drawing/2010/main" val="0"/>
+              </a:ext>
+            </a:extLst>
+          </a:blip>
+          <a:srcRect/>
+          <a:stretch>
+            <a:fillRect/>
+          </a:stretch>
+        </p:blipFill>
+        <p:spPr bwMode="auto">
+          <a:xfrm flipH="1">
+            <a:off x="2394547" y="2100624"/>
+            <a:ext cx="2055673" cy="2055673"/>
+          </a:xfrm>
+          <a:prstGeom prst="rect">
+            <a:avLst/>
+          </a:prstGeom>
+          <a:noFill/>
+          <a:extLst>
+            <a:ext uri="{909E8E84-426E-40DD-AFC4-6F175D3DCCD1}">
+              <a14:hiddenFill xmlns:a14="http://schemas.microsoft.com/office/drawing/2010/main">
+                <a:solidFill>
+                  <a:srgbClr val="FFFFFF"/>
+                </a:solidFill>
+              </a14:hiddenFill>
+            </a:ext>
+          </a:extLst>
+        </p:spPr>
+      </p:pic>
+      <p:cxnSp>
+        <p:nvCxnSpPr>
+          <p:cNvPr id="4" name="Straight Connector 3">
+            <a:extLst>
+              <a:ext uri="{FF2B5EF4-FFF2-40B4-BE49-F238E27FC236}">
+                <a16:creationId xmlns:a16="http://schemas.microsoft.com/office/drawing/2014/main" id="{3AE15186-80FA-0B3C-5FFE-E8C7D25651E7}"/>
+              </a:ext>
+            </a:extLst>
+          </p:cNvPr>
+          <p:cNvCxnSpPr>
+            <a:cxnSpLocks/>
+          </p:cNvCxnSpPr>
+          <p:nvPr/>
+        </p:nvCxnSpPr>
+        <p:spPr>
+          <a:xfrm flipV="1">
+            <a:off x="3424765" y="3727048"/>
+            <a:ext cx="0" cy="878622"/>
+          </a:xfrm>
+          <a:prstGeom prst="line">
+            <a:avLst/>
+          </a:prstGeom>
+          <a:ln w="76200">
+            <a:solidFill>
+              <a:schemeClr val="tx1"/>
+            </a:solidFill>
+          </a:ln>
+        </p:spPr>
+        <p:style>
+          <a:lnRef idx="1">
+            <a:schemeClr val="accent1"/>
+          </a:lnRef>
+          <a:fillRef idx="0">
+            <a:schemeClr val="accent1"/>
+          </a:fillRef>
+          <a:effectRef idx="0">
+            <a:schemeClr val="accent1"/>
+          </a:effectRef>
+          <a:fontRef idx="minor">
+            <a:schemeClr val="tx1"/>
+          </a:fontRef>
+        </p:style>
+      </p:cxnSp>
+      <mc:AlternateContent xmlns:mc="http://schemas.openxmlformats.org/markup-compatibility/2006">
+        <mc:Choice xmlns:a14="http://schemas.microsoft.com/office/drawing/2010/main" Requires="a14">
+          <p:sp>
+            <p:nvSpPr>
+              <p:cNvPr id="11" name="TextBox 10">
+                <a:extLst>
+                  <a:ext uri="{FF2B5EF4-FFF2-40B4-BE49-F238E27FC236}">
+                    <a16:creationId xmlns:a16="http://schemas.microsoft.com/office/drawing/2014/main" id="{131D614A-7ED9-444D-33B1-242E6232C8B4}"/>
+                  </a:ext>
+                </a:extLst>
+              </p:cNvPr>
+              <p:cNvSpPr txBox="1"/>
+              <p:nvPr/>
+            </p:nvSpPr>
+            <p:spPr>
+              <a:xfrm>
+                <a:off x="1704974" y="2897627"/>
+                <a:ext cx="1004570" cy="461665"/>
+              </a:xfrm>
+              <a:prstGeom prst="rect">
+                <a:avLst/>
+              </a:prstGeom>
+              <a:noFill/>
+            </p:spPr>
+            <p:txBody>
+              <a:bodyPr wrap="none" rtlCol="0">
+                <a:spAutoFit/>
+              </a:bodyPr>
+              <a:lstStyle/>
+              <a:p>
+                <a:pPr/>
+                <a14:m>
+                  <m:oMathPara xmlns:m="http://schemas.openxmlformats.org/officeDocument/2006/math">
+                    <m:oMathParaPr>
+                      <m:jc m:val="centerGroup"/>
+                    </m:oMathParaPr>
+                    <m:oMath xmlns:m="http://schemas.openxmlformats.org/officeDocument/2006/math">
+                      <m:sSub>
+                        <m:sSubPr>
+                          <m:ctrlPr>
+                            <a:rPr lang="en-US" sz="2400" b="0" i="1" dirty="0" smtClean="0">
+                              <a:latin typeface="Cambria Math" panose="02040503050406030204" pitchFamily="18" charset="0"/>
+                            </a:rPr>
+                          </m:ctrlPr>
+                        </m:sSubPr>
+                        <m:e>
+                          <m:r>
+                            <a:rPr lang="en-US" sz="2400" b="0" i="1" dirty="0" smtClean="0">
+                              <a:latin typeface="Cambria Math" panose="02040503050406030204" pitchFamily="18" charset="0"/>
+                            </a:rPr>
+                            <m:t>𝑉</m:t>
+                          </m:r>
+                        </m:e>
+                        <m:sub>
+                          <m:r>
+                            <a:rPr lang="en-US" sz="2400" b="0" i="1" dirty="0" smtClean="0">
+                              <a:latin typeface="Cambria Math" panose="02040503050406030204" pitchFamily="18" charset="0"/>
+                            </a:rPr>
+                            <m:t>𝑠</m:t>
+                          </m:r>
+                        </m:sub>
+                      </m:sSub>
+                      <m:r>
+                        <a:rPr lang="en-US" sz="2400" b="0" i="1" smtClean="0">
+                          <a:latin typeface="Cambria Math" panose="02040503050406030204" pitchFamily="18" charset="0"/>
+                        </a:rPr>
+                        <m:t> </m:t>
+                      </m:r>
+                      <m:d>
+                        <m:dPr>
+                          <m:begChr m:val="["/>
+                          <m:endChr m:val="]"/>
+                          <m:ctrlPr>
+                            <a:rPr lang="en-US" sz="2400" b="0" i="1" smtClean="0">
+                              <a:latin typeface="Cambria Math" panose="02040503050406030204" pitchFamily="18" charset="0"/>
+                            </a:rPr>
+                          </m:ctrlPr>
+                        </m:dPr>
+                        <m:e>
+                          <m:r>
+                            <m:rPr>
+                              <m:sty m:val="p"/>
+                            </m:rPr>
+                            <a:rPr lang="en-US" sz="2400" b="0" i="0" smtClean="0">
+                              <a:latin typeface="Cambria Math" panose="02040503050406030204" pitchFamily="18" charset="0"/>
+                            </a:rPr>
+                            <m:t>V</m:t>
+                          </m:r>
+                        </m:e>
+                      </m:d>
+                    </m:oMath>
+                  </m:oMathPara>
+                </a14:m>
+                <a:endParaRPr lang="en-US" sz="2400" dirty="0"/>
+              </a:p>
+            </p:txBody>
+          </p:sp>
+        </mc:Choice>
+        <mc:Fallback>
+          <p:sp>
+            <p:nvSpPr>
+              <p:cNvPr id="11" name="TextBox 10">
+                <a:extLst>
+                  <a:ext uri="{FF2B5EF4-FFF2-40B4-BE49-F238E27FC236}">
+                    <a16:creationId xmlns:a16="http://schemas.microsoft.com/office/drawing/2014/main" id="{131D614A-7ED9-444D-33B1-242E6232C8B4}"/>
+                  </a:ext>
+                </a:extLst>
+              </p:cNvPr>
+              <p:cNvSpPr txBox="1">
+                <a:spLocks noRot="1" noChangeAspect="1" noMove="1" noResize="1" noEditPoints="1" noAdjustHandles="1" noChangeArrowheads="1" noChangeShapeType="1" noTextEdit="1"/>
+              </p:cNvSpPr>
+              <p:nvPr/>
+            </p:nvSpPr>
+            <p:spPr>
+              <a:xfrm>
+                <a:off x="1704974" y="2897627"/>
+                <a:ext cx="1004570" cy="461665"/>
+              </a:xfrm>
+              <a:prstGeom prst="rect">
+                <a:avLst/>
+              </a:prstGeom>
+              <a:blipFill>
+                <a:blip r:embed="rId7"/>
+                <a:stretch>
+                  <a:fillRect/>
+                </a:stretch>
+              </a:blipFill>
+            </p:spPr>
+            <p:txBody>
+              <a:bodyPr/>
+              <a:lstStyle/>
+              <a:p>
+                <a:r>
+                  <a:rPr lang="en-US">
+                    <a:noFill/>
+                  </a:rPr>
+                  <a:t> </a:t>
+                </a:r>
+              </a:p>
+            </p:txBody>
+          </p:sp>
+        </mc:Fallback>
+      </mc:AlternateContent>
+      <mc:AlternateContent xmlns:mc="http://schemas.openxmlformats.org/markup-compatibility/2006">
+        <mc:Choice xmlns:a14="http://schemas.microsoft.com/office/drawing/2010/main" Requires="a14">
+          <p:sp>
+            <p:nvSpPr>
+              <p:cNvPr id="13" name="TextBox 12">
+                <a:extLst>
+                  <a:ext uri="{FF2B5EF4-FFF2-40B4-BE49-F238E27FC236}">
+                    <a16:creationId xmlns:a16="http://schemas.microsoft.com/office/drawing/2014/main" id="{45875F30-F255-FAAE-CEEF-C70CD0D636BF}"/>
+                  </a:ext>
+                </a:extLst>
+              </p:cNvPr>
+              <p:cNvSpPr txBox="1"/>
+              <p:nvPr/>
+            </p:nvSpPr>
+            <p:spPr>
+              <a:xfrm>
+                <a:off x="4604832" y="5172275"/>
+                <a:ext cx="2184893" cy="646331"/>
+              </a:xfrm>
+              <a:prstGeom prst="rect">
+                <a:avLst/>
+              </a:prstGeom>
+              <a:noFill/>
+            </p:spPr>
+            <p:txBody>
+              <a:bodyPr wrap="none" rtlCol="0">
+                <a:spAutoFit/>
+              </a:bodyPr>
+              <a:lstStyle/>
+              <a:p>
+                <a:pPr/>
+                <a:r>
+                  <a:rPr lang="en-US" sz="3600" b="0" dirty="0"/>
+                  <a:t>- </a:t>
+                </a:r>
+                <a:r>
+                  <a:rPr lang="en-US" sz="2400" b="0" dirty="0"/>
+                  <a:t>      </a:t>
+                </a:r>
+                <a14:m>
+                  <m:oMath xmlns:m="http://schemas.openxmlformats.org/officeDocument/2006/math">
+                    <m:sSub>
+                      <m:sSubPr>
+                        <m:ctrlPr>
+                          <a:rPr lang="en-US" sz="2400" b="0" i="1" dirty="0" smtClean="0">
+                            <a:latin typeface="Cambria Math" panose="02040503050406030204" pitchFamily="18" charset="0"/>
+                          </a:rPr>
+                        </m:ctrlPr>
+                      </m:sSubPr>
+                      <m:e>
+                        <m:r>
+                          <a:rPr lang="en-US" sz="2400" b="0" i="1" dirty="0" smtClean="0">
+                            <a:latin typeface="Cambria Math" panose="02040503050406030204" pitchFamily="18" charset="0"/>
+                          </a:rPr>
+                          <m:t>𝑉</m:t>
+                        </m:r>
+                      </m:e>
+                      <m:sub>
+                        <m:r>
+                          <a:rPr lang="en-US" sz="2400" b="0" i="1" dirty="0" smtClean="0">
+                            <a:latin typeface="Cambria Math" panose="02040503050406030204" pitchFamily="18" charset="0"/>
+                          </a:rPr>
+                          <m:t>𝑐</m:t>
+                        </m:r>
+                      </m:sub>
+                    </m:sSub>
+                    <m:r>
+                      <a:rPr lang="en-US" sz="2400" b="0" i="1" smtClean="0">
+                        <a:latin typeface="Cambria Math" panose="02040503050406030204" pitchFamily="18" charset="0"/>
+                      </a:rPr>
+                      <m:t> </m:t>
+                    </m:r>
+                    <m:d>
+                      <m:dPr>
+                        <m:begChr m:val="["/>
+                        <m:endChr m:val="]"/>
+                        <m:ctrlPr>
+                          <a:rPr lang="en-US" sz="2400" b="0" i="1" smtClean="0">
+                            <a:latin typeface="Cambria Math" panose="02040503050406030204" pitchFamily="18" charset="0"/>
+                          </a:rPr>
+                        </m:ctrlPr>
+                      </m:dPr>
+                      <m:e>
+                        <m:r>
+                          <m:rPr>
+                            <m:sty m:val="p"/>
+                          </m:rPr>
+                          <a:rPr lang="en-US" sz="2400" b="0" i="0" smtClean="0">
+                            <a:latin typeface="Cambria Math" panose="02040503050406030204" pitchFamily="18" charset="0"/>
+                          </a:rPr>
+                          <m:t>V</m:t>
+                        </m:r>
+                      </m:e>
+                    </m:d>
+                  </m:oMath>
+                </a14:m>
+                <a:r>
+                  <a:rPr lang="en-US" sz="2400" dirty="0"/>
+                  <a:t>      </a:t>
+                </a:r>
+                <a:r>
+                  <a:rPr lang="en-US" sz="3200" dirty="0"/>
+                  <a:t>+</a:t>
+                </a:r>
+                <a:endParaRPr lang="en-US" sz="2400" dirty="0"/>
+              </a:p>
+            </p:txBody>
+          </p:sp>
+        </mc:Choice>
+        <mc:Fallback>
+          <p:sp>
+            <p:nvSpPr>
+              <p:cNvPr id="13" name="TextBox 12">
+                <a:extLst>
+                  <a:ext uri="{FF2B5EF4-FFF2-40B4-BE49-F238E27FC236}">
+                    <a16:creationId xmlns:a16="http://schemas.microsoft.com/office/drawing/2014/main" id="{45875F30-F255-FAAE-CEEF-C70CD0D636BF}"/>
+                  </a:ext>
+                </a:extLst>
+              </p:cNvPr>
+              <p:cNvSpPr txBox="1">
+                <a:spLocks noRot="1" noChangeAspect="1" noMove="1" noResize="1" noEditPoints="1" noAdjustHandles="1" noChangeArrowheads="1" noChangeShapeType="1" noTextEdit="1"/>
+              </p:cNvSpPr>
+              <p:nvPr/>
+            </p:nvSpPr>
+            <p:spPr>
+              <a:xfrm>
+                <a:off x="4604832" y="5172275"/>
+                <a:ext cx="2184893" cy="646331"/>
+              </a:xfrm>
+              <a:prstGeom prst="rect">
+                <a:avLst/>
+              </a:prstGeom>
+              <a:blipFill>
+                <a:blip r:embed="rId8"/>
+                <a:stretch>
+                  <a:fillRect l="-8357" t="-14151" r="-5850" b="-34906"/>
+                </a:stretch>
+              </a:blipFill>
+            </p:spPr>
+            <p:txBody>
+              <a:bodyPr/>
+              <a:lstStyle/>
+              <a:p>
+                <a:r>
+                  <a:rPr lang="en-US">
+                    <a:noFill/>
+                  </a:rPr>
+                  <a:t> </a:t>
+                </a:r>
+              </a:p>
+            </p:txBody>
+          </p:sp>
+        </mc:Fallback>
+      </mc:AlternateContent>
+    </p:spTree>
+    <p:extLst>
+      <p:ext uri="{BB962C8B-B14F-4D97-AF65-F5344CB8AC3E}">
+        <p14:creationId xmlns:p14="http://schemas.microsoft.com/office/powerpoint/2010/main" val="2057621636"/>
       </p:ext>
     </p:extLst>
   </p:cSld>

</xml_diff>

<commit_message>
just a general backup
ding dong
</commit_message>
<xml_diff>
--- a/figs.pptx
+++ b/figs.pptx
@@ -9,6 +9,8 @@
     <p:sldId id="257" r:id="rId3"/>
     <p:sldId id="258" r:id="rId4"/>
     <p:sldId id="259" r:id="rId5"/>
+    <p:sldId id="260" r:id="rId6"/>
+    <p:sldId id="261" r:id="rId7"/>
   </p:sldIdLst>
   <p:sldSz cx="12192000" cy="6858000"/>
   <p:notesSz cx="6858000" cy="9144000"/>
@@ -262,7 +264,7 @@
           <a:p>
             <a:fld id="{A71FC2DB-A326-45A5-94F2-D7C7B8043E42}" type="datetimeFigureOut">
               <a:rPr lang="en-US" smtClean="0"/>
-              <a:t>6/2/2023</a:t>
+              <a:t>6/19/2023</a:t>
             </a:fld>
             <a:endParaRPr lang="en-US"/>
           </a:p>
@@ -460,7 +462,7 @@
           <a:p>
             <a:fld id="{A71FC2DB-A326-45A5-94F2-D7C7B8043E42}" type="datetimeFigureOut">
               <a:rPr lang="en-US" smtClean="0"/>
-              <a:t>6/2/2023</a:t>
+              <a:t>6/19/2023</a:t>
             </a:fld>
             <a:endParaRPr lang="en-US"/>
           </a:p>
@@ -668,7 +670,7 @@
           <a:p>
             <a:fld id="{A71FC2DB-A326-45A5-94F2-D7C7B8043E42}" type="datetimeFigureOut">
               <a:rPr lang="en-US" smtClean="0"/>
-              <a:t>6/2/2023</a:t>
+              <a:t>6/19/2023</a:t>
             </a:fld>
             <a:endParaRPr lang="en-US"/>
           </a:p>
@@ -866,7 +868,7 @@
           <a:p>
             <a:fld id="{A71FC2DB-A326-45A5-94F2-D7C7B8043E42}" type="datetimeFigureOut">
               <a:rPr lang="en-US" smtClean="0"/>
-              <a:t>6/2/2023</a:t>
+              <a:t>6/19/2023</a:t>
             </a:fld>
             <a:endParaRPr lang="en-US"/>
           </a:p>
@@ -1141,7 +1143,7 @@
           <a:p>
             <a:fld id="{A71FC2DB-A326-45A5-94F2-D7C7B8043E42}" type="datetimeFigureOut">
               <a:rPr lang="en-US" smtClean="0"/>
-              <a:t>6/2/2023</a:t>
+              <a:t>6/19/2023</a:t>
             </a:fld>
             <a:endParaRPr lang="en-US"/>
           </a:p>
@@ -1406,7 +1408,7 @@
           <a:p>
             <a:fld id="{A71FC2DB-A326-45A5-94F2-D7C7B8043E42}" type="datetimeFigureOut">
               <a:rPr lang="en-US" smtClean="0"/>
-              <a:t>6/2/2023</a:t>
+              <a:t>6/19/2023</a:t>
             </a:fld>
             <a:endParaRPr lang="en-US"/>
           </a:p>
@@ -1818,7 +1820,7 @@
           <a:p>
             <a:fld id="{A71FC2DB-A326-45A5-94F2-D7C7B8043E42}" type="datetimeFigureOut">
               <a:rPr lang="en-US" smtClean="0"/>
-              <a:t>6/2/2023</a:t>
+              <a:t>6/19/2023</a:t>
             </a:fld>
             <a:endParaRPr lang="en-US"/>
           </a:p>
@@ -1959,7 +1961,7 @@
           <a:p>
             <a:fld id="{A71FC2DB-A326-45A5-94F2-D7C7B8043E42}" type="datetimeFigureOut">
               <a:rPr lang="en-US" smtClean="0"/>
-              <a:t>6/2/2023</a:t>
+              <a:t>6/19/2023</a:t>
             </a:fld>
             <a:endParaRPr lang="en-US"/>
           </a:p>
@@ -2072,7 +2074,7 @@
           <a:p>
             <a:fld id="{A71FC2DB-A326-45A5-94F2-D7C7B8043E42}" type="datetimeFigureOut">
               <a:rPr lang="en-US" smtClean="0"/>
-              <a:t>6/2/2023</a:t>
+              <a:t>6/19/2023</a:t>
             </a:fld>
             <a:endParaRPr lang="en-US"/>
           </a:p>
@@ -2383,7 +2385,7 @@
           <a:p>
             <a:fld id="{A71FC2DB-A326-45A5-94F2-D7C7B8043E42}" type="datetimeFigureOut">
               <a:rPr lang="en-US" smtClean="0"/>
-              <a:t>6/2/2023</a:t>
+              <a:t>6/19/2023</a:t>
             </a:fld>
             <a:endParaRPr lang="en-US"/>
           </a:p>
@@ -2671,7 +2673,7 @@
           <a:p>
             <a:fld id="{A71FC2DB-A326-45A5-94F2-D7C7B8043E42}" type="datetimeFigureOut">
               <a:rPr lang="en-US" smtClean="0"/>
-              <a:t>6/2/2023</a:t>
+              <a:t>6/19/2023</a:t>
             </a:fld>
             <a:endParaRPr lang="en-US"/>
           </a:p>
@@ -2912,7 +2914,7 @@
           <a:p>
             <a:fld id="{A71FC2DB-A326-45A5-94F2-D7C7B8043E42}" type="datetimeFigureOut">
               <a:rPr lang="en-US" smtClean="0"/>
-              <a:t>6/2/2023</a:t>
+              <a:t>6/19/2023</a:t>
             </a:fld>
             <a:endParaRPr lang="en-US"/>
           </a:p>
@@ -5582,8 +5584,8 @@
           </a:fontRef>
         </p:style>
       </p:cxnSp>
-      <mc:AlternateContent xmlns:mc="http://schemas.openxmlformats.org/markup-compatibility/2006">
-        <mc:Choice xmlns:a14="http://schemas.microsoft.com/office/drawing/2010/main" Requires="a14">
+      <mc:AlternateContent xmlns:mc="http://schemas.openxmlformats.org/markup-compatibility/2006" xmlns:a14="http://schemas.microsoft.com/office/drawing/2010/main">
+        <mc:Choice Requires="a14">
           <p:sp>
             <p:nvSpPr>
               <p:cNvPr id="18" name="TextBox 17">
@@ -5661,7 +5663,7 @@
             </p:txBody>
           </p:sp>
         </mc:Choice>
-        <mc:Fallback>
+        <mc:Fallback xmlns="">
           <p:sp>
             <p:nvSpPr>
               <p:cNvPr id="18" name="TextBox 17">
@@ -5706,8 +5708,8 @@
           </p:sp>
         </mc:Fallback>
       </mc:AlternateContent>
-      <mc:AlternateContent xmlns:mc="http://schemas.openxmlformats.org/markup-compatibility/2006">
-        <mc:Choice xmlns:a14="http://schemas.microsoft.com/office/drawing/2010/main" Requires="a14">
+      <mc:AlternateContent xmlns:mc="http://schemas.openxmlformats.org/markup-compatibility/2006" xmlns:a14="http://schemas.microsoft.com/office/drawing/2010/main">
+        <mc:Choice Requires="a14">
           <p:sp>
             <p:nvSpPr>
               <p:cNvPr id="19" name="TextBox 18">
@@ -5785,7 +5787,7 @@
             </p:txBody>
           </p:sp>
         </mc:Choice>
-        <mc:Fallback>
+        <mc:Fallback xmlns="">
           <p:sp>
             <p:nvSpPr>
               <p:cNvPr id="19" name="TextBox 18">
@@ -5830,8 +5832,8 @@
           </p:sp>
         </mc:Fallback>
       </mc:AlternateContent>
-      <mc:AlternateContent xmlns:mc="http://schemas.openxmlformats.org/markup-compatibility/2006">
-        <mc:Choice xmlns:a14="http://schemas.microsoft.com/office/drawing/2010/main" Requires="a14">
+      <mc:AlternateContent xmlns:mc="http://schemas.openxmlformats.org/markup-compatibility/2006" xmlns:a14="http://schemas.microsoft.com/office/drawing/2010/main">
+        <mc:Choice Requires="a14">
           <p:sp>
             <p:nvSpPr>
               <p:cNvPr id="21" name="TextBox 20">
@@ -5901,7 +5903,7 @@
                         <m:begChr m:val="["/>
                         <m:endChr m:val="]"/>
                         <m:ctrlPr>
-                          <a:rPr lang="en-US" sz="2400" b="0" smtClean="0">
+                          <a:rPr lang="en-US" sz="2400" b="0" i="1" smtClean="0">
                             <a:latin typeface="Cambria Math" panose="02040503050406030204" pitchFamily="18" charset="0"/>
                           </a:rPr>
                         </m:ctrlPr>
@@ -5928,7 +5930,7 @@
             </p:txBody>
           </p:sp>
         </mc:Choice>
-        <mc:Fallback>
+        <mc:Fallback xmlns="">
           <p:sp>
             <p:nvSpPr>
               <p:cNvPr id="21" name="TextBox 20">
@@ -6311,8 +6313,8 @@
           </a:fontRef>
         </p:style>
       </p:cxnSp>
-      <mc:AlternateContent xmlns:mc="http://schemas.openxmlformats.org/markup-compatibility/2006">
-        <mc:Choice xmlns:a14="http://schemas.microsoft.com/office/drawing/2010/main" Requires="a14">
+      <mc:AlternateContent xmlns:mc="http://schemas.openxmlformats.org/markup-compatibility/2006" xmlns:a14="http://schemas.microsoft.com/office/drawing/2010/main">
+        <mc:Choice Requires="a14">
           <p:sp>
             <p:nvSpPr>
               <p:cNvPr id="18" name="TextBox 17">
@@ -6390,7 +6392,7 @@
             </p:txBody>
           </p:sp>
         </mc:Choice>
-        <mc:Fallback>
+        <mc:Fallback xmlns="">
           <p:sp>
             <p:nvSpPr>
               <p:cNvPr id="18" name="TextBox 17">
@@ -6435,8 +6437,8 @@
           </p:sp>
         </mc:Fallback>
       </mc:AlternateContent>
-      <mc:AlternateContent xmlns:mc="http://schemas.openxmlformats.org/markup-compatibility/2006">
-        <mc:Choice xmlns:a14="http://schemas.microsoft.com/office/drawing/2010/main" Requires="a14">
+      <mc:AlternateContent xmlns:mc="http://schemas.openxmlformats.org/markup-compatibility/2006" xmlns:a14="http://schemas.microsoft.com/office/drawing/2010/main">
+        <mc:Choice Requires="a14">
           <p:sp>
             <p:nvSpPr>
               <p:cNvPr id="19" name="TextBox 18">
@@ -6514,7 +6516,7 @@
             </p:txBody>
           </p:sp>
         </mc:Choice>
-        <mc:Fallback>
+        <mc:Fallback xmlns="">
           <p:sp>
             <p:nvSpPr>
               <p:cNvPr id="19" name="TextBox 18">
@@ -6649,8 +6651,8 @@
           </a:fontRef>
         </p:style>
       </p:cxnSp>
-      <mc:AlternateContent xmlns:mc="http://schemas.openxmlformats.org/markup-compatibility/2006">
-        <mc:Choice xmlns:a14="http://schemas.microsoft.com/office/drawing/2010/main" Requires="a14">
+      <mc:AlternateContent xmlns:mc="http://schemas.openxmlformats.org/markup-compatibility/2006" xmlns:a14="http://schemas.microsoft.com/office/drawing/2010/main">
+        <mc:Choice Requires="a14">
           <p:sp>
             <p:nvSpPr>
               <p:cNvPr id="11" name="TextBox 10">
@@ -6747,7 +6749,7 @@
             </p:txBody>
           </p:sp>
         </mc:Choice>
-        <mc:Fallback>
+        <mc:Fallback xmlns="">
           <p:sp>
             <p:nvSpPr>
               <p:cNvPr id="11" name="TextBox 10">
@@ -6792,8 +6794,8 @@
           </p:sp>
         </mc:Fallback>
       </mc:AlternateContent>
-      <mc:AlternateContent xmlns:mc="http://schemas.openxmlformats.org/markup-compatibility/2006">
-        <mc:Choice xmlns:a14="http://schemas.microsoft.com/office/drawing/2010/main" Requires="a14">
+      <mc:AlternateContent xmlns:mc="http://schemas.openxmlformats.org/markup-compatibility/2006" xmlns:a14="http://schemas.microsoft.com/office/drawing/2010/main">
+        <mc:Choice Requires="a14">
           <p:sp>
             <p:nvSpPr>
               <p:cNvPr id="13" name="TextBox 12">
@@ -6822,7 +6824,6 @@
               </a:bodyPr>
               <a:lstStyle/>
               <a:p>
-                <a:pPr/>
                 <a:r>
                   <a:rPr lang="en-US" sz="3600" b="0" dirty="0"/>
                   <a:t>- </a:t>
@@ -6901,7 +6902,7 @@
             </p:txBody>
           </p:sp>
         </mc:Choice>
-        <mc:Fallback>
+        <mc:Fallback xmlns="">
           <p:sp>
             <p:nvSpPr>
               <p:cNvPr id="13" name="TextBox 12">
@@ -6950,6 +6951,1610 @@
     <p:extLst>
       <p:ext uri="{BB962C8B-B14F-4D97-AF65-F5344CB8AC3E}">
         <p14:creationId xmlns:p14="http://schemas.microsoft.com/office/powerpoint/2010/main" val="2057621636"/>
+      </p:ext>
+    </p:extLst>
+  </p:cSld>
+  <p:clrMapOvr>
+    <a:masterClrMapping/>
+  </p:clrMapOvr>
+</p:sld>
+</file>
+
+<file path=ppt/slides/slide5.xml><?xml version="1.0" encoding="utf-8"?>
+<p:sld xmlns:a="http://schemas.openxmlformats.org/drawingml/2006/main" xmlns:r="http://schemas.openxmlformats.org/officeDocument/2006/relationships" xmlns:p="http://schemas.openxmlformats.org/presentationml/2006/main">
+  <p:cSld>
+    <p:spTree>
+      <p:nvGrpSpPr>
+        <p:cNvPr id="1" name=""/>
+        <p:cNvGrpSpPr/>
+        <p:nvPr/>
+      </p:nvGrpSpPr>
+      <p:grpSpPr>
+        <a:xfrm>
+          <a:off x="0" y="0"/>
+          <a:ext cx="0" cy="0"/>
+          <a:chOff x="0" y="0"/>
+          <a:chExt cx="0" cy="0"/>
+        </a:xfrm>
+      </p:grpSpPr>
+      <p:pic>
+        <p:nvPicPr>
+          <p:cNvPr id="1026" name="Picture 2">
+            <a:extLst>
+              <a:ext uri="{FF2B5EF4-FFF2-40B4-BE49-F238E27FC236}">
+                <a16:creationId xmlns:a16="http://schemas.microsoft.com/office/drawing/2014/main" id="{BADF2781-01DB-ECB2-DED2-18C575CD872E}"/>
+              </a:ext>
+            </a:extLst>
+          </p:cNvPr>
+          <p:cNvPicPr>
+            <a:picLocks noChangeAspect="1" noChangeArrowheads="1"/>
+          </p:cNvPicPr>
+          <p:nvPr/>
+        </p:nvPicPr>
+        <p:blipFill>
+          <a:blip r:embed="rId2">
+            <a:extLst>
+              <a:ext uri="{28A0092B-C50C-407E-A947-70E740481C1C}">
+                <a14:useLocalDpi xmlns:a14="http://schemas.microsoft.com/office/drawing/2010/main" val="0"/>
+              </a:ext>
+            </a:extLst>
+          </a:blip>
+          <a:srcRect/>
+          <a:stretch>
+            <a:fillRect/>
+          </a:stretch>
+        </p:blipFill>
+        <p:spPr bwMode="auto">
+          <a:xfrm>
+            <a:off x="2957513" y="1880044"/>
+            <a:ext cx="5224792" cy="1741101"/>
+          </a:xfrm>
+          <a:prstGeom prst="rect">
+            <a:avLst/>
+          </a:prstGeom>
+          <a:noFill/>
+          <a:extLst>
+            <a:ext uri="{909E8E84-426E-40DD-AFC4-6F175D3DCCD1}">
+              <a14:hiddenFill xmlns:a14="http://schemas.microsoft.com/office/drawing/2010/main">
+                <a:solidFill>
+                  <a:srgbClr val="FFFFFF"/>
+                </a:solidFill>
+              </a14:hiddenFill>
+            </a:ext>
+          </a:extLst>
+        </p:spPr>
+      </p:pic>
+      <p:sp>
+        <p:nvSpPr>
+          <p:cNvPr id="28" name="Rectangle: Rounded Corners 27">
+            <a:extLst>
+              <a:ext uri="{FF2B5EF4-FFF2-40B4-BE49-F238E27FC236}">
+                <a16:creationId xmlns:a16="http://schemas.microsoft.com/office/drawing/2014/main" id="{C52CF1E8-2B19-060D-A780-75EB77C810A6}"/>
+              </a:ext>
+            </a:extLst>
+          </p:cNvPr>
+          <p:cNvSpPr/>
+          <p:nvPr/>
+        </p:nvSpPr>
+        <p:spPr>
+          <a:xfrm>
+            <a:off x="7510076" y="2595435"/>
+            <a:ext cx="1252728" cy="1248030"/>
+          </a:xfrm>
+          <a:prstGeom prst="roundRect">
+            <a:avLst>
+              <a:gd name="adj" fmla="val 10417"/>
+            </a:avLst>
+          </a:prstGeom>
+          <a:ln w="57150"/>
+        </p:spPr>
+        <p:style>
+          <a:lnRef idx="2">
+            <a:schemeClr val="dk1"/>
+          </a:lnRef>
+          <a:fillRef idx="1">
+            <a:schemeClr val="lt1"/>
+          </a:fillRef>
+          <a:effectRef idx="0">
+            <a:schemeClr val="dk1"/>
+          </a:effectRef>
+          <a:fontRef idx="minor">
+            <a:schemeClr val="dk1"/>
+          </a:fontRef>
+        </p:style>
+        <p:txBody>
+          <a:bodyPr rtlCol="0" anchor="ctr"/>
+          <a:lstStyle/>
+          <a:p>
+            <a:pPr algn="ctr"/>
+            <a:endParaRPr lang="en-US" dirty="0"/>
+          </a:p>
+        </p:txBody>
+      </p:sp>
+      <p:cxnSp>
+        <p:nvCxnSpPr>
+          <p:cNvPr id="30" name="Straight Arrow Connector 29">
+            <a:extLst>
+              <a:ext uri="{FF2B5EF4-FFF2-40B4-BE49-F238E27FC236}">
+                <a16:creationId xmlns:a16="http://schemas.microsoft.com/office/drawing/2014/main" id="{9B55D331-6D7F-1DD5-081D-80FBDBB1AFBE}"/>
+              </a:ext>
+            </a:extLst>
+          </p:cNvPr>
+          <p:cNvCxnSpPr>
+            <a:cxnSpLocks/>
+          </p:cNvCxnSpPr>
+          <p:nvPr/>
+        </p:nvCxnSpPr>
+        <p:spPr>
+          <a:xfrm>
+            <a:off x="8141469" y="2205101"/>
+            <a:ext cx="869184" cy="0"/>
+          </a:xfrm>
+          <a:prstGeom prst="straightConnector1">
+            <a:avLst/>
+          </a:prstGeom>
+          <a:ln w="57150">
+            <a:solidFill>
+              <a:schemeClr val="tx1"/>
+            </a:solidFill>
+            <a:tailEnd type="triangle"/>
+          </a:ln>
+        </p:spPr>
+        <p:style>
+          <a:lnRef idx="1">
+            <a:schemeClr val="accent1"/>
+          </a:lnRef>
+          <a:fillRef idx="0">
+            <a:schemeClr val="accent1"/>
+          </a:fillRef>
+          <a:effectRef idx="0">
+            <a:schemeClr val="accent1"/>
+          </a:effectRef>
+          <a:fontRef idx="minor">
+            <a:schemeClr val="tx1"/>
+          </a:fontRef>
+        </p:style>
+      </p:cxnSp>
+      <p:sp>
+        <p:nvSpPr>
+          <p:cNvPr id="31" name="Rectangle 30">
+            <a:extLst>
+              <a:ext uri="{FF2B5EF4-FFF2-40B4-BE49-F238E27FC236}">
+                <a16:creationId xmlns:a16="http://schemas.microsoft.com/office/drawing/2014/main" id="{8022D637-05DD-4599-C638-4D76C5402E61}"/>
+              </a:ext>
+            </a:extLst>
+          </p:cNvPr>
+          <p:cNvSpPr/>
+          <p:nvPr/>
+        </p:nvSpPr>
+        <p:spPr>
+          <a:xfrm rot="16200000">
+            <a:off x="8029250" y="2173204"/>
+            <a:ext cx="292607" cy="70221"/>
+          </a:xfrm>
+          <a:prstGeom prst="rect">
+            <a:avLst/>
+          </a:prstGeom>
+          <a:solidFill>
+            <a:schemeClr val="tx1"/>
+          </a:solidFill>
+          <a:ln>
+            <a:solidFill>
+              <a:schemeClr val="tx1"/>
+            </a:solidFill>
+          </a:ln>
+        </p:spPr>
+        <p:style>
+          <a:lnRef idx="2">
+            <a:schemeClr val="accent1">
+              <a:shade val="50000"/>
+            </a:schemeClr>
+          </a:lnRef>
+          <a:fillRef idx="1">
+            <a:schemeClr val="accent1"/>
+          </a:fillRef>
+          <a:effectRef idx="0">
+            <a:schemeClr val="accent1"/>
+          </a:effectRef>
+          <a:fontRef idx="minor">
+            <a:schemeClr val="lt1"/>
+          </a:fontRef>
+        </p:style>
+        <p:txBody>
+          <a:bodyPr rtlCol="0" anchor="ctr"/>
+          <a:lstStyle/>
+          <a:p>
+            <a:pPr algn="ctr"/>
+            <a:endParaRPr lang="en-US"/>
+          </a:p>
+        </p:txBody>
+      </p:sp>
+      <p:pic>
+        <p:nvPicPr>
+          <p:cNvPr id="36" name="Picture 35">
+            <a:extLst>
+              <a:ext uri="{FF2B5EF4-FFF2-40B4-BE49-F238E27FC236}">
+                <a16:creationId xmlns:a16="http://schemas.microsoft.com/office/drawing/2014/main" id="{DF61C434-25BE-9C02-9CC3-398CC50379E2}"/>
+              </a:ext>
+            </a:extLst>
+          </p:cNvPr>
+          <p:cNvPicPr>
+            <a:picLocks noChangeAspect="1"/>
+          </p:cNvPicPr>
+          <p:nvPr/>
+        </p:nvPicPr>
+        <p:blipFill>
+          <a:blip r:embed="rId3"/>
+          <a:stretch>
+            <a:fillRect/>
+          </a:stretch>
+        </p:blipFill>
+        <p:spPr>
+          <a:xfrm>
+            <a:off x="7870554" y="2923894"/>
+            <a:ext cx="539778" cy="520727"/>
+          </a:xfrm>
+          <a:prstGeom prst="rect">
+            <a:avLst/>
+          </a:prstGeom>
+        </p:spPr>
+      </p:pic>
+      <p:pic>
+        <p:nvPicPr>
+          <p:cNvPr id="38" name="Picture 37">
+            <a:extLst>
+              <a:ext uri="{FF2B5EF4-FFF2-40B4-BE49-F238E27FC236}">
+                <a16:creationId xmlns:a16="http://schemas.microsoft.com/office/drawing/2014/main" id="{18448FE5-C376-E561-521A-E10796132A36}"/>
+              </a:ext>
+            </a:extLst>
+          </p:cNvPr>
+          <p:cNvPicPr>
+            <a:picLocks noChangeAspect="1"/>
+          </p:cNvPicPr>
+          <p:nvPr/>
+        </p:nvPicPr>
+        <p:blipFill>
+          <a:blip r:embed="rId4"/>
+          <a:stretch>
+            <a:fillRect/>
+          </a:stretch>
+        </p:blipFill>
+        <p:spPr>
+          <a:xfrm>
+            <a:off x="9109396" y="1963788"/>
+            <a:ext cx="355618" cy="482625"/>
+          </a:xfrm>
+          <a:prstGeom prst="rect">
+            <a:avLst/>
+          </a:prstGeom>
+        </p:spPr>
+      </p:pic>
+      <p:pic>
+        <p:nvPicPr>
+          <p:cNvPr id="40" name="Picture 39">
+            <a:extLst>
+              <a:ext uri="{FF2B5EF4-FFF2-40B4-BE49-F238E27FC236}">
+                <a16:creationId xmlns:a16="http://schemas.microsoft.com/office/drawing/2014/main" id="{3E282AB1-7D87-CC9A-229A-F590718E464E}"/>
+              </a:ext>
+            </a:extLst>
+          </p:cNvPr>
+          <p:cNvPicPr>
+            <a:picLocks noChangeAspect="1"/>
+          </p:cNvPicPr>
+          <p:nvPr/>
+        </p:nvPicPr>
+        <p:blipFill>
+          <a:blip r:embed="rId5"/>
+          <a:stretch>
+            <a:fillRect/>
+          </a:stretch>
+        </p:blipFill>
+        <p:spPr>
+          <a:xfrm>
+            <a:off x="5349865" y="1938186"/>
+            <a:ext cx="387370" cy="457223"/>
+          </a:xfrm>
+          <a:prstGeom prst="rect">
+            <a:avLst/>
+          </a:prstGeom>
+        </p:spPr>
+      </p:pic>
+      <p:pic>
+        <p:nvPicPr>
+          <p:cNvPr id="60" name="Picture 59">
+            <a:extLst>
+              <a:ext uri="{FF2B5EF4-FFF2-40B4-BE49-F238E27FC236}">
+                <a16:creationId xmlns:a16="http://schemas.microsoft.com/office/drawing/2014/main" id="{FDA275AE-277D-65D1-D2B9-546649BC54C6}"/>
+              </a:ext>
+            </a:extLst>
+          </p:cNvPr>
+          <p:cNvPicPr>
+            <a:picLocks noChangeAspect="1"/>
+          </p:cNvPicPr>
+          <p:nvPr/>
+        </p:nvPicPr>
+        <p:blipFill rotWithShape="1">
+          <a:blip r:embed="rId6"/>
+          <a:srcRect t="17825" b="16678"/>
+          <a:stretch/>
+        </p:blipFill>
+        <p:spPr>
+          <a:xfrm>
+            <a:off x="3771809" y="3262070"/>
+            <a:ext cx="3543482" cy="885829"/>
+          </a:xfrm>
+          <a:prstGeom prst="rect">
+            <a:avLst/>
+          </a:prstGeom>
+        </p:spPr>
+      </p:pic>
+      <p:pic>
+        <p:nvPicPr>
+          <p:cNvPr id="1030" name="Picture 1029">
+            <a:extLst>
+              <a:ext uri="{FF2B5EF4-FFF2-40B4-BE49-F238E27FC236}">
+                <a16:creationId xmlns:a16="http://schemas.microsoft.com/office/drawing/2014/main" id="{1EE9E70E-09E1-49D1-D647-66E05CA9D205}"/>
+              </a:ext>
+            </a:extLst>
+          </p:cNvPr>
+          <p:cNvPicPr>
+            <a:picLocks noChangeAspect="1"/>
+          </p:cNvPicPr>
+          <p:nvPr/>
+        </p:nvPicPr>
+        <p:blipFill>
+          <a:blip r:embed="rId7"/>
+          <a:stretch>
+            <a:fillRect/>
+          </a:stretch>
+        </p:blipFill>
+        <p:spPr>
+          <a:xfrm>
+            <a:off x="7315291" y="3527789"/>
+            <a:ext cx="133357" cy="327042"/>
+          </a:xfrm>
+          <a:prstGeom prst="rect">
+            <a:avLst/>
+          </a:prstGeom>
+        </p:spPr>
+      </p:pic>
+      <p:pic>
+        <p:nvPicPr>
+          <p:cNvPr id="1033" name="Picture 1032">
+            <a:extLst>
+              <a:ext uri="{FF2B5EF4-FFF2-40B4-BE49-F238E27FC236}">
+                <a16:creationId xmlns:a16="http://schemas.microsoft.com/office/drawing/2014/main" id="{8F1BA65F-F207-29E5-FEED-7D8DD42983E2}"/>
+              </a:ext>
+            </a:extLst>
+          </p:cNvPr>
+          <p:cNvPicPr>
+            <a:picLocks noChangeAspect="1"/>
+          </p:cNvPicPr>
+          <p:nvPr/>
+        </p:nvPicPr>
+        <p:blipFill>
+          <a:blip r:embed="rId7"/>
+          <a:stretch>
+            <a:fillRect/>
+          </a:stretch>
+        </p:blipFill>
+        <p:spPr>
+          <a:xfrm>
+            <a:off x="7353394" y="3527789"/>
+            <a:ext cx="133357" cy="327042"/>
+          </a:xfrm>
+          <a:prstGeom prst="rect">
+            <a:avLst/>
+          </a:prstGeom>
+        </p:spPr>
+      </p:pic>
+      <p:pic>
+        <p:nvPicPr>
+          <p:cNvPr id="1036" name="Picture 1035">
+            <a:extLst>
+              <a:ext uri="{FF2B5EF4-FFF2-40B4-BE49-F238E27FC236}">
+                <a16:creationId xmlns:a16="http://schemas.microsoft.com/office/drawing/2014/main" id="{401519F8-D182-AB85-EA82-B12A96DA968E}"/>
+              </a:ext>
+            </a:extLst>
+          </p:cNvPr>
+          <p:cNvPicPr>
+            <a:picLocks noChangeAspect="1"/>
+          </p:cNvPicPr>
+          <p:nvPr/>
+        </p:nvPicPr>
+        <p:blipFill>
+          <a:blip r:embed="rId7"/>
+          <a:stretch>
+            <a:fillRect/>
+          </a:stretch>
+        </p:blipFill>
+        <p:spPr>
+          <a:xfrm>
+            <a:off x="3641627" y="3528211"/>
+            <a:ext cx="133357" cy="327042"/>
+          </a:xfrm>
+          <a:prstGeom prst="rect">
+            <a:avLst/>
+          </a:prstGeom>
+        </p:spPr>
+      </p:pic>
+      <p:pic>
+        <p:nvPicPr>
+          <p:cNvPr id="1037" name="Picture 1036">
+            <a:extLst>
+              <a:ext uri="{FF2B5EF4-FFF2-40B4-BE49-F238E27FC236}">
+                <a16:creationId xmlns:a16="http://schemas.microsoft.com/office/drawing/2014/main" id="{BDB56802-9B29-9D62-981B-5E4671DAEDC8}"/>
+              </a:ext>
+            </a:extLst>
+          </p:cNvPr>
+          <p:cNvPicPr>
+            <a:picLocks noChangeAspect="1"/>
+          </p:cNvPicPr>
+          <p:nvPr/>
+        </p:nvPicPr>
+        <p:blipFill>
+          <a:blip r:embed="rId7"/>
+          <a:stretch>
+            <a:fillRect/>
+          </a:stretch>
+        </p:blipFill>
+        <p:spPr>
+          <a:xfrm>
+            <a:off x="3609326" y="3527270"/>
+            <a:ext cx="133357" cy="327042"/>
+          </a:xfrm>
+          <a:prstGeom prst="rect">
+            <a:avLst/>
+          </a:prstGeom>
+        </p:spPr>
+      </p:pic>
+      <p:pic>
+        <p:nvPicPr>
+          <p:cNvPr id="1039" name="Picture 1038">
+            <a:extLst>
+              <a:ext uri="{FF2B5EF4-FFF2-40B4-BE49-F238E27FC236}">
+                <a16:creationId xmlns:a16="http://schemas.microsoft.com/office/drawing/2014/main" id="{1B8AE458-6AD1-681F-72CA-CCEEFB9AF649}"/>
+              </a:ext>
+            </a:extLst>
+          </p:cNvPr>
+          <p:cNvPicPr>
+            <a:picLocks noChangeAspect="1"/>
+          </p:cNvPicPr>
+          <p:nvPr/>
+        </p:nvPicPr>
+        <p:blipFill>
+          <a:blip r:embed="rId8"/>
+          <a:stretch>
+            <a:fillRect/>
+          </a:stretch>
+        </p:blipFill>
+        <p:spPr>
+          <a:xfrm>
+            <a:off x="5356215" y="4118245"/>
+            <a:ext cx="374669" cy="514376"/>
+          </a:xfrm>
+          <a:prstGeom prst="rect">
+            <a:avLst/>
+          </a:prstGeom>
+        </p:spPr>
+      </p:pic>
+      <p:pic>
+        <p:nvPicPr>
+          <p:cNvPr id="1041" name="Picture 1040">
+            <a:extLst>
+              <a:ext uri="{FF2B5EF4-FFF2-40B4-BE49-F238E27FC236}">
+                <a16:creationId xmlns:a16="http://schemas.microsoft.com/office/drawing/2014/main" id="{5E3CAA82-9902-2BDE-F45E-09367F515CA6}"/>
+              </a:ext>
+            </a:extLst>
+          </p:cNvPr>
+          <p:cNvPicPr>
+            <a:picLocks noChangeAspect="1"/>
+          </p:cNvPicPr>
+          <p:nvPr/>
+        </p:nvPicPr>
+        <p:blipFill>
+          <a:blip r:embed="rId9"/>
+          <a:stretch>
+            <a:fillRect/>
+          </a:stretch>
+        </p:blipFill>
+        <p:spPr>
+          <a:xfrm>
+            <a:off x="6650827" y="3590925"/>
+            <a:ext cx="77615" cy="185804"/>
+          </a:xfrm>
+          <a:prstGeom prst="rect">
+            <a:avLst/>
+          </a:prstGeom>
+        </p:spPr>
+      </p:pic>
+      <p:pic>
+        <p:nvPicPr>
+          <p:cNvPr id="1045" name="Picture 1044">
+            <a:extLst>
+              <a:ext uri="{FF2B5EF4-FFF2-40B4-BE49-F238E27FC236}">
+                <a16:creationId xmlns:a16="http://schemas.microsoft.com/office/drawing/2014/main" id="{6C4E6571-5343-A94C-83AC-AE15DD07CF38}"/>
+              </a:ext>
+            </a:extLst>
+          </p:cNvPr>
+          <p:cNvPicPr>
+            <a:picLocks noChangeAspect="1"/>
+          </p:cNvPicPr>
+          <p:nvPr/>
+        </p:nvPicPr>
+        <p:blipFill>
+          <a:blip r:embed="rId10"/>
+          <a:stretch>
+            <a:fillRect/>
+          </a:stretch>
+        </p:blipFill>
+        <p:spPr>
+          <a:xfrm>
+            <a:off x="2144065" y="555357"/>
+            <a:ext cx="1485900" cy="5257800"/>
+          </a:xfrm>
+          <a:prstGeom prst="rect">
+            <a:avLst/>
+          </a:prstGeom>
+        </p:spPr>
+      </p:pic>
+    </p:spTree>
+    <p:extLst>
+      <p:ext uri="{BB962C8B-B14F-4D97-AF65-F5344CB8AC3E}">
+        <p14:creationId xmlns:p14="http://schemas.microsoft.com/office/powerpoint/2010/main" val="3033317511"/>
+      </p:ext>
+    </p:extLst>
+  </p:cSld>
+  <p:clrMapOvr>
+    <a:masterClrMapping/>
+  </p:clrMapOvr>
+</p:sld>
+</file>
+
+<file path=ppt/slides/slide6.xml><?xml version="1.0" encoding="utf-8"?>
+<p:sld xmlns:a="http://schemas.openxmlformats.org/drawingml/2006/main" xmlns:r="http://schemas.openxmlformats.org/officeDocument/2006/relationships" xmlns:p="http://schemas.openxmlformats.org/presentationml/2006/main">
+  <p:cSld>
+    <p:spTree>
+      <p:nvGrpSpPr>
+        <p:cNvPr id="1" name=""/>
+        <p:cNvGrpSpPr/>
+        <p:nvPr/>
+      </p:nvGrpSpPr>
+      <p:grpSpPr>
+        <a:xfrm>
+          <a:off x="0" y="0"/>
+          <a:ext cx="0" cy="0"/>
+          <a:chOff x="0" y="0"/>
+          <a:chExt cx="0" cy="0"/>
+        </a:xfrm>
+      </p:grpSpPr>
+      <p:sp>
+        <p:nvSpPr>
+          <p:cNvPr id="31" name="Cylinder 30">
+            <a:extLst>
+              <a:ext uri="{FF2B5EF4-FFF2-40B4-BE49-F238E27FC236}">
+                <a16:creationId xmlns:a16="http://schemas.microsoft.com/office/drawing/2014/main" id="{17369967-430D-7D6A-683E-7BC6838DEB5F}"/>
+              </a:ext>
+            </a:extLst>
+          </p:cNvPr>
+          <p:cNvSpPr/>
+          <p:nvPr/>
+        </p:nvSpPr>
+        <p:spPr>
+          <a:xfrm>
+            <a:off x="2000700" y="4579433"/>
+            <a:ext cx="326003" cy="819689"/>
+          </a:xfrm>
+          <a:prstGeom prst="can">
+            <a:avLst/>
+          </a:prstGeom>
+          <a:solidFill>
+            <a:schemeClr val="bg2">
+              <a:lumMod val="90000"/>
+            </a:schemeClr>
+          </a:solidFill>
+          <a:ln w="38100"/>
+        </p:spPr>
+        <p:style>
+          <a:lnRef idx="2">
+            <a:schemeClr val="dk1"/>
+          </a:lnRef>
+          <a:fillRef idx="1">
+            <a:schemeClr val="lt1"/>
+          </a:fillRef>
+          <a:effectRef idx="0">
+            <a:schemeClr val="dk1"/>
+          </a:effectRef>
+          <a:fontRef idx="minor">
+            <a:schemeClr val="dk1"/>
+          </a:fontRef>
+        </p:style>
+        <p:txBody>
+          <a:bodyPr rtlCol="0" anchor="ctr"/>
+          <a:lstStyle/>
+          <a:p>
+            <a:pPr algn="ctr"/>
+            <a:endParaRPr lang="en-US"/>
+          </a:p>
+        </p:txBody>
+      </p:sp>
+      <p:pic>
+        <p:nvPicPr>
+          <p:cNvPr id="20" name="Picture 19">
+            <a:extLst>
+              <a:ext uri="{FF2B5EF4-FFF2-40B4-BE49-F238E27FC236}">
+                <a16:creationId xmlns:a16="http://schemas.microsoft.com/office/drawing/2014/main" id="{F413AA6C-A349-91D0-B8F5-DC487CB71EFD}"/>
+              </a:ext>
+            </a:extLst>
+          </p:cNvPr>
+          <p:cNvPicPr>
+            <a:picLocks noChangeAspect="1"/>
+          </p:cNvPicPr>
+          <p:nvPr/>
+        </p:nvPicPr>
+        <p:blipFill>
+          <a:blip r:embed="rId2"/>
+          <a:stretch>
+            <a:fillRect/>
+          </a:stretch>
+        </p:blipFill>
+        <p:spPr>
+          <a:xfrm>
+            <a:off x="5447139" y="1946252"/>
+            <a:ext cx="390557" cy="468669"/>
+          </a:xfrm>
+          <a:prstGeom prst="rect">
+            <a:avLst/>
+          </a:prstGeom>
+        </p:spPr>
+      </p:pic>
+      <p:sp>
+        <p:nvSpPr>
+          <p:cNvPr id="4" name="Cylinder 3">
+            <a:extLst>
+              <a:ext uri="{FF2B5EF4-FFF2-40B4-BE49-F238E27FC236}">
+                <a16:creationId xmlns:a16="http://schemas.microsoft.com/office/drawing/2014/main" id="{4FB8B14E-24B4-CE65-AC52-0DC2270521A1}"/>
+              </a:ext>
+            </a:extLst>
+          </p:cNvPr>
+          <p:cNvSpPr/>
+          <p:nvPr/>
+        </p:nvSpPr>
+        <p:spPr>
+          <a:xfrm>
+            <a:off x="1998921" y="1297172"/>
+            <a:ext cx="3274828" cy="3423684"/>
+          </a:xfrm>
+          <a:prstGeom prst="can">
+            <a:avLst/>
+          </a:prstGeom>
+          <a:solidFill>
+            <a:schemeClr val="bg2">
+              <a:lumMod val="90000"/>
+            </a:schemeClr>
+          </a:solidFill>
+          <a:ln w="38100"/>
+        </p:spPr>
+        <p:style>
+          <a:lnRef idx="2">
+            <a:schemeClr val="dk1"/>
+          </a:lnRef>
+          <a:fillRef idx="1">
+            <a:schemeClr val="lt1"/>
+          </a:fillRef>
+          <a:effectRef idx="0">
+            <a:schemeClr val="dk1"/>
+          </a:effectRef>
+          <a:fontRef idx="minor">
+            <a:schemeClr val="dk1"/>
+          </a:fontRef>
+        </p:style>
+        <p:txBody>
+          <a:bodyPr rtlCol="0" anchor="ctr"/>
+          <a:lstStyle/>
+          <a:p>
+            <a:pPr algn="ctr"/>
+            <a:endParaRPr lang="en-US"/>
+          </a:p>
+        </p:txBody>
+      </p:sp>
+      <p:sp>
+        <p:nvSpPr>
+          <p:cNvPr id="5" name="Cylinder 4">
+            <a:extLst>
+              <a:ext uri="{FF2B5EF4-FFF2-40B4-BE49-F238E27FC236}">
+                <a16:creationId xmlns:a16="http://schemas.microsoft.com/office/drawing/2014/main" id="{0F02D7AF-ECAB-CDE8-01BA-024A2BFD220E}"/>
+              </a:ext>
+            </a:extLst>
+          </p:cNvPr>
+          <p:cNvSpPr/>
+          <p:nvPr/>
+        </p:nvSpPr>
+        <p:spPr>
+          <a:xfrm>
+            <a:off x="1998921" y="2838892"/>
+            <a:ext cx="3274828" cy="2041451"/>
+          </a:xfrm>
+          <a:prstGeom prst="can">
+            <a:avLst/>
+          </a:prstGeom>
+          <a:solidFill>
+            <a:schemeClr val="accent1">
+              <a:lumMod val="40000"/>
+              <a:lumOff val="60000"/>
+            </a:schemeClr>
+          </a:solidFill>
+          <a:ln w="38100"/>
+        </p:spPr>
+        <p:style>
+          <a:lnRef idx="2">
+            <a:schemeClr val="dk1"/>
+          </a:lnRef>
+          <a:fillRef idx="1">
+            <a:schemeClr val="lt1"/>
+          </a:fillRef>
+          <a:effectRef idx="0">
+            <a:schemeClr val="dk1"/>
+          </a:effectRef>
+          <a:fontRef idx="minor">
+            <a:schemeClr val="dk1"/>
+          </a:fontRef>
+        </p:style>
+        <p:txBody>
+          <a:bodyPr rtlCol="0" anchor="ctr"/>
+          <a:lstStyle/>
+          <a:p>
+            <a:pPr algn="ctr"/>
+            <a:endParaRPr lang="en-US"/>
+          </a:p>
+        </p:txBody>
+      </p:sp>
+      <p:sp>
+        <p:nvSpPr>
+          <p:cNvPr id="8" name="Arrow: Down 7">
+            <a:extLst>
+              <a:ext uri="{FF2B5EF4-FFF2-40B4-BE49-F238E27FC236}">
+                <a16:creationId xmlns:a16="http://schemas.microsoft.com/office/drawing/2014/main" id="{CA5F8978-23AC-3BD0-D9AA-1A0939C82EC7}"/>
+              </a:ext>
+            </a:extLst>
+          </p:cNvPr>
+          <p:cNvSpPr/>
+          <p:nvPr/>
+        </p:nvSpPr>
+        <p:spPr>
+          <a:xfrm>
+            <a:off x="2036109" y="5451938"/>
+            <a:ext cx="255183" cy="648799"/>
+          </a:xfrm>
+          <a:prstGeom prst="downArrow">
+            <a:avLst/>
+          </a:prstGeom>
+          <a:solidFill>
+            <a:schemeClr val="accent4">
+              <a:lumMod val="40000"/>
+              <a:lumOff val="60000"/>
+            </a:schemeClr>
+          </a:solidFill>
+          <a:ln w="19050">
+            <a:solidFill>
+              <a:schemeClr val="tx1"/>
+            </a:solidFill>
+          </a:ln>
+        </p:spPr>
+        <p:style>
+          <a:lnRef idx="2">
+            <a:schemeClr val="accent1">
+              <a:shade val="50000"/>
+            </a:schemeClr>
+          </a:lnRef>
+          <a:fillRef idx="1">
+            <a:schemeClr val="accent1"/>
+          </a:fillRef>
+          <a:effectRef idx="0">
+            <a:schemeClr val="accent1"/>
+          </a:effectRef>
+          <a:fontRef idx="minor">
+            <a:schemeClr val="lt1"/>
+          </a:fontRef>
+        </p:style>
+        <p:txBody>
+          <a:bodyPr rtlCol="0" anchor="ctr"/>
+          <a:lstStyle/>
+          <a:p>
+            <a:pPr algn="ctr"/>
+            <a:endParaRPr lang="en-US"/>
+          </a:p>
+        </p:txBody>
+      </p:sp>
+      <p:cxnSp>
+        <p:nvCxnSpPr>
+          <p:cNvPr id="11" name="Straight Arrow Connector 10">
+            <a:extLst>
+              <a:ext uri="{FF2B5EF4-FFF2-40B4-BE49-F238E27FC236}">
+                <a16:creationId xmlns:a16="http://schemas.microsoft.com/office/drawing/2014/main" id="{37695D17-2E23-8CDD-BA2F-AE51387C11EF}"/>
+              </a:ext>
+            </a:extLst>
+          </p:cNvPr>
+          <p:cNvCxnSpPr>
+            <a:cxnSpLocks/>
+          </p:cNvCxnSpPr>
+          <p:nvPr/>
+        </p:nvCxnSpPr>
+        <p:spPr>
+          <a:xfrm>
+            <a:off x="5447139" y="3083442"/>
+            <a:ext cx="0" cy="1637414"/>
+          </a:xfrm>
+          <a:prstGeom prst="straightConnector1">
+            <a:avLst/>
+          </a:prstGeom>
+          <a:ln w="38100">
+            <a:solidFill>
+              <a:schemeClr val="tx1"/>
+            </a:solidFill>
+            <a:headEnd type="triangle"/>
+            <a:tailEnd type="triangle"/>
+          </a:ln>
+        </p:spPr>
+        <p:style>
+          <a:lnRef idx="1">
+            <a:schemeClr val="accent1"/>
+          </a:lnRef>
+          <a:fillRef idx="0">
+            <a:schemeClr val="accent1"/>
+          </a:fillRef>
+          <a:effectRef idx="0">
+            <a:schemeClr val="accent1"/>
+          </a:effectRef>
+          <a:fontRef idx="minor">
+            <a:schemeClr val="tx1"/>
+          </a:fontRef>
+        </p:style>
+      </p:cxnSp>
+      <p:cxnSp>
+        <p:nvCxnSpPr>
+          <p:cNvPr id="12" name="Straight Arrow Connector 11">
+            <a:extLst>
+              <a:ext uri="{FF2B5EF4-FFF2-40B4-BE49-F238E27FC236}">
+                <a16:creationId xmlns:a16="http://schemas.microsoft.com/office/drawing/2014/main" id="{1A8E0C07-AF2A-92F2-27CB-AF047F8DB6C6}"/>
+              </a:ext>
+            </a:extLst>
+          </p:cNvPr>
+          <p:cNvCxnSpPr>
+            <a:cxnSpLocks/>
+          </p:cNvCxnSpPr>
+          <p:nvPr/>
+        </p:nvCxnSpPr>
+        <p:spPr>
+          <a:xfrm flipH="1">
+            <a:off x="4488110" y="2267297"/>
+            <a:ext cx="959029" cy="816145"/>
+          </a:xfrm>
+          <a:prstGeom prst="straightConnector1">
+            <a:avLst/>
+          </a:prstGeom>
+          <a:ln w="38100">
+            <a:solidFill>
+              <a:schemeClr val="tx1"/>
+            </a:solidFill>
+            <a:tailEnd type="triangle"/>
+          </a:ln>
+        </p:spPr>
+        <p:style>
+          <a:lnRef idx="1">
+            <a:schemeClr val="accent1"/>
+          </a:lnRef>
+          <a:fillRef idx="0">
+            <a:schemeClr val="accent1"/>
+          </a:fillRef>
+          <a:effectRef idx="0">
+            <a:schemeClr val="accent1"/>
+          </a:effectRef>
+          <a:fontRef idx="minor">
+            <a:schemeClr val="tx1"/>
+          </a:fontRef>
+        </p:style>
+      </p:cxnSp>
+      <p:pic>
+        <p:nvPicPr>
+          <p:cNvPr id="18" name="Picture 17">
+            <a:extLst>
+              <a:ext uri="{FF2B5EF4-FFF2-40B4-BE49-F238E27FC236}">
+                <a16:creationId xmlns:a16="http://schemas.microsoft.com/office/drawing/2014/main" id="{68062172-F6C1-4F56-416E-B59F3C054E6B}"/>
+              </a:ext>
+            </a:extLst>
+          </p:cNvPr>
+          <p:cNvPicPr>
+            <a:picLocks noChangeAspect="1"/>
+          </p:cNvPicPr>
+          <p:nvPr/>
+        </p:nvPicPr>
+        <p:blipFill>
+          <a:blip r:embed="rId3"/>
+          <a:stretch>
+            <a:fillRect/>
+          </a:stretch>
+        </p:blipFill>
+        <p:spPr>
+          <a:xfrm>
+            <a:off x="1190846" y="2969600"/>
+            <a:ext cx="686039" cy="616566"/>
+          </a:xfrm>
+          <a:prstGeom prst="rect">
+            <a:avLst/>
+          </a:prstGeom>
+        </p:spPr>
+      </p:pic>
+      <p:pic>
+        <p:nvPicPr>
+          <p:cNvPr id="22" name="Picture 21">
+            <a:extLst>
+              <a:ext uri="{FF2B5EF4-FFF2-40B4-BE49-F238E27FC236}">
+                <a16:creationId xmlns:a16="http://schemas.microsoft.com/office/drawing/2014/main" id="{061D4458-87C3-86BF-25CA-19AF23B4E6F6}"/>
+              </a:ext>
+            </a:extLst>
+          </p:cNvPr>
+          <p:cNvPicPr>
+            <a:picLocks noChangeAspect="1"/>
+          </p:cNvPicPr>
+          <p:nvPr/>
+        </p:nvPicPr>
+        <p:blipFill>
+          <a:blip r:embed="rId4"/>
+          <a:stretch>
+            <a:fillRect/>
+          </a:stretch>
+        </p:blipFill>
+        <p:spPr>
+          <a:xfrm>
+            <a:off x="5496032" y="3662681"/>
+            <a:ext cx="613406" cy="468669"/>
+          </a:xfrm>
+          <a:prstGeom prst="rect">
+            <a:avLst/>
+          </a:prstGeom>
+        </p:spPr>
+      </p:pic>
+      <p:pic>
+        <p:nvPicPr>
+          <p:cNvPr id="24" name="Picture 23">
+            <a:extLst>
+              <a:ext uri="{FF2B5EF4-FFF2-40B4-BE49-F238E27FC236}">
+                <a16:creationId xmlns:a16="http://schemas.microsoft.com/office/drawing/2014/main" id="{25E7F83F-D9E1-C0C7-EC74-22A5198AA017}"/>
+              </a:ext>
+            </a:extLst>
+          </p:cNvPr>
+          <p:cNvPicPr>
+            <a:picLocks noChangeAspect="1"/>
+          </p:cNvPicPr>
+          <p:nvPr/>
+        </p:nvPicPr>
+        <p:blipFill>
+          <a:blip r:embed="rId5"/>
+          <a:stretch>
+            <a:fillRect/>
+          </a:stretch>
+        </p:blipFill>
+        <p:spPr>
+          <a:xfrm>
+            <a:off x="2291292" y="5560828"/>
+            <a:ext cx="694997" cy="458402"/>
+          </a:xfrm>
+          <a:prstGeom prst="rect">
+            <a:avLst/>
+          </a:prstGeom>
+        </p:spPr>
+      </p:pic>
+      <p:cxnSp>
+        <p:nvCxnSpPr>
+          <p:cNvPr id="25" name="Straight Arrow Connector 24">
+            <a:extLst>
+              <a:ext uri="{FF2B5EF4-FFF2-40B4-BE49-F238E27FC236}">
+                <a16:creationId xmlns:a16="http://schemas.microsoft.com/office/drawing/2014/main" id="{C26B9B5C-A1F0-3F07-F0B3-1CE9CD2A4727}"/>
+              </a:ext>
+            </a:extLst>
+          </p:cNvPr>
+          <p:cNvCxnSpPr>
+            <a:cxnSpLocks/>
+          </p:cNvCxnSpPr>
+          <p:nvPr/>
+        </p:nvCxnSpPr>
+        <p:spPr>
+          <a:xfrm flipH="1" flipV="1">
+            <a:off x="4108789" y="4720856"/>
+            <a:ext cx="412338" cy="337978"/>
+          </a:xfrm>
+          <a:prstGeom prst="straightConnector1">
+            <a:avLst/>
+          </a:prstGeom>
+          <a:ln w="38100">
+            <a:solidFill>
+              <a:schemeClr val="tx1"/>
+            </a:solidFill>
+            <a:tailEnd type="triangle"/>
+          </a:ln>
+        </p:spPr>
+        <p:style>
+          <a:lnRef idx="1">
+            <a:schemeClr val="accent1"/>
+          </a:lnRef>
+          <a:fillRef idx="0">
+            <a:schemeClr val="accent1"/>
+          </a:fillRef>
+          <a:effectRef idx="0">
+            <a:schemeClr val="accent1"/>
+          </a:effectRef>
+          <a:fontRef idx="minor">
+            <a:schemeClr val="tx1"/>
+          </a:fontRef>
+        </p:style>
+      </p:cxnSp>
+      <p:pic>
+        <p:nvPicPr>
+          <p:cNvPr id="28" name="Picture 27">
+            <a:extLst>
+              <a:ext uri="{FF2B5EF4-FFF2-40B4-BE49-F238E27FC236}">
+                <a16:creationId xmlns:a16="http://schemas.microsoft.com/office/drawing/2014/main" id="{45964300-E532-9094-9661-A0265A255643}"/>
+              </a:ext>
+            </a:extLst>
+          </p:cNvPr>
+          <p:cNvPicPr>
+            <a:picLocks noChangeAspect="1"/>
+          </p:cNvPicPr>
+          <p:nvPr/>
+        </p:nvPicPr>
+        <p:blipFill>
+          <a:blip r:embed="rId6"/>
+          <a:stretch>
+            <a:fillRect/>
+          </a:stretch>
+        </p:blipFill>
+        <p:spPr>
+          <a:xfrm>
+            <a:off x="4560218" y="4959062"/>
+            <a:ext cx="337220" cy="421524"/>
+          </a:xfrm>
+          <a:prstGeom prst="rect">
+            <a:avLst/>
+          </a:prstGeom>
+        </p:spPr>
+      </p:pic>
+      <p:sp>
+        <p:nvSpPr>
+          <p:cNvPr id="35" name="Cylinder 34">
+            <a:extLst>
+              <a:ext uri="{FF2B5EF4-FFF2-40B4-BE49-F238E27FC236}">
+                <a16:creationId xmlns:a16="http://schemas.microsoft.com/office/drawing/2014/main" id="{2C009D11-7A95-88FA-BE90-6E32E55F07B0}"/>
+              </a:ext>
+            </a:extLst>
+          </p:cNvPr>
+          <p:cNvSpPr/>
+          <p:nvPr/>
+        </p:nvSpPr>
+        <p:spPr>
+          <a:xfrm>
+            <a:off x="3515696" y="-384046"/>
+            <a:ext cx="326003" cy="819689"/>
+          </a:xfrm>
+          <a:prstGeom prst="can">
+            <a:avLst/>
+          </a:prstGeom>
+          <a:solidFill>
+            <a:schemeClr val="bg2">
+              <a:lumMod val="90000"/>
+            </a:schemeClr>
+          </a:solidFill>
+          <a:ln w="38100"/>
+        </p:spPr>
+        <p:style>
+          <a:lnRef idx="2">
+            <a:schemeClr val="dk1"/>
+          </a:lnRef>
+          <a:fillRef idx="1">
+            <a:schemeClr val="lt1"/>
+          </a:fillRef>
+          <a:effectRef idx="0">
+            <a:schemeClr val="dk1"/>
+          </a:effectRef>
+          <a:fontRef idx="minor">
+            <a:schemeClr val="dk1"/>
+          </a:fontRef>
+        </p:style>
+        <p:txBody>
+          <a:bodyPr rtlCol="0" anchor="ctr"/>
+          <a:lstStyle/>
+          <a:p>
+            <a:pPr algn="ctr"/>
+            <a:endParaRPr lang="en-US"/>
+          </a:p>
+        </p:txBody>
+      </p:sp>
+      <p:sp>
+        <p:nvSpPr>
+          <p:cNvPr id="36" name="Arrow: Down 35">
+            <a:extLst>
+              <a:ext uri="{FF2B5EF4-FFF2-40B4-BE49-F238E27FC236}">
+                <a16:creationId xmlns:a16="http://schemas.microsoft.com/office/drawing/2014/main" id="{A671B25B-873B-A167-CA62-D735A8C93078}"/>
+              </a:ext>
+            </a:extLst>
+          </p:cNvPr>
+          <p:cNvSpPr/>
+          <p:nvPr/>
+        </p:nvSpPr>
+        <p:spPr>
+          <a:xfrm>
+            <a:off x="3551105" y="488459"/>
+            <a:ext cx="255183" cy="648799"/>
+          </a:xfrm>
+          <a:prstGeom prst="downArrow">
+            <a:avLst/>
+          </a:prstGeom>
+          <a:solidFill>
+            <a:schemeClr val="accent4">
+              <a:lumMod val="40000"/>
+              <a:lumOff val="60000"/>
+            </a:schemeClr>
+          </a:solidFill>
+          <a:ln w="19050">
+            <a:solidFill>
+              <a:schemeClr val="tx1"/>
+            </a:solidFill>
+          </a:ln>
+        </p:spPr>
+        <p:style>
+          <a:lnRef idx="2">
+            <a:schemeClr val="accent1">
+              <a:shade val="50000"/>
+            </a:schemeClr>
+          </a:lnRef>
+          <a:fillRef idx="1">
+            <a:schemeClr val="accent1"/>
+          </a:fillRef>
+          <a:effectRef idx="0">
+            <a:schemeClr val="accent1"/>
+          </a:effectRef>
+          <a:fontRef idx="minor">
+            <a:schemeClr val="lt1"/>
+          </a:fontRef>
+        </p:style>
+        <p:txBody>
+          <a:bodyPr rtlCol="0" anchor="ctr"/>
+          <a:lstStyle/>
+          <a:p>
+            <a:pPr algn="ctr"/>
+            <a:endParaRPr lang="en-US"/>
+          </a:p>
+        </p:txBody>
+      </p:sp>
+      <p:pic>
+        <p:nvPicPr>
+          <p:cNvPr id="41" name="Picture 40">
+            <a:extLst>
+              <a:ext uri="{FF2B5EF4-FFF2-40B4-BE49-F238E27FC236}">
+                <a16:creationId xmlns:a16="http://schemas.microsoft.com/office/drawing/2014/main" id="{E627A0BD-AAF2-557A-0A20-539B3E5A4C08}"/>
+              </a:ext>
+            </a:extLst>
+          </p:cNvPr>
+          <p:cNvPicPr>
+            <a:picLocks noChangeAspect="1"/>
+          </p:cNvPicPr>
+          <p:nvPr/>
+        </p:nvPicPr>
+        <p:blipFill>
+          <a:blip r:embed="rId7"/>
+          <a:stretch>
+            <a:fillRect/>
+          </a:stretch>
+        </p:blipFill>
+        <p:spPr>
+          <a:xfrm>
+            <a:off x="3963726" y="569237"/>
+            <a:ext cx="524384" cy="485745"/>
+          </a:xfrm>
+          <a:prstGeom prst="rect">
+            <a:avLst/>
+          </a:prstGeom>
+        </p:spPr>
+      </p:pic>
+      <p:sp>
+        <p:nvSpPr>
+          <p:cNvPr id="42" name="Cylinder 41">
+            <a:extLst>
+              <a:ext uri="{FF2B5EF4-FFF2-40B4-BE49-F238E27FC236}">
+                <a16:creationId xmlns:a16="http://schemas.microsoft.com/office/drawing/2014/main" id="{BDC817BB-24AF-BD4F-BB1A-DADC4DE605D2}"/>
+              </a:ext>
+            </a:extLst>
+          </p:cNvPr>
+          <p:cNvSpPr/>
+          <p:nvPr/>
+        </p:nvSpPr>
+        <p:spPr>
+          <a:xfrm rot="5400000">
+            <a:off x="8841972" y="1058479"/>
+            <a:ext cx="1045621" cy="3423684"/>
+          </a:xfrm>
+          <a:prstGeom prst="can">
+            <a:avLst/>
+          </a:prstGeom>
+          <a:solidFill>
+            <a:schemeClr val="bg2">
+              <a:lumMod val="90000"/>
+            </a:schemeClr>
+          </a:solidFill>
+          <a:ln w="38100"/>
+        </p:spPr>
+        <p:style>
+          <a:lnRef idx="2">
+            <a:schemeClr val="dk1"/>
+          </a:lnRef>
+          <a:fillRef idx="1">
+            <a:schemeClr val="lt1"/>
+          </a:fillRef>
+          <a:effectRef idx="0">
+            <a:schemeClr val="dk1"/>
+          </a:effectRef>
+          <a:fontRef idx="minor">
+            <a:schemeClr val="dk1"/>
+          </a:fontRef>
+        </p:style>
+        <p:txBody>
+          <a:bodyPr rtlCol="0" anchor="ctr"/>
+          <a:lstStyle/>
+          <a:p>
+            <a:pPr algn="ctr"/>
+            <a:endParaRPr lang="en-US"/>
+          </a:p>
+        </p:txBody>
+      </p:sp>
+      <p:cxnSp>
+        <p:nvCxnSpPr>
+          <p:cNvPr id="43" name="Straight Arrow Connector 42">
+            <a:extLst>
+              <a:ext uri="{FF2B5EF4-FFF2-40B4-BE49-F238E27FC236}">
+                <a16:creationId xmlns:a16="http://schemas.microsoft.com/office/drawing/2014/main" id="{0C51B9FD-7084-E292-F0CB-AB4A4AAEE25E}"/>
+              </a:ext>
+            </a:extLst>
+          </p:cNvPr>
+          <p:cNvCxnSpPr>
+            <a:cxnSpLocks/>
+          </p:cNvCxnSpPr>
+          <p:nvPr/>
+        </p:nvCxnSpPr>
+        <p:spPr>
+          <a:xfrm>
+            <a:off x="8231755" y="1864659"/>
+            <a:ext cx="0" cy="382851"/>
+          </a:xfrm>
+          <a:prstGeom prst="straightConnector1">
+            <a:avLst/>
+          </a:prstGeom>
+          <a:ln w="38100">
+            <a:solidFill>
+              <a:schemeClr val="tx1"/>
+            </a:solidFill>
+            <a:tailEnd type="triangle"/>
+          </a:ln>
+        </p:spPr>
+        <p:style>
+          <a:lnRef idx="1">
+            <a:schemeClr val="accent1"/>
+          </a:lnRef>
+          <a:fillRef idx="0">
+            <a:schemeClr val="accent1"/>
+          </a:fillRef>
+          <a:effectRef idx="0">
+            <a:schemeClr val="accent1"/>
+          </a:effectRef>
+          <a:fontRef idx="minor">
+            <a:schemeClr val="tx1"/>
+          </a:fontRef>
+        </p:style>
+      </p:cxnSp>
+      <p:cxnSp>
+        <p:nvCxnSpPr>
+          <p:cNvPr id="45" name="Straight Arrow Connector 44">
+            <a:extLst>
+              <a:ext uri="{FF2B5EF4-FFF2-40B4-BE49-F238E27FC236}">
+                <a16:creationId xmlns:a16="http://schemas.microsoft.com/office/drawing/2014/main" id="{E41E6705-4DDC-A20F-7CC0-A1C2761CC57B}"/>
+              </a:ext>
+            </a:extLst>
+          </p:cNvPr>
+          <p:cNvCxnSpPr>
+            <a:cxnSpLocks/>
+          </p:cNvCxnSpPr>
+          <p:nvPr/>
+        </p:nvCxnSpPr>
+        <p:spPr>
+          <a:xfrm flipV="1">
+            <a:off x="8231755" y="3292270"/>
+            <a:ext cx="0" cy="370411"/>
+          </a:xfrm>
+          <a:prstGeom prst="straightConnector1">
+            <a:avLst/>
+          </a:prstGeom>
+          <a:ln w="38100">
+            <a:solidFill>
+              <a:schemeClr val="tx1"/>
+            </a:solidFill>
+            <a:tailEnd type="triangle"/>
+          </a:ln>
+        </p:spPr>
+        <p:style>
+          <a:lnRef idx="1">
+            <a:schemeClr val="accent1"/>
+          </a:lnRef>
+          <a:fillRef idx="0">
+            <a:schemeClr val="accent1"/>
+          </a:fillRef>
+          <a:effectRef idx="0">
+            <a:schemeClr val="accent1"/>
+          </a:effectRef>
+          <a:fontRef idx="minor">
+            <a:schemeClr val="tx1"/>
+          </a:fontRef>
+        </p:style>
+      </p:cxnSp>
+      <p:cxnSp>
+        <p:nvCxnSpPr>
+          <p:cNvPr id="47" name="Straight Arrow Connector 46">
+            <a:extLst>
+              <a:ext uri="{FF2B5EF4-FFF2-40B4-BE49-F238E27FC236}">
+                <a16:creationId xmlns:a16="http://schemas.microsoft.com/office/drawing/2014/main" id="{2DC6C365-DA48-EC15-B6F6-2DD210EED825}"/>
+              </a:ext>
+            </a:extLst>
+          </p:cNvPr>
+          <p:cNvCxnSpPr>
+            <a:cxnSpLocks/>
+          </p:cNvCxnSpPr>
+          <p:nvPr/>
+        </p:nvCxnSpPr>
+        <p:spPr>
+          <a:xfrm>
+            <a:off x="10974955" y="2779286"/>
+            <a:ext cx="446080" cy="0"/>
+          </a:xfrm>
+          <a:prstGeom prst="straightConnector1">
+            <a:avLst/>
+          </a:prstGeom>
+          <a:ln w="38100">
+            <a:solidFill>
+              <a:schemeClr val="tx1"/>
+            </a:solidFill>
+            <a:tailEnd type="triangle"/>
+          </a:ln>
+        </p:spPr>
+        <p:style>
+          <a:lnRef idx="1">
+            <a:schemeClr val="accent1"/>
+          </a:lnRef>
+          <a:fillRef idx="0">
+            <a:schemeClr val="accent1"/>
+          </a:fillRef>
+          <a:effectRef idx="0">
+            <a:schemeClr val="accent1"/>
+          </a:effectRef>
+          <a:fontRef idx="minor">
+            <a:schemeClr val="tx1"/>
+          </a:fontRef>
+        </p:style>
+      </p:cxnSp>
+      <p:cxnSp>
+        <p:nvCxnSpPr>
+          <p:cNvPr id="49" name="Straight Arrow Connector 48">
+            <a:extLst>
+              <a:ext uri="{FF2B5EF4-FFF2-40B4-BE49-F238E27FC236}">
+                <a16:creationId xmlns:a16="http://schemas.microsoft.com/office/drawing/2014/main" id="{A8D2D676-F796-4947-848A-F0EB5F692F5E}"/>
+              </a:ext>
+            </a:extLst>
+          </p:cNvPr>
+          <p:cNvCxnSpPr>
+            <a:cxnSpLocks/>
+          </p:cNvCxnSpPr>
+          <p:nvPr/>
+        </p:nvCxnSpPr>
+        <p:spPr>
+          <a:xfrm flipH="1">
+            <a:off x="7808259" y="4025153"/>
+            <a:ext cx="3166696" cy="0"/>
+          </a:xfrm>
+          <a:prstGeom prst="straightConnector1">
+            <a:avLst/>
+          </a:prstGeom>
+          <a:ln w="38100">
+            <a:solidFill>
+              <a:schemeClr val="tx1"/>
+            </a:solidFill>
+            <a:headEnd type="triangle"/>
+            <a:tailEnd type="triangle"/>
+          </a:ln>
+        </p:spPr>
+        <p:style>
+          <a:lnRef idx="1">
+            <a:schemeClr val="accent1"/>
+          </a:lnRef>
+          <a:fillRef idx="0">
+            <a:schemeClr val="accent1"/>
+          </a:fillRef>
+          <a:effectRef idx="0">
+            <a:schemeClr val="accent1"/>
+          </a:effectRef>
+          <a:fontRef idx="minor">
+            <a:schemeClr val="tx1"/>
+          </a:fontRef>
+        </p:style>
+      </p:cxnSp>
+      <p:cxnSp>
+        <p:nvCxnSpPr>
+          <p:cNvPr id="53" name="Straight Connector 52">
+            <a:extLst>
+              <a:ext uri="{FF2B5EF4-FFF2-40B4-BE49-F238E27FC236}">
+                <a16:creationId xmlns:a16="http://schemas.microsoft.com/office/drawing/2014/main" id="{399FE175-9C86-7C6D-4D95-D92639B3601C}"/>
+              </a:ext>
+            </a:extLst>
+          </p:cNvPr>
+          <p:cNvCxnSpPr/>
+          <p:nvPr/>
+        </p:nvCxnSpPr>
+        <p:spPr>
+          <a:xfrm>
+            <a:off x="7808259" y="3292270"/>
+            <a:ext cx="0" cy="1360412"/>
+          </a:xfrm>
+          <a:prstGeom prst="line">
+            <a:avLst/>
+          </a:prstGeom>
+          <a:ln w="28575">
+            <a:prstDash val="dash"/>
+          </a:ln>
+        </p:spPr>
+        <p:style>
+          <a:lnRef idx="1">
+            <a:schemeClr val="accent1"/>
+          </a:lnRef>
+          <a:fillRef idx="0">
+            <a:schemeClr val="accent1"/>
+          </a:fillRef>
+          <a:effectRef idx="0">
+            <a:schemeClr val="accent1"/>
+          </a:effectRef>
+          <a:fontRef idx="minor">
+            <a:schemeClr val="tx1"/>
+          </a:fontRef>
+        </p:style>
+      </p:cxnSp>
+      <p:cxnSp>
+        <p:nvCxnSpPr>
+          <p:cNvPr id="54" name="Straight Connector 53">
+            <a:extLst>
+              <a:ext uri="{FF2B5EF4-FFF2-40B4-BE49-F238E27FC236}">
+                <a16:creationId xmlns:a16="http://schemas.microsoft.com/office/drawing/2014/main" id="{12FD020B-01F2-0FD9-45BA-60F38FE42D5B}"/>
+              </a:ext>
+            </a:extLst>
+          </p:cNvPr>
+          <p:cNvCxnSpPr/>
+          <p:nvPr/>
+        </p:nvCxnSpPr>
+        <p:spPr>
+          <a:xfrm>
+            <a:off x="10974955" y="3277883"/>
+            <a:ext cx="0" cy="1360412"/>
+          </a:xfrm>
+          <a:prstGeom prst="line">
+            <a:avLst/>
+          </a:prstGeom>
+          <a:ln w="28575">
+            <a:prstDash val="dash"/>
+          </a:ln>
+        </p:spPr>
+        <p:style>
+          <a:lnRef idx="1">
+            <a:schemeClr val="accent1"/>
+          </a:lnRef>
+          <a:fillRef idx="0">
+            <a:schemeClr val="accent1"/>
+          </a:fillRef>
+          <a:effectRef idx="0">
+            <a:schemeClr val="accent1"/>
+          </a:effectRef>
+          <a:fontRef idx="minor">
+            <a:schemeClr val="tx1"/>
+          </a:fontRef>
+        </p:style>
+      </p:cxnSp>
+      <p:pic>
+        <p:nvPicPr>
+          <p:cNvPr id="57" name="Picture 56">
+            <a:extLst>
+              <a:ext uri="{FF2B5EF4-FFF2-40B4-BE49-F238E27FC236}">
+                <a16:creationId xmlns:a16="http://schemas.microsoft.com/office/drawing/2014/main" id="{DED594C0-9E92-FBA9-2F48-FC516F33AF52}"/>
+              </a:ext>
+            </a:extLst>
+          </p:cNvPr>
+          <p:cNvPicPr>
+            <a:picLocks noChangeAspect="1"/>
+          </p:cNvPicPr>
+          <p:nvPr/>
+        </p:nvPicPr>
+        <p:blipFill>
+          <a:blip r:embed="rId8"/>
+          <a:stretch>
+            <a:fillRect/>
+          </a:stretch>
+        </p:blipFill>
+        <p:spPr>
+          <a:xfrm>
+            <a:off x="9091569" y="4147116"/>
+            <a:ext cx="600075" cy="647700"/>
+          </a:xfrm>
+          <a:prstGeom prst="rect">
+            <a:avLst/>
+          </a:prstGeom>
+        </p:spPr>
+      </p:pic>
+      <p:pic>
+        <p:nvPicPr>
+          <p:cNvPr id="59" name="Picture 58">
+            <a:extLst>
+              <a:ext uri="{FF2B5EF4-FFF2-40B4-BE49-F238E27FC236}">
+                <a16:creationId xmlns:a16="http://schemas.microsoft.com/office/drawing/2014/main" id="{63123EDB-E29B-0F15-6A4A-41D266436B04}"/>
+              </a:ext>
+            </a:extLst>
+          </p:cNvPr>
+          <p:cNvPicPr>
+            <a:picLocks noChangeAspect="1"/>
+          </p:cNvPicPr>
+          <p:nvPr/>
+        </p:nvPicPr>
+        <p:blipFill>
+          <a:blip r:embed="rId9"/>
+          <a:stretch>
+            <a:fillRect/>
+          </a:stretch>
+        </p:blipFill>
+        <p:spPr>
+          <a:xfrm>
+            <a:off x="7962444" y="1253506"/>
+            <a:ext cx="538622" cy="523966"/>
+          </a:xfrm>
+          <a:prstGeom prst="rect">
+            <a:avLst/>
+          </a:prstGeom>
+        </p:spPr>
+      </p:pic>
+      <p:pic>
+        <p:nvPicPr>
+          <p:cNvPr id="61" name="Picture 60">
+            <a:extLst>
+              <a:ext uri="{FF2B5EF4-FFF2-40B4-BE49-F238E27FC236}">
+                <a16:creationId xmlns:a16="http://schemas.microsoft.com/office/drawing/2014/main" id="{184E5D22-25C1-E702-C2AF-89E6022E8885}"/>
+              </a:ext>
+            </a:extLst>
+          </p:cNvPr>
+          <p:cNvPicPr>
+            <a:picLocks noChangeAspect="1"/>
+          </p:cNvPicPr>
+          <p:nvPr/>
+        </p:nvPicPr>
+        <p:blipFill>
+          <a:blip r:embed="rId10"/>
+          <a:stretch>
+            <a:fillRect/>
+          </a:stretch>
+        </p:blipFill>
+        <p:spPr>
+          <a:xfrm>
+            <a:off x="11421035" y="2536795"/>
+            <a:ext cx="384266" cy="432805"/>
+          </a:xfrm>
+          <a:prstGeom prst="rect">
+            <a:avLst/>
+          </a:prstGeom>
+        </p:spPr>
+      </p:pic>
+    </p:spTree>
+    <p:extLst>
+      <p:ext uri="{BB962C8B-B14F-4D97-AF65-F5344CB8AC3E}">
+        <p14:creationId xmlns:p14="http://schemas.microsoft.com/office/powerpoint/2010/main" val="417760677"/>
       </p:ext>
     </p:extLst>
   </p:cSld>

</xml_diff>